<commit_message>
More AD FS and AD Connect content
</commit_message>
<xml_diff>
--- a/Presentations/70-534-Combined-SecuritySlides.pptx
+++ b/Presentations/70-534-Combined-SecuritySlides.pptx
@@ -6,10 +6,10 @@
     <p:sldMasterId id="2147483709" r:id="rId4"/>
   </p:sldMasterIdLst>
   <p:notesMasterIdLst>
-    <p:notesMasterId r:id="rId33"/>
+    <p:notesMasterId r:id="rId38"/>
   </p:notesMasterIdLst>
   <p:handoutMasterIdLst>
-    <p:handoutMasterId r:id="rId34"/>
+    <p:handoutMasterId r:id="rId39"/>
   </p:handoutMasterIdLst>
   <p:sldIdLst>
     <p:sldId id="311" r:id="rId5"/>
@@ -29,17 +29,22 @@
     <p:sldId id="314" r:id="rId19"/>
     <p:sldId id="322" r:id="rId20"/>
     <p:sldId id="324" r:id="rId21"/>
-    <p:sldId id="323" r:id="rId22"/>
-    <p:sldId id="325" r:id="rId23"/>
-    <p:sldId id="321" r:id="rId24"/>
-    <p:sldId id="319" r:id="rId25"/>
-    <p:sldId id="304" r:id="rId26"/>
-    <p:sldId id="306" r:id="rId27"/>
-    <p:sldId id="305" r:id="rId28"/>
-    <p:sldId id="303" r:id="rId29"/>
-    <p:sldId id="307" r:id="rId30"/>
-    <p:sldId id="308" r:id="rId31"/>
-    <p:sldId id="310" r:id="rId32"/>
+    <p:sldId id="327" r:id="rId22"/>
+    <p:sldId id="323" r:id="rId23"/>
+    <p:sldId id="325" r:id="rId24"/>
+    <p:sldId id="326" r:id="rId25"/>
+    <p:sldId id="328" r:id="rId26"/>
+    <p:sldId id="329" r:id="rId27"/>
+    <p:sldId id="330" r:id="rId28"/>
+    <p:sldId id="321" r:id="rId29"/>
+    <p:sldId id="319" r:id="rId30"/>
+    <p:sldId id="304" r:id="rId31"/>
+    <p:sldId id="306" r:id="rId32"/>
+    <p:sldId id="305" r:id="rId33"/>
+    <p:sldId id="303" r:id="rId34"/>
+    <p:sldId id="307" r:id="rId35"/>
+    <p:sldId id="308" r:id="rId36"/>
+    <p:sldId id="310" r:id="rId37"/>
   </p:sldIdLst>
   <p:sldSz cx="12192000" cy="6858000"/>
   <p:notesSz cx="6858000" cy="9144000"/>
@@ -140,10 +145,10 @@
   </p:defaultTextStyle>
   <p:extLst>
     <p:ext uri="{EFAFB233-063F-42B5-8137-9DF3F51BA10A}">
-      <p15:sldGuideLst xmlns:p15="http://schemas.microsoft.com/office/powerpoint/2012/main" xmlns=""/>
+      <p15:sldGuideLst xmlns="" xmlns:p15="http://schemas.microsoft.com/office/powerpoint/2012/main"/>
     </p:ext>
     <p:ext uri="{2D200454-40CA-4A62-9FC3-DE9A4176ACB9}">
-      <p15:notesGuideLst xmlns:p15="http://schemas.microsoft.com/office/powerpoint/2012/main" xmlns=""/>
+      <p15:notesGuideLst xmlns="" xmlns:p15="http://schemas.microsoft.com/office/powerpoint/2012/main"/>
     </p:ext>
   </p:extLst>
 </p:presentation>
@@ -924,157 +929,6 @@
           <a:p>
             <a:endParaRPr lang="en-US" dirty="0" smtClean="0"/>
           </a:p>
-          <a:p>
-            <a:pPr marL="171450" indent="-171450">
-              <a:buFont typeface="Arial"/>
-              <a:buChar char="•"/>
-            </a:pPr>
-            <a:r>
-              <a:rPr lang="en-US" dirty="0" smtClean="0"/>
-              <a:t>Simplicity and consistency</a:t>
-            </a:r>
-          </a:p>
-          <a:p>
-            <a:pPr marL="628650" lvl="1" indent="-171450">
-              <a:buFont typeface="Arial"/>
-              <a:buChar char="•"/>
-            </a:pPr>
-            <a:r>
-              <a:rPr lang="en-US" dirty="0" smtClean="0"/>
-              <a:t>Use the same set of APIs and patterns to enable sign on for:</a:t>
-            </a:r>
-          </a:p>
-          <a:p>
-            <a:pPr marL="1085850" lvl="2" indent="-171450">
-              <a:buFont typeface="Arial"/>
-              <a:buChar char="•"/>
-            </a:pPr>
-            <a:r>
-              <a:rPr lang="en-US" dirty="0" smtClean="0"/>
-              <a:t>multiple types of applications (server, desktop, mobile, browser)</a:t>
-            </a:r>
-          </a:p>
-          <a:p>
-            <a:pPr marL="1085850" lvl="2" indent="-171450">
-              <a:buFont typeface="Arial"/>
-              <a:buChar char="•"/>
-            </a:pPr>
-            <a:r>
-              <a:rPr lang="en-US" dirty="0" smtClean="0"/>
-              <a:t>multiple platforms (android, </a:t>
-            </a:r>
-            <a:r>
-              <a:rPr lang="en-US" dirty="0" err="1" smtClean="0"/>
-              <a:t>iOS</a:t>
-            </a:r>
-            <a:r>
-              <a:rPr lang="en-US" dirty="0" smtClean="0"/>
-              <a:t>, Windows)</a:t>
-            </a:r>
-          </a:p>
-          <a:p>
-            <a:pPr marL="1085850" lvl="2" indent="-171450">
-              <a:buFont typeface="Arial"/>
-              <a:buChar char="•"/>
-            </a:pPr>
-            <a:r>
-              <a:rPr lang="en-US" dirty="0" smtClean="0"/>
-              <a:t>applications inside the corporate network or hosted in the cloud</a:t>
-            </a:r>
-          </a:p>
-          <a:p>
-            <a:pPr marL="628650" lvl="1" indent="-171450">
-              <a:buFont typeface="Arial"/>
-              <a:buChar char="•"/>
-            </a:pPr>
-            <a:r>
-              <a:rPr lang="en-US" dirty="0" smtClean="0"/>
-              <a:t>Use the same set of libraries you can already use to authenticate users against Azure AD</a:t>
-            </a:r>
-          </a:p>
-          <a:p>
-            <a:pPr marL="171450" indent="-171450">
-              <a:buFont typeface="Arial"/>
-              <a:buChar char="•"/>
-            </a:pPr>
-            <a:r>
-              <a:rPr lang="en-US" dirty="0" smtClean="0"/>
-              <a:t>Flexibility</a:t>
-            </a:r>
-          </a:p>
-          <a:p>
-            <a:pPr marL="628650" lvl="1" indent="-171450">
-              <a:buFont typeface="Arial"/>
-              <a:buChar char="•"/>
-            </a:pPr>
-            <a:r>
-              <a:rPr lang="en-US" dirty="0" smtClean="0"/>
-              <a:t>In addition to standard user authorization, enable more complex scenarios such as:</a:t>
-            </a:r>
-          </a:p>
-          <a:p>
-            <a:pPr marL="1085850" lvl="2" indent="-171450">
-              <a:buFont typeface="Arial"/>
-              <a:buChar char="•"/>
-            </a:pPr>
-            <a:r>
-              <a:rPr lang="en-US" dirty="0" smtClean="0"/>
-              <a:t>3-legged sign on flows in which a user authorizes one web application or service to access resources that reside with another web app or service.</a:t>
-            </a:r>
-          </a:p>
-          <a:p>
-            <a:pPr marL="1085850" lvl="2" indent="-171450">
-              <a:buFont typeface="Arial"/>
-              <a:buChar char="•"/>
-            </a:pPr>
-            <a:r>
-              <a:rPr lang="en-US" dirty="0" smtClean="0"/>
-              <a:t>Server-to-server flows in which a mid-tier service accesses a back end API</a:t>
-            </a:r>
-          </a:p>
-          <a:p>
-            <a:pPr marL="1085850" lvl="2" indent="-171450">
-              <a:buFont typeface="Arial"/>
-              <a:buChar char="•"/>
-            </a:pPr>
-            <a:r>
-              <a:rPr lang="en-US" dirty="0" smtClean="0"/>
-              <a:t>JavaScript based single-page applications (SPA)</a:t>
-            </a:r>
-          </a:p>
-          <a:p>
-            <a:pPr marL="171450" indent="-171450">
-              <a:buFont typeface="Arial"/>
-              <a:buChar char="•"/>
-            </a:pPr>
-            <a:r>
-              <a:rPr lang="en-US" dirty="0" smtClean="0"/>
-              <a:t>Industry support</a:t>
-            </a:r>
-          </a:p>
-          <a:p>
-            <a:pPr marL="628650" lvl="1" indent="-171450">
-              <a:buFont typeface="Arial"/>
-              <a:buChar char="•"/>
-            </a:pPr>
-            <a:r>
-              <a:rPr lang="en-US" dirty="0" err="1" smtClean="0"/>
-              <a:t>OAuth</a:t>
-            </a:r>
-            <a:r>
-              <a:rPr lang="en-US" dirty="0" smtClean="0"/>
-              <a:t> 2.0 and </a:t>
-            </a:r>
-            <a:r>
-              <a:rPr lang="en-US" dirty="0" err="1" smtClean="0"/>
-              <a:t>OpenID</a:t>
-            </a:r>
-            <a:r>
-              <a:rPr lang="en-US" dirty="0" smtClean="0"/>
-              <a:t> Connect enjoy wide utilization across the industry, so knowledge of these patterns will help you enable authentication and authorization outside of an Active Directory environment as well</a:t>
-            </a:r>
-            <a:endParaRPr lang="en-US" dirty="0"/>
-          </a:p>
         </p:txBody>
       </p:sp>
       <p:sp>
@@ -1157,96 +1011,157 @@
           <a:bodyPr/>
           <a:lstStyle/>
           <a:p>
+            <a:pPr marL="171450" indent="-171450">
+              <a:buFont typeface="Arial"/>
+              <a:buChar char="•"/>
+            </a:pPr>
             <a:r>
               <a:rPr lang="en-US" dirty="0" smtClean="0"/>
-              <a:t>Azure AD Connect is the best way to connect your on-premises directory with Azure AD and Office 365. This is a great time to upgrade to Azure AD Connect from Windows Azure Active Directory Sync (</a:t>
+              <a:t>Simplicity and consistency</a:t>
+            </a:r>
+          </a:p>
+          <a:p>
+            <a:pPr marL="628650" lvl="1" indent="-171450">
+              <a:buFont typeface="Arial"/>
+              <a:buChar char="•"/>
+            </a:pPr>
+            <a:r>
+              <a:rPr lang="en-US" dirty="0" smtClean="0"/>
+              <a:t>Use the same set of APIs and patterns to enable sign on for:</a:t>
+            </a:r>
+          </a:p>
+          <a:p>
+            <a:pPr marL="1085850" lvl="2" indent="-171450">
+              <a:buFont typeface="Arial"/>
+              <a:buChar char="•"/>
+            </a:pPr>
+            <a:r>
+              <a:rPr lang="en-US" dirty="0" smtClean="0"/>
+              <a:t>multiple types of applications (server, desktop, mobile, browser)</a:t>
+            </a:r>
+          </a:p>
+          <a:p>
+            <a:pPr marL="1085850" lvl="2" indent="-171450">
+              <a:buFont typeface="Arial"/>
+              <a:buChar char="•"/>
+            </a:pPr>
+            <a:r>
+              <a:rPr lang="en-US" dirty="0" smtClean="0"/>
+              <a:t>multiple platforms (android, </a:t>
             </a:r>
             <a:r>
               <a:rPr lang="en-US" dirty="0" err="1" smtClean="0"/>
-              <a:t>DirSync</a:t>
+              <a:t>iOS</a:t>
             </a:r>
             <a:r>
               <a:rPr lang="en-US" dirty="0" smtClean="0"/>
-              <a:t>) or Azure AD Sync as these tools are now deprecated and will reach end of support on April 13, 2017.</a:t>
-            </a:r>
-          </a:p>
-          <a:p>
-            <a:endParaRPr lang="en-US" dirty="0" smtClean="0"/>
-          </a:p>
-          <a:p>
+              <a:t>, Windows)</a:t>
+            </a:r>
+          </a:p>
+          <a:p>
+            <a:pPr marL="1085850" lvl="2" indent="-171450">
+              <a:buFont typeface="Arial"/>
+              <a:buChar char="•"/>
+            </a:pPr>
             <a:r>
               <a:rPr lang="en-US" dirty="0" smtClean="0"/>
-              <a:t>Azure AD Connect will integrate your on-premises directories with Azure Active Directory. This allows you to provide a common identity for your users for Office 365, Azure, and </a:t>
-            </a:r>
+              <a:t>applications inside the corporate network or hosted in the cloud</a:t>
+            </a:r>
+          </a:p>
+          <a:p>
+            <a:pPr marL="628650" lvl="1" indent="-171450">
+              <a:buFont typeface="Arial"/>
+              <a:buChar char="•"/>
+            </a:pPr>
+            <a:r>
+              <a:rPr lang="en-US" dirty="0" smtClean="0"/>
+              <a:t>Use the same set of libraries you can already use to authenticate users against Azure AD</a:t>
+            </a:r>
+          </a:p>
+          <a:p>
+            <a:pPr marL="171450" indent="-171450">
+              <a:buFont typeface="Arial"/>
+              <a:buChar char="•"/>
+            </a:pPr>
+            <a:r>
+              <a:rPr lang="en-US" dirty="0" smtClean="0"/>
+              <a:t>Flexibility</a:t>
+            </a:r>
+          </a:p>
+          <a:p>
+            <a:pPr marL="628650" lvl="1" indent="-171450">
+              <a:buFont typeface="Arial"/>
+              <a:buChar char="•"/>
+            </a:pPr>
+            <a:r>
+              <a:rPr lang="en-US" dirty="0" smtClean="0"/>
+              <a:t>In addition to standard user authorization, enable more complex scenarios such as:</a:t>
+            </a:r>
+          </a:p>
+          <a:p>
+            <a:pPr marL="1085850" lvl="2" indent="-171450">
+              <a:buFont typeface="Arial"/>
+              <a:buChar char="•"/>
+            </a:pPr>
+            <a:r>
+              <a:rPr lang="en-US" dirty="0" smtClean="0"/>
+              <a:t>3-legged sign on flows in which a user authorizes one web application or service to access resources that reside with another web app or service.</a:t>
+            </a:r>
+          </a:p>
+          <a:p>
+            <a:pPr marL="1085850" lvl="2" indent="-171450">
+              <a:buFont typeface="Arial"/>
+              <a:buChar char="•"/>
+            </a:pPr>
+            <a:r>
+              <a:rPr lang="en-US" dirty="0" smtClean="0"/>
+              <a:t>Server-to-server flows in which a mid-tier service accesses a back end API</a:t>
+            </a:r>
+          </a:p>
+          <a:p>
+            <a:pPr marL="1085850" lvl="2" indent="-171450">
+              <a:buFont typeface="Arial"/>
+              <a:buChar char="•"/>
+            </a:pPr>
+            <a:r>
+              <a:rPr lang="en-US" dirty="0" smtClean="0"/>
+              <a:t>JavaScript based single-page applications (SPA)</a:t>
+            </a:r>
+          </a:p>
+          <a:p>
+            <a:pPr marL="171450" indent="-171450">
+              <a:buFont typeface="Arial"/>
+              <a:buChar char="•"/>
+            </a:pPr>
+            <a:r>
+              <a:rPr lang="en-US" dirty="0" smtClean="0"/>
+              <a:t>Industry support</a:t>
+            </a:r>
+          </a:p>
+          <a:p>
+            <a:pPr marL="628650" lvl="1" indent="-171450">
+              <a:buFont typeface="Arial"/>
+              <a:buChar char="•"/>
+            </a:pPr>
             <a:r>
               <a:rPr lang="en-US" dirty="0" err="1" smtClean="0"/>
-              <a:t>SaaS</a:t>
+              <a:t>OAuth</a:t>
             </a:r>
             <a:r>
               <a:rPr lang="en-US" dirty="0" smtClean="0"/>
-              <a:t> applications integrated with Azure AD. This topic will guide you through the planning, deployment, and operation steps. It is a collection of links to the topics related to this area.</a:t>
-            </a:r>
-          </a:p>
-          <a:p>
-            <a:endParaRPr lang="en-US" dirty="0" smtClean="0"/>
-          </a:p>
-          <a:p>
+              <a:t> 2.0 and </a:t>
+            </a:r>
+            <a:r>
+              <a:rPr lang="en-US" dirty="0" err="1" smtClean="0"/>
+              <a:t>OpenID</a:t>
+            </a:r>
             <a:r>
               <a:rPr lang="en-US" dirty="0" smtClean="0"/>
-              <a:t>https://</a:t>
-            </a:r>
-            <a:r>
-              <a:rPr lang="en-US" dirty="0" err="1" smtClean="0"/>
-              <a:t>docs.microsoft.com</a:t>
-            </a:r>
-            <a:r>
-              <a:rPr lang="en-US" dirty="0" smtClean="0"/>
-              <a:t>/en-us/azure/active-directory/active-directory-hybrid-identity-design-considerations-tools-comparison</a:t>
-            </a:r>
-          </a:p>
-          <a:p>
-            <a:endParaRPr lang="en-US" dirty="0" smtClean="0"/>
-          </a:p>
-          <a:p>
-            <a:r>
-              <a:rPr lang="en-US" b="1" i="1" dirty="0" smtClean="0"/>
-              <a:t>DEMO: AD</a:t>
-            </a:r>
-            <a:r>
-              <a:rPr lang="en-US" b="1" i="1" baseline="0" dirty="0" smtClean="0"/>
-              <a:t> Connect Basic Configuration and Forced Sync using </a:t>
-            </a:r>
-            <a:r>
-              <a:rPr lang="en-US" b="1" i="1" baseline="0" dirty="0" err="1" smtClean="0"/>
-              <a:t>Powershell</a:t>
-            </a:r>
-            <a:endParaRPr lang="en-US" b="1" i="1" baseline="0" dirty="0" smtClean="0"/>
-          </a:p>
-          <a:p>
-            <a:endParaRPr lang="en-US" b="1" i="1" baseline="0" dirty="0" smtClean="0"/>
-          </a:p>
-          <a:p>
-            <a:r>
-              <a:rPr lang="en-US" b="0" i="0" dirty="0" smtClean="0"/>
-              <a:t>https://</a:t>
-            </a:r>
-            <a:r>
-              <a:rPr lang="en-US" b="0" i="0" dirty="0" err="1" smtClean="0"/>
-              <a:t>docs.microsoft.com</a:t>
-            </a:r>
-            <a:r>
-              <a:rPr lang="en-US" b="0" i="0" dirty="0" smtClean="0"/>
-              <a:t>/en-us/azure/active-directory/connect/active-directory-</a:t>
-            </a:r>
-            <a:r>
-              <a:rPr lang="en-US" b="0" i="0" dirty="0" err="1" smtClean="0"/>
-              <a:t>aadconnectsync</a:t>
-            </a:r>
-            <a:r>
-              <a:rPr lang="en-US" b="0" i="0" dirty="0" smtClean="0"/>
-              <a:t>-feature-scheduler</a:t>
-            </a:r>
-            <a:endParaRPr lang="en-US" b="0" i="0" dirty="0"/>
+              <a:t> Connect enjoy wide utilization across the industry, so knowledge of these patterns will help you enable authentication and authorization outside of an Active Directory environment as well</a:t>
+            </a:r>
+          </a:p>
+          <a:p>
+            <a:endParaRPr lang="en-US" dirty="0"/>
           </a:p>
         </p:txBody>
       </p:sp>
@@ -1331,66 +1246,93 @@
           <a:lstStyle/>
           <a:p>
             <a:r>
+              <a:rPr lang="en-US" dirty="0" smtClean="0"/>
+              <a:t>Azure AD Connect is the best way to connect your on-premises directory with Azure AD and Office 365. This is a great time to upgrade to Azure AD Connect from Windows Azure Active Directory Sync (</a:t>
+            </a:r>
+            <a:r>
+              <a:rPr lang="en-US" dirty="0" err="1" smtClean="0"/>
+              <a:t>DirSync</a:t>
+            </a:r>
+            <a:r>
+              <a:rPr lang="en-US" dirty="0" smtClean="0"/>
+              <a:t>) or Azure AD Sync as these tools are now deprecated and will reach end of support on April 13, 2017.</a:t>
+            </a:r>
+          </a:p>
+          <a:p>
+            <a:endParaRPr lang="en-US" dirty="0" smtClean="0"/>
+          </a:p>
+          <a:p>
+            <a:r>
+              <a:rPr lang="en-US" dirty="0" smtClean="0"/>
+              <a:t>Azure AD Connect will integrate your on-premises directories with Azure Active Directory. This allows you to provide a common identity for your users for Office 365, Azure, and </a:t>
+            </a:r>
+            <a:r>
+              <a:rPr lang="en-US" dirty="0" err="1" smtClean="0"/>
+              <a:t>SaaS</a:t>
+            </a:r>
+            <a:r>
+              <a:rPr lang="en-US" dirty="0" smtClean="0"/>
+              <a:t> applications integrated with Azure AD. This topic will guide you through the planning, deployment, and operation steps. It is a collection of links to the topics related to this area.</a:t>
+            </a:r>
+          </a:p>
+          <a:p>
+            <a:endParaRPr lang="en-US" dirty="0" smtClean="0"/>
+          </a:p>
+          <a:p>
+            <a:r>
+              <a:rPr lang="en-US" dirty="0" smtClean="0"/>
+              <a:t>https://</a:t>
+            </a:r>
+            <a:r>
+              <a:rPr lang="en-US" dirty="0" err="1" smtClean="0"/>
+              <a:t>docs.microsoft.com</a:t>
+            </a:r>
+            <a:r>
+              <a:rPr lang="en-US" dirty="0" smtClean="0"/>
+              <a:t>/en-us/azure/active-directory/active-directory-hybrid-identity-design-considerations-tools-comparison</a:t>
+            </a:r>
+          </a:p>
+          <a:p>
+            <a:endParaRPr lang="en-US" dirty="0" smtClean="0"/>
+          </a:p>
+          <a:p>
+            <a:r>
+              <a:rPr lang="en-US" b="1" i="1" dirty="0" smtClean="0"/>
+              <a:t>DEMO: AD</a:t>
+            </a:r>
+            <a:r>
+              <a:rPr lang="en-US" b="1" i="1" baseline="0" dirty="0" smtClean="0"/>
+              <a:t> Connect Basic Configuration and Forced Sync using </a:t>
+            </a:r>
+            <a:r>
+              <a:rPr lang="en-US" b="1" i="1" baseline="0" dirty="0" err="1" smtClean="0"/>
+              <a:t>Powershell</a:t>
+            </a:r>
+            <a:endParaRPr lang="en-US" b="1" i="1" baseline="0" dirty="0" smtClean="0"/>
+          </a:p>
+          <a:p>
+            <a:endParaRPr lang="en-US" b="1" i="1" baseline="0" dirty="0" smtClean="0"/>
+          </a:p>
+          <a:p>
+            <a:r>
               <a:rPr lang="en-US" b="0" i="0" dirty="0" smtClean="0"/>
-              <a:t>Azure Active Directory Seamless Single Sign On (Azure AD Seamless SSO) provides true single sign on for users signing in on their corporate desktops connected on the corporate network. When enabled, users won't need to type in their passwords to sign in to Azure AD, and in most cases, even type in their usernames. This feature provides your users easy access to your cloud-based services without needing any additional on-premises components.</a:t>
-            </a:r>
-          </a:p>
-          <a:p>
-            <a:endParaRPr lang="en-US" b="0" i="0" dirty="0" smtClean="0"/>
-          </a:p>
-          <a:p>
+              <a:t>https://</a:t>
+            </a:r>
+            <a:r>
+              <a:rPr lang="en-US" b="0" i="0" dirty="0" err="1" smtClean="0"/>
+              <a:t>docs.microsoft.com</a:t>
+            </a:r>
             <a:r>
               <a:rPr lang="en-US" b="0" i="0" dirty="0" smtClean="0"/>
-              <a:t>For this feature to work for a specific user, the following conditions need to be met:</a:t>
-            </a:r>
-          </a:p>
-          <a:p>
-            <a:pPr marL="171450" indent="-171450">
-              <a:buFont typeface="Arial"/>
-              <a:buChar char="•"/>
-            </a:pPr>
+              <a:t>/en-us/azure/active-directory/connect/active-directory-</a:t>
+            </a:r>
+            <a:r>
+              <a:rPr lang="en-US" b="0" i="0" dirty="0" err="1" smtClean="0"/>
+              <a:t>aadconnectsync</a:t>
+            </a:r>
             <a:r>
               <a:rPr lang="en-US" b="0" i="0" dirty="0" smtClean="0"/>
-              <a:t>Your user is signing in on a corporate desktop.</a:t>
-            </a:r>
-          </a:p>
-          <a:p>
-            <a:pPr marL="171450" indent="-171450">
-              <a:buFont typeface="Arial"/>
-              <a:buChar char="•"/>
-            </a:pPr>
-            <a:r>
-              <a:rPr lang="en-US" b="0" i="0" dirty="0" smtClean="0"/>
-              <a:t>The desktop has been previously joined to your Active Directory (AD) domain.</a:t>
-            </a:r>
-          </a:p>
-          <a:p>
-            <a:pPr marL="171450" indent="-171450">
-              <a:buFont typeface="Arial"/>
-              <a:buChar char="•"/>
-            </a:pPr>
-            <a:r>
-              <a:rPr lang="en-US" b="0" i="0" dirty="0" smtClean="0"/>
-              <a:t>The desktop has a direct connection to your Domain Controller (DC), either on the corporate wired or wireless network or via a remote access connection, such as a VPN connection.</a:t>
-            </a:r>
-          </a:p>
-          <a:p>
-            <a:pPr marL="171450" indent="-171450">
-              <a:buFont typeface="Arial"/>
-              <a:buChar char="•"/>
-            </a:pPr>
-            <a:r>
-              <a:rPr lang="en-US" b="0" i="0" dirty="0" smtClean="0"/>
-              <a:t>Our service endpoints have been included to the browser's Intranet zone.</a:t>
-            </a:r>
-          </a:p>
-          <a:p>
-            <a:endParaRPr lang="en-US" b="0" i="0" dirty="0" smtClean="0"/>
-          </a:p>
-          <a:p>
-            <a:r>
-              <a:rPr lang="en-US" b="0" i="0" dirty="0" smtClean="0"/>
-              <a:t>If any of the above conditions are not met, then the user will be prompted to enter their username and password as before.</a:t>
+              <a:t>-feature-scheduler</a:t>
             </a:r>
             <a:endParaRPr lang="en-US" b="0" i="0" dirty="0"/>
           </a:p>
@@ -1477,9 +1419,14 @@
           <a:lstStyle/>
           <a:p>
             <a:r>
-              <a:rPr lang="en-US" dirty="0"/>
-              <a:t>Azure AD B2B is a feature of Azure AD called Azure AD B2B collaboration</a:t>
-            </a:r>
+              <a:rPr lang="en-US" b="0" i="0" dirty="0" smtClean="0"/>
+              <a:t>Azure Active Directory Seamless Single Sign On (Azure AD Seamless SSO) provides true single sign on for users signing in on their corporate desktops connected on the corporate network. When enabled, users won't need to type in their passwords to sign in to Azure AD, and in most cases, even type in their usernames. This feature provides your users easy access to your cloud-based services without needing any additional on-premises components</a:t>
+            </a:r>
+            <a:r>
+              <a:rPr lang="en-US" b="0" i="0" dirty="0" smtClean="0"/>
+              <a:t>.</a:t>
+            </a:r>
+            <a:endParaRPr lang="en-US" b="0" i="0" dirty="0" smtClean="0"/>
           </a:p>
         </p:txBody>
       </p:sp>
@@ -1500,7 +1447,7 @@
           <a:p>
             <a:fld id="{3C6E4902-292F-4370-AFC1-6D92B180E54E}" type="slidenum">
               <a:rPr lang="en-US" smtClean="0"/>
-              <a:t>21</a:t>
+              <a:t>20</a:t>
             </a:fld>
             <a:endParaRPr lang="en-US"/>
           </a:p>
@@ -1509,7 +1456,7 @@
     </p:spTree>
     <p:extLst>
       <p:ext uri="{BB962C8B-B14F-4D97-AF65-F5344CB8AC3E}">
-        <p14:creationId xmlns:p14="http://schemas.microsoft.com/office/powerpoint/2010/main" val="1173738846"/>
+        <p14:creationId xmlns:p14="http://schemas.microsoft.com/office/powerpoint/2010/main" val="904175835"/>
       </p:ext>
     </p:extLst>
   </p:cSld>
@@ -1563,153 +1510,65 @@
           <a:bodyPr/>
           <a:lstStyle/>
           <a:p>
-            <a:r>
-              <a:rPr lang="en-US" dirty="0"/>
-              <a:t>Implement Azure AD B2B</a:t>
+            <a:endParaRPr lang="en-US" b="0" i="0" dirty="0" smtClean="0"/>
+          </a:p>
+          <a:p>
+            <a:r>
+              <a:rPr lang="en-US" b="0" i="0" dirty="0" smtClean="0"/>
+              <a:t>For this feature to work for a specific user, the following conditions need to be met:</a:t>
+            </a:r>
+          </a:p>
+          <a:p>
+            <a:pPr marL="171450" indent="-171450">
+              <a:buFont typeface="Arial"/>
+              <a:buChar char="•"/>
+            </a:pPr>
+            <a:r>
+              <a:rPr lang="en-US" b="0" i="0" dirty="0" smtClean="0"/>
+              <a:t>Your user is signing in on a corporate desktop.</a:t>
+            </a:r>
+          </a:p>
+          <a:p>
+            <a:pPr marL="171450" indent="-171450">
+              <a:buFont typeface="Arial"/>
+              <a:buChar char="•"/>
+            </a:pPr>
+            <a:r>
+              <a:rPr lang="en-US" b="0" i="0" dirty="0" smtClean="0"/>
+              <a:t>The desktop has been previously joined to your Active Directory (AD) domain.</a:t>
+            </a:r>
+          </a:p>
+          <a:p>
+            <a:pPr marL="171450" indent="-171450">
+              <a:buFont typeface="Arial"/>
+              <a:buChar char="•"/>
+            </a:pPr>
+            <a:r>
+              <a:rPr lang="en-US" b="0" i="0" dirty="0" smtClean="0"/>
+              <a:t>The desktop has a direct connection to your Domain Controller (DC), either on the corporate wired or wireless network or via a remote access connection, such as a VPN connection.</a:t>
+            </a:r>
+          </a:p>
+          <a:p>
+            <a:pPr marL="171450" indent="-171450">
+              <a:buFont typeface="Arial"/>
+              <a:buChar char="•"/>
+            </a:pPr>
+            <a:r>
+              <a:rPr lang="en-US" b="0" i="0" dirty="0" smtClean="0"/>
+              <a:t>Our service endpoints have been included to the browser's Intranet zone.</a:t>
+            </a:r>
+          </a:p>
+          <a:p>
+            <a:endParaRPr lang="en-US" b="0" i="0" dirty="0" smtClean="0"/>
+          </a:p>
+          <a:p>
+            <a:r>
+              <a:rPr lang="en-US" b="0" i="0" dirty="0" smtClean="0"/>
+              <a:t>If any of the above conditions are not met, then the user will be prompted to enter their username and password as before.</a:t>
             </a:r>
           </a:p>
           <a:p>
             <a:endParaRPr lang="en-US" dirty="0"/>
-          </a:p>
-          <a:p>
-            <a:pPr marL="0" marR="0" lvl="0" indent="0" algn="l" defTabSz="914400" rtl="0" eaLnBrk="1" fontAlgn="auto" latinLnBrk="0" hangingPunct="1">
-              <a:lnSpc>
-                <a:spcPct val="100000"/>
-              </a:lnSpc>
-              <a:spcBef>
-                <a:spcPts val="0"/>
-              </a:spcBef>
-              <a:spcAft>
-                <a:spcPts val="0"/>
-              </a:spcAft>
-              <a:buClrTx/>
-              <a:buSzTx/>
-              <a:buFontTx/>
-              <a:buNone/>
-              <a:tabLst/>
-              <a:defRPr/>
-            </a:pPr>
-            <a:r>
-              <a:rPr lang="en-US" sz="1200" b="0" i="0" kern="1200" dirty="0">
-                <a:solidFill>
-                  <a:schemeClr val="tx1"/>
-                </a:solidFill>
-                <a:effectLst/>
-                <a:latin typeface="+mn-lt"/>
-                <a:ea typeface="+mn-ea"/>
-                <a:cs typeface="+mn-cs"/>
-              </a:rPr>
-              <a:t>What is Azure AD B2B collaboration?</a:t>
-            </a:r>
-          </a:p>
-          <a:p>
-            <a:r>
-              <a:rPr lang="en-US" dirty="0"/>
-              <a:t>https://docs.microsoft.com/en-us/azure/active-directory/active-directory-b2b-what-is-azure-ad-b2b</a:t>
-            </a:r>
-          </a:p>
-          <a:p>
-            <a:endParaRPr lang="en-US" dirty="0"/>
-          </a:p>
-          <a:p>
-            <a:pPr marL="0" marR="0" lvl="0" indent="0" algn="l" defTabSz="914400" rtl="0" eaLnBrk="1" fontAlgn="auto" latinLnBrk="0" hangingPunct="1">
-              <a:lnSpc>
-                <a:spcPct val="100000"/>
-              </a:lnSpc>
-              <a:spcBef>
-                <a:spcPts val="0"/>
-              </a:spcBef>
-              <a:spcAft>
-                <a:spcPts val="0"/>
-              </a:spcAft>
-              <a:buClrTx/>
-              <a:buSzTx/>
-              <a:buFontTx/>
-              <a:buNone/>
-              <a:tabLst/>
-              <a:defRPr/>
-            </a:pPr>
-            <a:r>
-              <a:rPr lang="en-US" sz="1200" b="0" i="0" kern="1200" dirty="0">
-                <a:solidFill>
-                  <a:schemeClr val="tx1"/>
-                </a:solidFill>
-                <a:effectLst/>
-                <a:latin typeface="+mn-lt"/>
-                <a:ea typeface="+mn-ea"/>
-                <a:cs typeface="+mn-cs"/>
-              </a:rPr>
-              <a:t>Properties of an Azure Active Directory B2B collaboration user</a:t>
-            </a:r>
-          </a:p>
-          <a:p>
-            <a:r>
-              <a:rPr lang="en-US" dirty="0"/>
-              <a:t>https://docs.microsoft.com/en-us/azure/active-directory/active-directory-b2b-user-properties</a:t>
-            </a:r>
-          </a:p>
-          <a:p>
-            <a:endParaRPr lang="en-US" dirty="0"/>
-          </a:p>
-          <a:p>
-            <a:pPr marL="0" marR="0" lvl="0" indent="0" algn="l" defTabSz="914400" rtl="0" eaLnBrk="1" fontAlgn="auto" latinLnBrk="0" hangingPunct="1">
-              <a:lnSpc>
-                <a:spcPct val="100000"/>
-              </a:lnSpc>
-              <a:spcBef>
-                <a:spcPts val="0"/>
-              </a:spcBef>
-              <a:spcAft>
-                <a:spcPts val="0"/>
-              </a:spcAft>
-              <a:buClrTx/>
-              <a:buSzTx/>
-              <a:buFontTx/>
-              <a:buNone/>
-              <a:tabLst/>
-              <a:defRPr/>
-            </a:pPr>
-            <a:r>
-              <a:rPr lang="en-US" sz="1200" b="0" i="0" kern="1200" dirty="0">
-                <a:solidFill>
-                  <a:schemeClr val="tx1"/>
-                </a:solidFill>
-                <a:effectLst/>
-                <a:latin typeface="+mn-lt"/>
-                <a:ea typeface="+mn-ea"/>
-                <a:cs typeface="+mn-cs"/>
-              </a:rPr>
-              <a:t>Azure Active Directory B2B collaboration API and customization</a:t>
-            </a:r>
-          </a:p>
-          <a:p>
-            <a:r>
-              <a:rPr lang="en-US" dirty="0"/>
-              <a:t>https://docs.microsoft.com/en-us/azure/active-directory/active-directory-b2b-api</a:t>
-            </a:r>
-          </a:p>
-          <a:p>
-            <a:endParaRPr lang="en-US" dirty="0"/>
-          </a:p>
-          <a:p>
-            <a:r>
-              <a:rPr lang="en-US" sz="1200" b="0" i="0" kern="1200" dirty="0">
-                <a:solidFill>
-                  <a:schemeClr val="tx1"/>
-                </a:solidFill>
-                <a:effectLst/>
-                <a:latin typeface="+mn-lt"/>
-                <a:ea typeface="+mn-ea"/>
-                <a:cs typeface="+mn-cs"/>
-              </a:rPr>
-              <a:t>Demonstration/prototype of B2B self-service signup, signup approvals, and profile editing.</a:t>
-            </a:r>
-          </a:p>
-          <a:p>
-            <a:r>
-              <a:rPr lang="en-US" dirty="0"/>
-              <a:t>https://github.com/Azure/active-directory-dotnet-graphapi-b2bportal-web</a:t>
-            </a:r>
           </a:p>
         </p:txBody>
       </p:sp>
@@ -1730,7 +1589,7 @@
           <a:p>
             <a:fld id="{3C6E4902-292F-4370-AFC1-6D92B180E54E}" type="slidenum">
               <a:rPr lang="en-US" smtClean="0"/>
-              <a:t>22</a:t>
+              <a:t>21</a:t>
             </a:fld>
             <a:endParaRPr lang="en-US"/>
           </a:p>
@@ -1793,45 +1652,6 @@
           <a:bodyPr/>
           <a:lstStyle/>
           <a:p>
-            <a:r>
-              <a:rPr lang="en-US" dirty="0"/>
-              <a:t>Manage Identity and access by using Azure AD B2C</a:t>
-            </a:r>
-          </a:p>
-          <a:p>
-            <a:endParaRPr lang="en-US" dirty="0"/>
-          </a:p>
-          <a:p>
-            <a:r>
-              <a:rPr lang="en-US" b="1" dirty="0"/>
-              <a:t>Azure Active Directory B2C: Enable Multi-Factor Authentication in your consumer-facing applications</a:t>
-            </a:r>
-          </a:p>
-          <a:p>
-            <a:r>
-              <a:rPr lang="en-US" dirty="0"/>
-              <a:t>https://docs.microsoft.com/en-us/azure/active-directory-b2c/active-directory-b2c-reference-mfa</a:t>
-            </a:r>
-          </a:p>
-          <a:p>
-            <a:endParaRPr lang="en-US" dirty="0"/>
-          </a:p>
-          <a:p>
-            <a:r>
-              <a:rPr lang="en-US" b="1" dirty="0"/>
-              <a:t>Azure Active Directory B2C: Create an Azure AD B2C tenant</a:t>
-            </a:r>
-          </a:p>
-          <a:p>
-            <a:r>
-              <a:rPr lang="en-US" dirty="0"/>
-              <a:t>https://docs.microsoft.com/en-us/azure/active-directory-b2c/active-directory-b2c-get-started</a:t>
-            </a:r>
-          </a:p>
-          <a:p>
-            <a:endParaRPr lang="en-US" dirty="0"/>
-          </a:p>
-          <a:p>
             <a:pPr marL="0" marR="0" lvl="0" indent="0" algn="l" defTabSz="914400" rtl="0" eaLnBrk="1" fontAlgn="auto" latinLnBrk="0" hangingPunct="1">
               <a:lnSpc>
                 <a:spcPct val="100000"/>
@@ -1850,7 +1670,7 @@
               <a:defRPr/>
             </a:pPr>
             <a:r>
-              <a:rPr lang="en-US" sz="1200" b="1" i="0" kern="1200" dirty="0">
+              <a:rPr lang="en-US" sz="1200" b="0" i="0" kern="1200" dirty="0">
                 <a:solidFill>
                   <a:schemeClr val="tx1"/>
                 </a:solidFill>
@@ -1859,17 +1679,14 @@
                 <a:ea typeface="+mn-ea"/>
                 <a:cs typeface="+mn-cs"/>
               </a:rPr>
-              <a:t>Azure AD B2C: Focus on your app, let us worry about sign-up and sign-in</a:t>
-            </a:r>
-          </a:p>
-          <a:p>
-            <a:r>
-              <a:rPr lang="en-US" dirty="0"/>
-              <a:t>https://docs.microsoft.com/en-us/azure/active-directory-b2c/active-directory-b2c-overview</a:t>
-            </a:r>
-          </a:p>
-          <a:p>
-            <a:endParaRPr lang="en-US" dirty="0"/>
+              <a:t>The future of Azure ACS is Azure Active Directory</a:t>
+            </a:r>
+          </a:p>
+          <a:p>
+            <a:r>
+              <a:rPr lang="en-US" dirty="0"/>
+              <a:t>https://blogs.technet.microsoft.com/enterprisemobility/2015/02/12/the-future-of-azure-acs-is-azure-active-directory/</a:t>
+            </a:r>
           </a:p>
         </p:txBody>
       </p:sp>
@@ -1899,7 +1716,7 @@
     </p:spTree>
     <p:extLst>
       <p:ext uri="{BB962C8B-B14F-4D97-AF65-F5344CB8AC3E}">
-        <p14:creationId xmlns:p14="http://schemas.microsoft.com/office/powerpoint/2010/main" val="1969784615"/>
+        <p14:creationId xmlns:p14="http://schemas.microsoft.com/office/powerpoint/2010/main" val="2320474319"/>
       </p:ext>
     </p:extLst>
   </p:cSld>
@@ -1955,41 +1772,8 @@
           <a:p>
             <a:r>
               <a:rPr lang="en-US" dirty="0"/>
-              <a:t>Provide access to resources using identity providers, such as Microsoft Account, Facebook, Google and Yahoo!</a:t>
-            </a:r>
-          </a:p>
-          <a:p>
-            <a:endParaRPr lang="en-US" dirty="0"/>
-          </a:p>
-          <a:p>
-            <a:r>
-              <a:rPr lang="en-US" b="1" dirty="0"/>
-              <a:t>Azure AD B2C: Focus on your app, let us worry about sign-up and sign-in</a:t>
-            </a:r>
-          </a:p>
-          <a:p>
-            <a:r>
-              <a:rPr lang="en-US" dirty="0"/>
-              <a:t>https://docs.microsoft.com/en-us/azure/active-directory-b2c/active-directory-b2c-overview</a:t>
-            </a:r>
-          </a:p>
-          <a:p>
-            <a:endParaRPr lang="en-US" dirty="0"/>
-          </a:p>
-          <a:p>
-            <a:r>
-              <a:rPr lang="en-US" b="1" dirty="0"/>
-              <a:t>Azure Active Directory B2C: Provide sign-up and sign-in to consumers with Microsoft accounts</a:t>
-            </a:r>
-          </a:p>
-          <a:p>
-            <a:r>
-              <a:rPr lang="en-US" dirty="0"/>
-              <a:t>https://docs.microsoft.com/en-us/azure/active-directory-b2c/active-directory-b2c-setup-msa-app</a:t>
-            </a:r>
-          </a:p>
-          <a:p>
-            <a:endParaRPr lang="en-US" dirty="0"/>
+              <a:t>Azure AD B2B is a feature of Azure AD called Azure AD B2B collaboration</a:t>
+            </a:r>
           </a:p>
         </p:txBody>
       </p:sp>
@@ -2010,7 +1794,7 @@
           <a:p>
             <a:fld id="{3C6E4902-292F-4370-AFC1-6D92B180E54E}" type="slidenum">
               <a:rPr lang="en-US" smtClean="0"/>
-              <a:t>25</a:t>
+              <a:t>26</a:t>
             </a:fld>
             <a:endParaRPr lang="en-US"/>
           </a:p>
@@ -2019,7 +1803,7 @@
     </p:spTree>
     <p:extLst>
       <p:ext uri="{BB962C8B-B14F-4D97-AF65-F5344CB8AC3E}">
-        <p14:creationId xmlns:p14="http://schemas.microsoft.com/office/powerpoint/2010/main" val="4062531117"/>
+        <p14:creationId xmlns:p14="http://schemas.microsoft.com/office/powerpoint/2010/main" val="1173738846"/>
       </p:ext>
     </p:extLst>
   </p:cSld>
@@ -2073,6 +1857,15 @@
           <a:bodyPr/>
           <a:lstStyle/>
           <a:p>
+            <a:r>
+              <a:rPr lang="en-US" dirty="0"/>
+              <a:t>Implement Azure AD B2B</a:t>
+            </a:r>
+          </a:p>
+          <a:p>
+            <a:endParaRPr lang="en-US" dirty="0"/>
+          </a:p>
+          <a:p>
             <a:pPr marL="0" marR="0" lvl="0" indent="0" algn="l" defTabSz="914400" rtl="0" eaLnBrk="1" fontAlgn="auto" latinLnBrk="0" hangingPunct="1">
               <a:lnSpc>
                 <a:spcPct val="100000"/>
@@ -2100,13 +1893,116 @@
                 <a:ea typeface="+mn-ea"/>
                 <a:cs typeface="+mn-cs"/>
               </a:rPr>
-              <a:t>The future of Azure ACS is Azure Active Directory</a:t>
-            </a:r>
-          </a:p>
-          <a:p>
-            <a:r>
-              <a:rPr lang="en-US" dirty="0"/>
-              <a:t>https://blogs.technet.microsoft.com/enterprisemobility/2015/02/12/the-future-of-azure-acs-is-azure-active-directory/</a:t>
+              <a:t>What is Azure AD B2B collaboration?</a:t>
+            </a:r>
+          </a:p>
+          <a:p>
+            <a:r>
+              <a:rPr lang="en-US" dirty="0"/>
+              <a:t>https://docs.microsoft.com/en-us/azure/active-directory/active-directory-b2b-what-is-azure-ad-b2b</a:t>
+            </a:r>
+          </a:p>
+          <a:p>
+            <a:endParaRPr lang="en-US" dirty="0"/>
+          </a:p>
+          <a:p>
+            <a:pPr marL="0" marR="0" lvl="0" indent="0" algn="l" defTabSz="914400" rtl="0" eaLnBrk="1" fontAlgn="auto" latinLnBrk="0" hangingPunct="1">
+              <a:lnSpc>
+                <a:spcPct val="100000"/>
+              </a:lnSpc>
+              <a:spcBef>
+                <a:spcPts val="0"/>
+              </a:spcBef>
+              <a:spcAft>
+                <a:spcPts val="0"/>
+              </a:spcAft>
+              <a:buClrTx/>
+              <a:buSzTx/>
+              <a:buFontTx/>
+              <a:buNone/>
+              <a:tabLst/>
+              <a:defRPr/>
+            </a:pPr>
+            <a:r>
+              <a:rPr lang="en-US" sz="1200" b="0" i="0" kern="1200" dirty="0">
+                <a:solidFill>
+                  <a:schemeClr val="tx1"/>
+                </a:solidFill>
+                <a:effectLst/>
+                <a:latin typeface="+mn-lt"/>
+                <a:ea typeface="+mn-ea"/>
+                <a:cs typeface="+mn-cs"/>
+              </a:rPr>
+              <a:t>Properties of an Azure Active Directory B2B collaboration user</a:t>
+            </a:r>
+          </a:p>
+          <a:p>
+            <a:r>
+              <a:rPr lang="en-US" dirty="0"/>
+              <a:t>https://docs.microsoft.com/en-us/azure/active-directory/active-directory-b2b-user-properties</a:t>
+            </a:r>
+          </a:p>
+          <a:p>
+            <a:endParaRPr lang="en-US" dirty="0"/>
+          </a:p>
+          <a:p>
+            <a:pPr marL="0" marR="0" lvl="0" indent="0" algn="l" defTabSz="914400" rtl="0" eaLnBrk="1" fontAlgn="auto" latinLnBrk="0" hangingPunct="1">
+              <a:lnSpc>
+                <a:spcPct val="100000"/>
+              </a:lnSpc>
+              <a:spcBef>
+                <a:spcPts val="0"/>
+              </a:spcBef>
+              <a:spcAft>
+                <a:spcPts val="0"/>
+              </a:spcAft>
+              <a:buClrTx/>
+              <a:buSzTx/>
+              <a:buFontTx/>
+              <a:buNone/>
+              <a:tabLst/>
+              <a:defRPr/>
+            </a:pPr>
+            <a:r>
+              <a:rPr lang="en-US" sz="1200" b="0" i="0" kern="1200" dirty="0">
+                <a:solidFill>
+                  <a:schemeClr val="tx1"/>
+                </a:solidFill>
+                <a:effectLst/>
+                <a:latin typeface="+mn-lt"/>
+                <a:ea typeface="+mn-ea"/>
+                <a:cs typeface="+mn-cs"/>
+              </a:rPr>
+              <a:t>Azure Active Directory B2B collaboration API and customization</a:t>
+            </a:r>
+          </a:p>
+          <a:p>
+            <a:r>
+              <a:rPr lang="en-US" dirty="0"/>
+              <a:t>https://docs.microsoft.com/en-us/azure/active-directory/active-directory-b2b-api</a:t>
+            </a:r>
+          </a:p>
+          <a:p>
+            <a:endParaRPr lang="en-US" dirty="0"/>
+          </a:p>
+          <a:p>
+            <a:r>
+              <a:rPr lang="en-US" sz="1200" b="0" i="0" kern="1200" dirty="0">
+                <a:solidFill>
+                  <a:schemeClr val="tx1"/>
+                </a:solidFill>
+                <a:effectLst/>
+                <a:latin typeface="+mn-lt"/>
+                <a:ea typeface="+mn-ea"/>
+                <a:cs typeface="+mn-cs"/>
+              </a:rPr>
+              <a:t>Demonstration/prototype of B2B self-service signup, signup approvals, and profile editing.</a:t>
+            </a:r>
+          </a:p>
+          <a:p>
+            <a:r>
+              <a:rPr lang="en-US" dirty="0"/>
+              <a:t>https://github.com/Azure/active-directory-dotnet-graphapi-b2bportal-web</a:t>
             </a:r>
           </a:p>
         </p:txBody>
@@ -2128,7 +2024,7 @@
           <a:p>
             <a:fld id="{3C6E4902-292F-4370-AFC1-6D92B180E54E}" type="slidenum">
               <a:rPr lang="en-US" smtClean="0"/>
-              <a:t>28</a:t>
+              <a:t>27</a:t>
             </a:fld>
             <a:endParaRPr lang="en-US"/>
           </a:p>
@@ -2137,7 +2033,167 @@
     </p:spTree>
     <p:extLst>
       <p:ext uri="{BB962C8B-B14F-4D97-AF65-F5344CB8AC3E}">
-        <p14:creationId xmlns:p14="http://schemas.microsoft.com/office/powerpoint/2010/main" val="2320474319"/>
+        <p14:creationId xmlns:p14="http://schemas.microsoft.com/office/powerpoint/2010/main" val="904175835"/>
+      </p:ext>
+    </p:extLst>
+  </p:cSld>
+  <p:clrMapOvr>
+    <a:masterClrMapping/>
+  </p:clrMapOvr>
+</p:notes>
+</file>
+
+<file path=ppt/notesSlides/notesSlide19.xml><?xml version="1.0" encoding="utf-8"?>
+<p:notes xmlns:a="http://schemas.openxmlformats.org/drawingml/2006/main" xmlns:r="http://schemas.openxmlformats.org/officeDocument/2006/relationships" xmlns:p="http://schemas.openxmlformats.org/presentationml/2006/main">
+  <p:cSld>
+    <p:spTree>
+      <p:nvGrpSpPr>
+        <p:cNvPr id="1" name=""/>
+        <p:cNvGrpSpPr/>
+        <p:nvPr/>
+      </p:nvGrpSpPr>
+      <p:grpSpPr>
+        <a:xfrm>
+          <a:off x="0" y="0"/>
+          <a:ext cx="0" cy="0"/>
+          <a:chOff x="0" y="0"/>
+          <a:chExt cx="0" cy="0"/>
+        </a:xfrm>
+      </p:grpSpPr>
+      <p:sp>
+        <p:nvSpPr>
+          <p:cNvPr id="2" name="Slide Image Placeholder 1"/>
+          <p:cNvSpPr>
+            <a:spLocks noGrp="1" noRot="1" noChangeAspect="1"/>
+          </p:cNvSpPr>
+          <p:nvPr>
+            <p:ph type="sldImg"/>
+          </p:nvPr>
+        </p:nvSpPr>
+        <p:spPr/>
+      </p:sp>
+      <p:sp>
+        <p:nvSpPr>
+          <p:cNvPr id="3" name="Notes Placeholder 2"/>
+          <p:cNvSpPr>
+            <a:spLocks noGrp="1"/>
+          </p:cNvSpPr>
+          <p:nvPr>
+            <p:ph type="body" idx="1"/>
+          </p:nvPr>
+        </p:nvSpPr>
+        <p:spPr/>
+        <p:txBody>
+          <a:bodyPr/>
+          <a:lstStyle/>
+          <a:p>
+            <a:r>
+              <a:rPr lang="en-US" dirty="0"/>
+              <a:t>Manage Identity and access by using Azure AD B2C</a:t>
+            </a:r>
+          </a:p>
+          <a:p>
+            <a:endParaRPr lang="en-US" dirty="0"/>
+          </a:p>
+          <a:p>
+            <a:r>
+              <a:rPr lang="en-US" b="1" dirty="0"/>
+              <a:t>Azure Active Directory B2C: Enable Multi-Factor Authentication in your consumer-facing applications</a:t>
+            </a:r>
+          </a:p>
+          <a:p>
+            <a:r>
+              <a:rPr lang="en-US" dirty="0"/>
+              <a:t>https://docs.microsoft.com/en-us/azure/active-directory-b2c/active-directory-b2c-reference-mfa</a:t>
+            </a:r>
+          </a:p>
+          <a:p>
+            <a:endParaRPr lang="en-US" dirty="0"/>
+          </a:p>
+          <a:p>
+            <a:r>
+              <a:rPr lang="en-US" b="1" dirty="0"/>
+              <a:t>Azure Active Directory B2C: Create an Azure AD B2C tenant</a:t>
+            </a:r>
+          </a:p>
+          <a:p>
+            <a:r>
+              <a:rPr lang="en-US" dirty="0"/>
+              <a:t>https://docs.microsoft.com/en-us/azure/active-directory-b2c/active-directory-b2c-get-started</a:t>
+            </a:r>
+          </a:p>
+          <a:p>
+            <a:endParaRPr lang="en-US" dirty="0"/>
+          </a:p>
+          <a:p>
+            <a:pPr marL="0" marR="0" lvl="0" indent="0" algn="l" defTabSz="914400" rtl="0" eaLnBrk="1" fontAlgn="auto" latinLnBrk="0" hangingPunct="1">
+              <a:lnSpc>
+                <a:spcPct val="100000"/>
+              </a:lnSpc>
+              <a:spcBef>
+                <a:spcPts val="0"/>
+              </a:spcBef>
+              <a:spcAft>
+                <a:spcPts val="0"/>
+              </a:spcAft>
+              <a:buClrTx/>
+              <a:buSzTx/>
+              <a:buFontTx/>
+              <a:buNone/>
+              <a:tabLst/>
+              <a:defRPr/>
+            </a:pPr>
+            <a:r>
+              <a:rPr lang="en-US" sz="1200" b="1" i="0" kern="1200" dirty="0">
+                <a:solidFill>
+                  <a:schemeClr val="tx1"/>
+                </a:solidFill>
+                <a:effectLst/>
+                <a:latin typeface="+mn-lt"/>
+                <a:ea typeface="+mn-ea"/>
+                <a:cs typeface="+mn-cs"/>
+              </a:rPr>
+              <a:t>Azure AD B2C: Focus on your app, let us worry about sign-up and sign-in</a:t>
+            </a:r>
+          </a:p>
+          <a:p>
+            <a:r>
+              <a:rPr lang="en-US" dirty="0"/>
+              <a:t>https://docs.microsoft.com/en-us/azure/active-directory-b2c/active-directory-b2c-overview</a:t>
+            </a:r>
+          </a:p>
+          <a:p>
+            <a:endParaRPr lang="en-US" dirty="0"/>
+          </a:p>
+        </p:txBody>
+      </p:sp>
+      <p:sp>
+        <p:nvSpPr>
+          <p:cNvPr id="4" name="Slide Number Placeholder 3"/>
+          <p:cNvSpPr>
+            <a:spLocks noGrp="1"/>
+          </p:cNvSpPr>
+          <p:nvPr>
+            <p:ph type="sldNum" sz="quarter" idx="10"/>
+          </p:nvPr>
+        </p:nvSpPr>
+        <p:spPr/>
+        <p:txBody>
+          <a:bodyPr/>
+          <a:lstStyle/>
+          <a:p>
+            <a:fld id="{3C6E4902-292F-4370-AFC1-6D92B180E54E}" type="slidenum">
+              <a:rPr lang="en-US" smtClean="0"/>
+              <a:t>29</a:t>
+            </a:fld>
+            <a:endParaRPr lang="en-US"/>
+          </a:p>
+        </p:txBody>
+      </p:sp>
+    </p:spTree>
+    <p:extLst>
+      <p:ext uri="{BB962C8B-B14F-4D97-AF65-F5344CB8AC3E}">
+        <p14:creationId xmlns:p14="http://schemas.microsoft.com/office/powerpoint/2010/main" val="1969784615"/>
       </p:ext>
     </p:extLst>
   </p:cSld>
@@ -2234,6 +2290,244 @@
     <p:extLst>
       <p:ext uri="{BB962C8B-B14F-4D97-AF65-F5344CB8AC3E}">
         <p14:creationId xmlns:p14="http://schemas.microsoft.com/office/powerpoint/2010/main" val="2304031198"/>
+      </p:ext>
+    </p:extLst>
+  </p:cSld>
+  <p:clrMapOvr>
+    <a:masterClrMapping/>
+  </p:clrMapOvr>
+</p:notes>
+</file>
+
+<file path=ppt/notesSlides/notesSlide20.xml><?xml version="1.0" encoding="utf-8"?>
+<p:notes xmlns:a="http://schemas.openxmlformats.org/drawingml/2006/main" xmlns:r="http://schemas.openxmlformats.org/officeDocument/2006/relationships" xmlns:p="http://schemas.openxmlformats.org/presentationml/2006/main">
+  <p:cSld>
+    <p:spTree>
+      <p:nvGrpSpPr>
+        <p:cNvPr id="1" name=""/>
+        <p:cNvGrpSpPr/>
+        <p:nvPr/>
+      </p:nvGrpSpPr>
+      <p:grpSpPr>
+        <a:xfrm>
+          <a:off x="0" y="0"/>
+          <a:ext cx="0" cy="0"/>
+          <a:chOff x="0" y="0"/>
+          <a:chExt cx="0" cy="0"/>
+        </a:xfrm>
+      </p:grpSpPr>
+      <p:sp>
+        <p:nvSpPr>
+          <p:cNvPr id="2" name="Slide Image Placeholder 1"/>
+          <p:cNvSpPr>
+            <a:spLocks noGrp="1" noRot="1" noChangeAspect="1"/>
+          </p:cNvSpPr>
+          <p:nvPr>
+            <p:ph type="sldImg"/>
+          </p:nvPr>
+        </p:nvSpPr>
+        <p:spPr/>
+      </p:sp>
+      <p:sp>
+        <p:nvSpPr>
+          <p:cNvPr id="3" name="Notes Placeholder 2"/>
+          <p:cNvSpPr>
+            <a:spLocks noGrp="1"/>
+          </p:cNvSpPr>
+          <p:nvPr>
+            <p:ph type="body" idx="1"/>
+          </p:nvPr>
+        </p:nvSpPr>
+        <p:spPr/>
+        <p:txBody>
+          <a:bodyPr/>
+          <a:lstStyle/>
+          <a:p>
+            <a:r>
+              <a:rPr lang="en-US" dirty="0"/>
+              <a:t>Provide access to resources using identity providers, such as Microsoft Account, Facebook, Google and Yahoo!</a:t>
+            </a:r>
+          </a:p>
+          <a:p>
+            <a:endParaRPr lang="en-US" dirty="0"/>
+          </a:p>
+          <a:p>
+            <a:r>
+              <a:rPr lang="en-US" b="1" dirty="0"/>
+              <a:t>Azure AD B2C: Focus on your app, let us worry about sign-up and sign-in</a:t>
+            </a:r>
+          </a:p>
+          <a:p>
+            <a:r>
+              <a:rPr lang="en-US" dirty="0"/>
+              <a:t>https://docs.microsoft.com/en-us/azure/active-directory-b2c/active-directory-b2c-overview</a:t>
+            </a:r>
+          </a:p>
+          <a:p>
+            <a:endParaRPr lang="en-US" dirty="0"/>
+          </a:p>
+          <a:p>
+            <a:r>
+              <a:rPr lang="en-US" b="1" dirty="0"/>
+              <a:t>Azure Active Directory B2C: Provide sign-up and sign-in to consumers with Microsoft accounts</a:t>
+            </a:r>
+          </a:p>
+          <a:p>
+            <a:r>
+              <a:rPr lang="en-US" dirty="0"/>
+              <a:t>https://docs.microsoft.com/en-us/azure/active-directory-b2c/active-directory-b2c-setup-msa-app</a:t>
+            </a:r>
+          </a:p>
+          <a:p>
+            <a:endParaRPr lang="en-US" dirty="0"/>
+          </a:p>
+        </p:txBody>
+      </p:sp>
+      <p:sp>
+        <p:nvSpPr>
+          <p:cNvPr id="4" name="Slide Number Placeholder 3"/>
+          <p:cNvSpPr>
+            <a:spLocks noGrp="1"/>
+          </p:cNvSpPr>
+          <p:nvPr>
+            <p:ph type="sldNum" sz="quarter" idx="10"/>
+          </p:nvPr>
+        </p:nvSpPr>
+        <p:spPr/>
+        <p:txBody>
+          <a:bodyPr/>
+          <a:lstStyle/>
+          <a:p>
+            <a:fld id="{3C6E4902-292F-4370-AFC1-6D92B180E54E}" type="slidenum">
+              <a:rPr lang="en-US" smtClean="0"/>
+              <a:t>30</a:t>
+            </a:fld>
+            <a:endParaRPr lang="en-US"/>
+          </a:p>
+        </p:txBody>
+      </p:sp>
+    </p:spTree>
+    <p:extLst>
+      <p:ext uri="{BB962C8B-B14F-4D97-AF65-F5344CB8AC3E}">
+        <p14:creationId xmlns:p14="http://schemas.microsoft.com/office/powerpoint/2010/main" val="4062531117"/>
+      </p:ext>
+    </p:extLst>
+  </p:cSld>
+  <p:clrMapOvr>
+    <a:masterClrMapping/>
+  </p:clrMapOvr>
+</p:notes>
+</file>
+
+<file path=ppt/notesSlides/notesSlide21.xml><?xml version="1.0" encoding="utf-8"?>
+<p:notes xmlns:a="http://schemas.openxmlformats.org/drawingml/2006/main" xmlns:r="http://schemas.openxmlformats.org/officeDocument/2006/relationships" xmlns:p="http://schemas.openxmlformats.org/presentationml/2006/main">
+  <p:cSld>
+    <p:spTree>
+      <p:nvGrpSpPr>
+        <p:cNvPr id="1" name=""/>
+        <p:cNvGrpSpPr/>
+        <p:nvPr/>
+      </p:nvGrpSpPr>
+      <p:grpSpPr>
+        <a:xfrm>
+          <a:off x="0" y="0"/>
+          <a:ext cx="0" cy="0"/>
+          <a:chOff x="0" y="0"/>
+          <a:chExt cx="0" cy="0"/>
+        </a:xfrm>
+      </p:grpSpPr>
+      <p:sp>
+        <p:nvSpPr>
+          <p:cNvPr id="2" name="Slide Image Placeholder 1"/>
+          <p:cNvSpPr>
+            <a:spLocks noGrp="1" noRot="1" noChangeAspect="1"/>
+          </p:cNvSpPr>
+          <p:nvPr>
+            <p:ph type="sldImg"/>
+          </p:nvPr>
+        </p:nvSpPr>
+        <p:spPr/>
+      </p:sp>
+      <p:sp>
+        <p:nvSpPr>
+          <p:cNvPr id="3" name="Notes Placeholder 2"/>
+          <p:cNvSpPr>
+            <a:spLocks noGrp="1"/>
+          </p:cNvSpPr>
+          <p:nvPr>
+            <p:ph type="body" idx="1"/>
+          </p:nvPr>
+        </p:nvSpPr>
+        <p:spPr/>
+        <p:txBody>
+          <a:bodyPr/>
+          <a:lstStyle/>
+          <a:p>
+            <a:pPr marL="0" marR="0" lvl="0" indent="0" algn="l" defTabSz="914400" rtl="0" eaLnBrk="1" fontAlgn="auto" latinLnBrk="0" hangingPunct="1">
+              <a:lnSpc>
+                <a:spcPct val="100000"/>
+              </a:lnSpc>
+              <a:spcBef>
+                <a:spcPts val="0"/>
+              </a:spcBef>
+              <a:spcAft>
+                <a:spcPts val="0"/>
+              </a:spcAft>
+              <a:buClrTx/>
+              <a:buSzTx/>
+              <a:buFontTx/>
+              <a:buNone/>
+              <a:tabLst/>
+              <a:defRPr/>
+            </a:pPr>
+            <a:r>
+              <a:rPr lang="en-US" sz="1200" b="0" i="0" kern="1200" dirty="0">
+                <a:solidFill>
+                  <a:schemeClr val="tx1"/>
+                </a:solidFill>
+                <a:effectLst/>
+                <a:latin typeface="+mn-lt"/>
+                <a:ea typeface="+mn-ea"/>
+                <a:cs typeface="+mn-cs"/>
+              </a:rPr>
+              <a:t>The future of Azure ACS is Azure Active Directory</a:t>
+            </a:r>
+          </a:p>
+          <a:p>
+            <a:r>
+              <a:rPr lang="en-US" dirty="0"/>
+              <a:t>https://blogs.technet.microsoft.com/enterprisemobility/2015/02/12/the-future-of-azure-acs-is-azure-active-directory/</a:t>
+            </a:r>
+          </a:p>
+        </p:txBody>
+      </p:sp>
+      <p:sp>
+        <p:nvSpPr>
+          <p:cNvPr id="4" name="Slide Number Placeholder 3"/>
+          <p:cNvSpPr>
+            <a:spLocks noGrp="1"/>
+          </p:cNvSpPr>
+          <p:nvPr>
+            <p:ph type="sldNum" sz="quarter" idx="10"/>
+          </p:nvPr>
+        </p:nvSpPr>
+        <p:spPr/>
+        <p:txBody>
+          <a:bodyPr/>
+          <a:lstStyle/>
+          <a:p>
+            <a:fld id="{3C6E4902-292F-4370-AFC1-6D92B180E54E}" type="slidenum">
+              <a:rPr lang="en-US" smtClean="0"/>
+              <a:t>33</a:t>
+            </a:fld>
+            <a:endParaRPr lang="en-US"/>
+          </a:p>
+        </p:txBody>
+      </p:sp>
+    </p:spTree>
+    <p:extLst>
+      <p:ext uri="{BB962C8B-B14F-4D97-AF65-F5344CB8AC3E}">
+        <p14:creationId xmlns:p14="http://schemas.microsoft.com/office/powerpoint/2010/main" val="2320474319"/>
       </p:ext>
     </p:extLst>
   </p:cSld>
@@ -3650,7 +3944,7 @@
           <p:cNvPr id="2" name="Date Placeholder 1">
             <a:extLst>
               <a:ext uri="{FF2B5EF4-FFF2-40B4-BE49-F238E27FC236}">
-                <a16:creationId xmlns:a16="http://schemas.microsoft.com/office/drawing/2014/main" xmlns="" id="{73151AFF-1CEB-41B0-866D-D8FD275A6B63}"/>
+                <a16:creationId xmlns="" xmlns:a16="http://schemas.microsoft.com/office/drawing/2014/main" id="{73151AFF-1CEB-41B0-866D-D8FD275A6B63}"/>
               </a:ext>
             </a:extLst>
           </p:cNvPr>
@@ -3679,7 +3973,7 @@
           <p:cNvPr id="3" name="Footer Placeholder 2">
             <a:extLst>
               <a:ext uri="{FF2B5EF4-FFF2-40B4-BE49-F238E27FC236}">
-                <a16:creationId xmlns:a16="http://schemas.microsoft.com/office/drawing/2014/main" xmlns="" id="{36DC7DE4-847E-49A7-B908-5C9039005557}"/>
+                <a16:creationId xmlns="" xmlns:a16="http://schemas.microsoft.com/office/drawing/2014/main" id="{36DC7DE4-847E-49A7-B908-5C9039005557}"/>
               </a:ext>
             </a:extLst>
           </p:cNvPr>
@@ -3704,7 +3998,7 @@
           <p:cNvPr id="4" name="Slide Number Placeholder 3">
             <a:extLst>
               <a:ext uri="{FF2B5EF4-FFF2-40B4-BE49-F238E27FC236}">
-                <a16:creationId xmlns:a16="http://schemas.microsoft.com/office/drawing/2014/main" xmlns="" id="{5A3922C7-12D1-4765-871C-BA3593C19DE7}"/>
+                <a16:creationId xmlns="" xmlns:a16="http://schemas.microsoft.com/office/drawing/2014/main" id="{5A3922C7-12D1-4765-871C-BA3593C19DE7}"/>
               </a:ext>
             </a:extLst>
           </p:cNvPr>
@@ -3763,7 +4057,7 @@
           <p:cNvPr id="2" name="Title 1">
             <a:extLst>
               <a:ext uri="{FF2B5EF4-FFF2-40B4-BE49-F238E27FC236}">
-                <a16:creationId xmlns:a16="http://schemas.microsoft.com/office/drawing/2014/main" xmlns="" id="{5DDFCD53-ED59-4D21-B680-BAD4B5932A5D}"/>
+                <a16:creationId xmlns="" xmlns:a16="http://schemas.microsoft.com/office/drawing/2014/main" id="{5DDFCD53-ED59-4D21-B680-BAD4B5932A5D}"/>
               </a:ext>
             </a:extLst>
           </p:cNvPr>
@@ -3800,7 +4094,7 @@
           <p:cNvPr id="3" name="Content Placeholder 2">
             <a:extLst>
               <a:ext uri="{FF2B5EF4-FFF2-40B4-BE49-F238E27FC236}">
-                <a16:creationId xmlns:a16="http://schemas.microsoft.com/office/drawing/2014/main" xmlns="" id="{64CE2B8E-9FEA-4616-B71E-534682F37B05}"/>
+                <a16:creationId xmlns="" xmlns:a16="http://schemas.microsoft.com/office/drawing/2014/main" id="{64CE2B8E-9FEA-4616-B71E-534682F37B05}"/>
               </a:ext>
             </a:extLst>
           </p:cNvPr>
@@ -3890,7 +4184,7 @@
           <p:cNvPr id="4" name="Text Placeholder 3">
             <a:extLst>
               <a:ext uri="{FF2B5EF4-FFF2-40B4-BE49-F238E27FC236}">
-                <a16:creationId xmlns:a16="http://schemas.microsoft.com/office/drawing/2014/main" xmlns="" id="{A757B19D-7AA1-4957-8152-2379EE4C9B99}"/>
+                <a16:creationId xmlns="" xmlns:a16="http://schemas.microsoft.com/office/drawing/2014/main" id="{A757B19D-7AA1-4957-8152-2379EE4C9B99}"/>
               </a:ext>
             </a:extLst>
           </p:cNvPr>
@@ -3961,7 +4255,7 @@
           <p:cNvPr id="5" name="Date Placeholder 4">
             <a:extLst>
               <a:ext uri="{FF2B5EF4-FFF2-40B4-BE49-F238E27FC236}">
-                <a16:creationId xmlns:a16="http://schemas.microsoft.com/office/drawing/2014/main" xmlns="" id="{03EA3AD8-F626-4972-9BFE-628D46C32573}"/>
+                <a16:creationId xmlns="" xmlns:a16="http://schemas.microsoft.com/office/drawing/2014/main" id="{03EA3AD8-F626-4972-9BFE-628D46C32573}"/>
               </a:ext>
             </a:extLst>
           </p:cNvPr>
@@ -3990,7 +4284,7 @@
           <p:cNvPr id="6" name="Footer Placeholder 5">
             <a:extLst>
               <a:ext uri="{FF2B5EF4-FFF2-40B4-BE49-F238E27FC236}">
-                <a16:creationId xmlns:a16="http://schemas.microsoft.com/office/drawing/2014/main" xmlns="" id="{581003AE-B33D-4FBE-898C-8E86C2CEEB72}"/>
+                <a16:creationId xmlns="" xmlns:a16="http://schemas.microsoft.com/office/drawing/2014/main" id="{581003AE-B33D-4FBE-898C-8E86C2CEEB72}"/>
               </a:ext>
             </a:extLst>
           </p:cNvPr>
@@ -4015,7 +4309,7 @@
           <p:cNvPr id="7" name="Slide Number Placeholder 6">
             <a:extLst>
               <a:ext uri="{FF2B5EF4-FFF2-40B4-BE49-F238E27FC236}">
-                <a16:creationId xmlns:a16="http://schemas.microsoft.com/office/drawing/2014/main" xmlns="" id="{93A25726-5A1F-484A-8546-B63AFC91132A}"/>
+                <a16:creationId xmlns="" xmlns:a16="http://schemas.microsoft.com/office/drawing/2014/main" id="{93A25726-5A1F-484A-8546-B63AFC91132A}"/>
               </a:ext>
             </a:extLst>
           </p:cNvPr>
@@ -4074,7 +4368,7 @@
           <p:cNvPr id="2" name="Title 1">
             <a:extLst>
               <a:ext uri="{FF2B5EF4-FFF2-40B4-BE49-F238E27FC236}">
-                <a16:creationId xmlns:a16="http://schemas.microsoft.com/office/drawing/2014/main" xmlns="" id="{FA81D06F-5485-44E7-A87E-40478BB66DDB}"/>
+                <a16:creationId xmlns="" xmlns:a16="http://schemas.microsoft.com/office/drawing/2014/main" id="{FA81D06F-5485-44E7-A87E-40478BB66DDB}"/>
               </a:ext>
             </a:extLst>
           </p:cNvPr>
@@ -4111,7 +4405,7 @@
           <p:cNvPr id="3" name="Picture Placeholder 2">
             <a:extLst>
               <a:ext uri="{FF2B5EF4-FFF2-40B4-BE49-F238E27FC236}">
-                <a16:creationId xmlns:a16="http://schemas.microsoft.com/office/drawing/2014/main" xmlns="" id="{A6808487-B848-4D6A-8130-31A70162AE51}"/>
+                <a16:creationId xmlns="" xmlns:a16="http://schemas.microsoft.com/office/drawing/2014/main" id="{A6808487-B848-4D6A-8130-31A70162AE51}"/>
               </a:ext>
             </a:extLst>
           </p:cNvPr>
@@ -4178,7 +4472,7 @@
           <p:cNvPr id="4" name="Text Placeholder 3">
             <a:extLst>
               <a:ext uri="{FF2B5EF4-FFF2-40B4-BE49-F238E27FC236}">
-                <a16:creationId xmlns:a16="http://schemas.microsoft.com/office/drawing/2014/main" xmlns="" id="{CA43B7C5-DB38-4523-8237-6B1CBAC2B685}"/>
+                <a16:creationId xmlns="" xmlns:a16="http://schemas.microsoft.com/office/drawing/2014/main" id="{CA43B7C5-DB38-4523-8237-6B1CBAC2B685}"/>
               </a:ext>
             </a:extLst>
           </p:cNvPr>
@@ -4249,7 +4543,7 @@
           <p:cNvPr id="5" name="Date Placeholder 4">
             <a:extLst>
               <a:ext uri="{FF2B5EF4-FFF2-40B4-BE49-F238E27FC236}">
-                <a16:creationId xmlns:a16="http://schemas.microsoft.com/office/drawing/2014/main" xmlns="" id="{F08AD318-E8F2-4A96-B3D4-2BC67496E785}"/>
+                <a16:creationId xmlns="" xmlns:a16="http://schemas.microsoft.com/office/drawing/2014/main" id="{F08AD318-E8F2-4A96-B3D4-2BC67496E785}"/>
               </a:ext>
             </a:extLst>
           </p:cNvPr>
@@ -4278,7 +4572,7 @@
           <p:cNvPr id="6" name="Footer Placeholder 5">
             <a:extLst>
               <a:ext uri="{FF2B5EF4-FFF2-40B4-BE49-F238E27FC236}">
-                <a16:creationId xmlns:a16="http://schemas.microsoft.com/office/drawing/2014/main" xmlns="" id="{64E2CA28-8311-4AFD-A9A9-08BF694EF5CB}"/>
+                <a16:creationId xmlns="" xmlns:a16="http://schemas.microsoft.com/office/drawing/2014/main" id="{64E2CA28-8311-4AFD-A9A9-08BF694EF5CB}"/>
               </a:ext>
             </a:extLst>
           </p:cNvPr>
@@ -4303,7 +4597,7 @@
           <p:cNvPr id="7" name="Slide Number Placeholder 6">
             <a:extLst>
               <a:ext uri="{FF2B5EF4-FFF2-40B4-BE49-F238E27FC236}">
-                <a16:creationId xmlns:a16="http://schemas.microsoft.com/office/drawing/2014/main" xmlns="" id="{F6882E3F-291C-4858-8EA8-7C6C6F737FF9}"/>
+                <a16:creationId xmlns="" xmlns:a16="http://schemas.microsoft.com/office/drawing/2014/main" id="{F6882E3F-291C-4858-8EA8-7C6C6F737FF9}"/>
               </a:ext>
             </a:extLst>
           </p:cNvPr>
@@ -4362,7 +4656,7 @@
           <p:cNvPr id="2" name="Title 1">
             <a:extLst>
               <a:ext uri="{FF2B5EF4-FFF2-40B4-BE49-F238E27FC236}">
-                <a16:creationId xmlns:a16="http://schemas.microsoft.com/office/drawing/2014/main" xmlns="" id="{176B233E-F21A-4595-B654-93C69F6C09BB}"/>
+                <a16:creationId xmlns="" xmlns:a16="http://schemas.microsoft.com/office/drawing/2014/main" id="{176B233E-F21A-4595-B654-93C69F6C09BB}"/>
               </a:ext>
             </a:extLst>
           </p:cNvPr>
@@ -4390,7 +4684,7 @@
           <p:cNvPr id="3" name="Vertical Text Placeholder 2">
             <a:extLst>
               <a:ext uri="{FF2B5EF4-FFF2-40B4-BE49-F238E27FC236}">
-                <a16:creationId xmlns:a16="http://schemas.microsoft.com/office/drawing/2014/main" xmlns="" id="{C143C054-A0C1-4E3C-9A2B-0274992B77F7}"/>
+                <a16:creationId xmlns="" xmlns:a16="http://schemas.microsoft.com/office/drawing/2014/main" id="{C143C054-A0C1-4E3C-9A2B-0274992B77F7}"/>
               </a:ext>
             </a:extLst>
           </p:cNvPr>
@@ -4447,7 +4741,7 @@
           <p:cNvPr id="4" name="Date Placeholder 3">
             <a:extLst>
               <a:ext uri="{FF2B5EF4-FFF2-40B4-BE49-F238E27FC236}">
-                <a16:creationId xmlns:a16="http://schemas.microsoft.com/office/drawing/2014/main" xmlns="" id="{AD99ACFF-2BB4-4E3F-9993-5D73DF76297A}"/>
+                <a16:creationId xmlns="" xmlns:a16="http://schemas.microsoft.com/office/drawing/2014/main" id="{AD99ACFF-2BB4-4E3F-9993-5D73DF76297A}"/>
               </a:ext>
             </a:extLst>
           </p:cNvPr>
@@ -4476,7 +4770,7 @@
           <p:cNvPr id="5" name="Footer Placeholder 4">
             <a:extLst>
               <a:ext uri="{FF2B5EF4-FFF2-40B4-BE49-F238E27FC236}">
-                <a16:creationId xmlns:a16="http://schemas.microsoft.com/office/drawing/2014/main" xmlns="" id="{6114CAFB-E186-4994-B0FE-0D160DC6863F}"/>
+                <a16:creationId xmlns="" xmlns:a16="http://schemas.microsoft.com/office/drawing/2014/main" id="{6114CAFB-E186-4994-B0FE-0D160DC6863F}"/>
               </a:ext>
             </a:extLst>
           </p:cNvPr>
@@ -4501,7 +4795,7 @@
           <p:cNvPr id="6" name="Slide Number Placeholder 5">
             <a:extLst>
               <a:ext uri="{FF2B5EF4-FFF2-40B4-BE49-F238E27FC236}">
-                <a16:creationId xmlns:a16="http://schemas.microsoft.com/office/drawing/2014/main" xmlns="" id="{3894BFB5-5E75-4AA5-8420-8C5F18A3635F}"/>
+                <a16:creationId xmlns="" xmlns:a16="http://schemas.microsoft.com/office/drawing/2014/main" id="{3894BFB5-5E75-4AA5-8420-8C5F18A3635F}"/>
               </a:ext>
             </a:extLst>
           </p:cNvPr>
@@ -4560,7 +4854,7 @@
           <p:cNvPr id="2" name="Vertical Title 1">
             <a:extLst>
               <a:ext uri="{FF2B5EF4-FFF2-40B4-BE49-F238E27FC236}">
-                <a16:creationId xmlns:a16="http://schemas.microsoft.com/office/drawing/2014/main" xmlns="" id="{B70D8942-18DE-4162-BFC1-A43DC681AD66}"/>
+                <a16:creationId xmlns="" xmlns:a16="http://schemas.microsoft.com/office/drawing/2014/main" id="{B70D8942-18DE-4162-BFC1-A43DC681AD66}"/>
               </a:ext>
             </a:extLst>
           </p:cNvPr>
@@ -4593,7 +4887,7 @@
           <p:cNvPr id="3" name="Vertical Text Placeholder 2">
             <a:extLst>
               <a:ext uri="{FF2B5EF4-FFF2-40B4-BE49-F238E27FC236}">
-                <a16:creationId xmlns:a16="http://schemas.microsoft.com/office/drawing/2014/main" xmlns="" id="{4F68544D-679F-4072-BA8D-6C7EAFAF069E}"/>
+                <a16:creationId xmlns="" xmlns:a16="http://schemas.microsoft.com/office/drawing/2014/main" id="{4F68544D-679F-4072-BA8D-6C7EAFAF069E}"/>
               </a:ext>
             </a:extLst>
           </p:cNvPr>
@@ -4655,7 +4949,7 @@
           <p:cNvPr id="4" name="Date Placeholder 3">
             <a:extLst>
               <a:ext uri="{FF2B5EF4-FFF2-40B4-BE49-F238E27FC236}">
-                <a16:creationId xmlns:a16="http://schemas.microsoft.com/office/drawing/2014/main" xmlns="" id="{426B7624-9FCE-47B6-8E56-9FB61B9194CB}"/>
+                <a16:creationId xmlns="" xmlns:a16="http://schemas.microsoft.com/office/drawing/2014/main" id="{426B7624-9FCE-47B6-8E56-9FB61B9194CB}"/>
               </a:ext>
             </a:extLst>
           </p:cNvPr>
@@ -4684,7 +4978,7 @@
           <p:cNvPr id="5" name="Footer Placeholder 4">
             <a:extLst>
               <a:ext uri="{FF2B5EF4-FFF2-40B4-BE49-F238E27FC236}">
-                <a16:creationId xmlns:a16="http://schemas.microsoft.com/office/drawing/2014/main" xmlns="" id="{375749F6-49EC-4C01-ABE1-175D0C4ECC79}"/>
+                <a16:creationId xmlns="" xmlns:a16="http://schemas.microsoft.com/office/drawing/2014/main" id="{375749F6-49EC-4C01-ABE1-175D0C4ECC79}"/>
               </a:ext>
             </a:extLst>
           </p:cNvPr>
@@ -4709,7 +5003,7 @@
           <p:cNvPr id="6" name="Slide Number Placeholder 5">
             <a:extLst>
               <a:ext uri="{FF2B5EF4-FFF2-40B4-BE49-F238E27FC236}">
-                <a16:creationId xmlns:a16="http://schemas.microsoft.com/office/drawing/2014/main" xmlns="" id="{FC8948C9-0156-4943-9331-F46A977CB79E}"/>
+                <a16:creationId xmlns="" xmlns:a16="http://schemas.microsoft.com/office/drawing/2014/main" id="{FC8948C9-0156-4943-9331-F46A977CB79E}"/>
               </a:ext>
             </a:extLst>
           </p:cNvPr>
@@ -4743,6 +5037,676 @@
   <p:clrMapOvr>
     <a:masterClrMapping/>
   </p:clrMapOvr>
+</p:sldLayout>
+</file>
+
+<file path=ppt/slideLayouts/slideLayout15.xml><?xml version="1.0" encoding="utf-8"?>
+<p:sldLayout xmlns:a="http://schemas.openxmlformats.org/drawingml/2006/main" xmlns:r="http://schemas.openxmlformats.org/officeDocument/2006/relationships" xmlns:p="http://schemas.openxmlformats.org/presentationml/2006/main" userDrawn="1">
+  <p:cSld name="Question &amp; Answer">
+    <p:spTree>
+      <p:nvGrpSpPr>
+        <p:cNvPr id="1" name=""/>
+        <p:cNvGrpSpPr/>
+        <p:nvPr/>
+      </p:nvGrpSpPr>
+      <p:grpSpPr>
+        <a:xfrm>
+          <a:off x="0" y="0"/>
+          <a:ext cx="0" cy="0"/>
+          <a:chOff x="0" y="0"/>
+          <a:chExt cx="0" cy="0"/>
+        </a:xfrm>
+      </p:grpSpPr>
+      <p:sp>
+        <p:nvSpPr>
+          <p:cNvPr id="2" name="Title 1"/>
+          <p:cNvSpPr>
+            <a:spLocks noGrp="1"/>
+          </p:cNvSpPr>
+          <p:nvPr>
+            <p:ph type="title" hasCustomPrompt="1"/>
+          </p:nvPr>
+        </p:nvSpPr>
+        <p:spPr>
+          <a:xfrm>
+            <a:off x="201590" y="220717"/>
+            <a:ext cx="11778205" cy="1308538"/>
+          </a:xfrm>
+          <a:solidFill>
+            <a:schemeClr val="accent4">
+              <a:lumMod val="40000"/>
+              <a:lumOff val="60000"/>
+            </a:schemeClr>
+          </a:solidFill>
+        </p:spPr>
+        <p:txBody>
+          <a:bodyPr>
+            <a:normAutofit/>
+          </a:bodyPr>
+          <a:lstStyle>
+            <a:lvl1pPr>
+              <a:defRPr sz="3600"/>
+            </a:lvl1pPr>
+          </a:lstStyle>
+          <a:p>
+            <a:r>
+              <a:rPr lang="en-US" dirty="0"/>
+              <a:t>Click to edit Question style</a:t>
+            </a:r>
+          </a:p>
+        </p:txBody>
+      </p:sp>
+      <p:sp>
+        <p:nvSpPr>
+          <p:cNvPr id="3" name="Content Placeholder 2"/>
+          <p:cNvSpPr>
+            <a:spLocks noGrp="1"/>
+          </p:cNvSpPr>
+          <p:nvPr>
+            <p:ph idx="1" hasCustomPrompt="1"/>
+          </p:nvPr>
+        </p:nvSpPr>
+        <p:spPr>
+          <a:xfrm>
+            <a:off x="201591" y="1529255"/>
+            <a:ext cx="11778205" cy="5123793"/>
+          </a:xfrm>
+        </p:spPr>
+        <p:txBody>
+          <a:bodyPr>
+            <a:normAutofit/>
+          </a:bodyPr>
+          <a:lstStyle>
+            <a:lvl1pPr marL="742950" indent="-742950">
+              <a:buFont typeface="+mj-lt"/>
+              <a:buAutoNum type="arabicParenR"/>
+              <a:defRPr sz="3600"/>
+            </a:lvl1pPr>
+            <a:lvl2pPr marL="971550" indent="-514350">
+              <a:buFont typeface="+mj-lt"/>
+              <a:buAutoNum type="alphaUcPeriod"/>
+              <a:defRPr sz="3200"/>
+            </a:lvl2pPr>
+            <a:lvl3pPr marL="1485900" indent="-571500">
+              <a:buFont typeface="+mj-lt"/>
+              <a:buAutoNum type="romanLcPeriod"/>
+              <a:defRPr sz="2800"/>
+            </a:lvl3pPr>
+            <a:lvl4pPr marL="1828800" indent="-457200">
+              <a:buFont typeface="+mj-lt"/>
+              <a:buAutoNum type="alphaLcPeriod"/>
+              <a:defRPr sz="2400"/>
+            </a:lvl4pPr>
+            <a:lvl5pPr marL="2286000" indent="-457200">
+              <a:buFont typeface="+mj-lt"/>
+              <a:buAutoNum type="arabicPeriod"/>
+              <a:defRPr sz="2400"/>
+            </a:lvl5pPr>
+          </a:lstStyle>
+          <a:p>
+            <a:pPr lvl="0"/>
+            <a:r>
+              <a:rPr lang="en-US" dirty="0"/>
+              <a:t>Click to edit Question text styles</a:t>
+            </a:r>
+          </a:p>
+          <a:p>
+            <a:pPr lvl="1"/>
+            <a:r>
+              <a:rPr lang="en-US" dirty="0"/>
+              <a:t>Second level</a:t>
+            </a:r>
+          </a:p>
+          <a:p>
+            <a:pPr lvl="2"/>
+            <a:r>
+              <a:rPr lang="en-US" dirty="0"/>
+              <a:t>Third level</a:t>
+            </a:r>
+          </a:p>
+          <a:p>
+            <a:pPr lvl="3"/>
+            <a:r>
+              <a:rPr lang="en-US" dirty="0"/>
+              <a:t>Fourth level</a:t>
+            </a:r>
+          </a:p>
+          <a:p>
+            <a:pPr lvl="4"/>
+            <a:r>
+              <a:rPr lang="en-US" dirty="0"/>
+              <a:t>Fifth level</a:t>
+            </a:r>
+          </a:p>
+        </p:txBody>
+      </p:sp>
+      <p:sp>
+        <p:nvSpPr>
+          <p:cNvPr id="7" name="Content Placeholder 2"/>
+          <p:cNvSpPr>
+            <a:spLocks noGrp="1"/>
+          </p:cNvSpPr>
+          <p:nvPr>
+            <p:ph idx="10" hasCustomPrompt="1"/>
+          </p:nvPr>
+        </p:nvSpPr>
+        <p:spPr>
+          <a:xfrm>
+            <a:off x="467502" y="1843935"/>
+            <a:ext cx="11778205" cy="5123793"/>
+          </a:xfrm>
+        </p:spPr>
+        <p:txBody>
+          <a:bodyPr>
+            <a:normAutofit/>
+          </a:bodyPr>
+          <a:lstStyle>
+            <a:lvl1pPr marL="742950" indent="-742950">
+              <a:buFont typeface="+mj-lt"/>
+              <a:buAutoNum type="arabicParenR"/>
+              <a:defRPr sz="3600"/>
+            </a:lvl1pPr>
+            <a:lvl2pPr marL="971550" indent="-514350">
+              <a:buFont typeface="+mj-lt"/>
+              <a:buAutoNum type="alphaUcPeriod"/>
+              <a:defRPr sz="3200"/>
+            </a:lvl2pPr>
+            <a:lvl3pPr marL="1485900" indent="-571500">
+              <a:buFont typeface="+mj-lt"/>
+              <a:buAutoNum type="romanLcPeriod"/>
+              <a:defRPr sz="2800"/>
+            </a:lvl3pPr>
+            <a:lvl4pPr marL="1828800" indent="-457200">
+              <a:buFont typeface="+mj-lt"/>
+              <a:buAutoNum type="alphaLcPeriod"/>
+              <a:defRPr sz="2400"/>
+            </a:lvl4pPr>
+            <a:lvl5pPr marL="2286000" indent="-457200">
+              <a:buFont typeface="+mj-lt"/>
+              <a:buAutoNum type="arabicPeriod"/>
+              <a:defRPr sz="2400"/>
+            </a:lvl5pPr>
+          </a:lstStyle>
+          <a:p>
+            <a:pPr lvl="0"/>
+            <a:r>
+              <a:rPr lang="en-US" dirty="0"/>
+              <a:t>Click to edit Answer text styles</a:t>
+            </a:r>
+          </a:p>
+          <a:p>
+            <a:pPr lvl="1"/>
+            <a:r>
+              <a:rPr lang="en-US" dirty="0"/>
+              <a:t>Second level</a:t>
+            </a:r>
+          </a:p>
+          <a:p>
+            <a:pPr lvl="2"/>
+            <a:r>
+              <a:rPr lang="en-US" dirty="0"/>
+              <a:t>Third level</a:t>
+            </a:r>
+          </a:p>
+          <a:p>
+            <a:pPr lvl="3"/>
+            <a:r>
+              <a:rPr lang="en-US" dirty="0"/>
+              <a:t>Fourth level</a:t>
+            </a:r>
+          </a:p>
+          <a:p>
+            <a:pPr lvl="4"/>
+            <a:r>
+              <a:rPr lang="en-US" dirty="0"/>
+              <a:t>Fifth level</a:t>
+            </a:r>
+          </a:p>
+        </p:txBody>
+      </p:sp>
+    </p:spTree>
+    <p:extLst>
+      <p:ext uri="{BB962C8B-B14F-4D97-AF65-F5344CB8AC3E}">
+        <p14:creationId xmlns:p14="http://schemas.microsoft.com/office/powerpoint/2010/main" val="2585431379"/>
+      </p:ext>
+    </p:extLst>
+  </p:cSld>
+  <p:clrMapOvr>
+    <a:masterClrMapping/>
+  </p:clrMapOvr>
+  <p:timing>
+    <p:tnLst>
+      <p:par>
+        <p:cTn xmlns:p14="http://schemas.microsoft.com/office/powerpoint/2010/main" id="1" dur="indefinite" restart="never" nodeType="tmRoot">
+          <p:childTnLst>
+            <p:seq concurrent="1" nextAc="seek">
+              <p:cTn id="2" dur="indefinite" nodeType="mainSeq">
+                <p:childTnLst>
+                  <p:par>
+                    <p:cTn id="3" fill="hold">
+                      <p:stCondLst>
+                        <p:cond delay="indefinite"/>
+                      </p:stCondLst>
+                      <p:childTnLst>
+                        <p:par>
+                          <p:cTn id="4" fill="hold">
+                            <p:stCondLst>
+                              <p:cond delay="0"/>
+                            </p:stCondLst>
+                            <p:childTnLst>
+                              <p:par>
+                                <p:cTn id="5" presetID="1" presetClass="exit" presetSubtype="0" fill="hold" grpId="0" nodeType="clickEffect">
+                                  <p:stCondLst>
+                                    <p:cond delay="0"/>
+                                  </p:stCondLst>
+                                  <p:childTnLst>
+                                    <p:set>
+                                      <p:cBhvr>
+                                        <p:cTn id="6" dur="1" fill="hold">
+                                          <p:stCondLst>
+                                            <p:cond delay="0"/>
+                                          </p:stCondLst>
+                                        </p:cTn>
+                                        <p:tgtEl>
+                                          <p:spTgt spid="3"/>
+                                        </p:tgtEl>
+                                        <p:attrNameLst>
+                                          <p:attrName>style.visibility</p:attrName>
+                                        </p:attrNameLst>
+                                      </p:cBhvr>
+                                      <p:to>
+                                        <p:strVal val="hidden"/>
+                                      </p:to>
+                                    </p:set>
+                                  </p:childTnLst>
+                                </p:cTn>
+                              </p:par>
+                              <p:par>
+                                <p:cTn id="7" presetID="42" presetClass="path" presetSubtype="0" accel="50000" decel="50000" fill="hold" grpId="1" nodeType="withEffect">
+                                  <p:stCondLst>
+                                    <p:cond delay="0"/>
+                                  </p:stCondLst>
+                                  <p:childTnLst>
+                                    <p:animMotion origin="layout" path="M -4.16667E-6 -1.11111E-6 L -0.02187 -0.04537 " pathEditMode="relative" rAng="0" ptsTypes="AA">
+                                      <p:cBhvr>
+                                        <p:cTn id="8" dur="500" fill="hold"/>
+                                        <p:tgtEl>
+                                          <p:spTgt spid="7"/>
+                                        </p:tgtEl>
+                                        <p:attrNameLst>
+                                          <p:attrName>ppt_x</p:attrName>
+                                          <p:attrName>ppt_y</p:attrName>
+                                        </p:attrNameLst>
+                                      </p:cBhvr>
+                                      <p:rCtr x="-1094" y="-2269"/>
+                                    </p:animMotion>
+                                  </p:childTnLst>
+                                </p:cTn>
+                              </p:par>
+                              <p:par>
+                                <p:cTn id="9" presetID="14" presetClass="entr" presetSubtype="10" fill="hold" grpId="0" nodeType="withEffect">
+                                  <p:stCondLst>
+                                    <p:cond delay="0"/>
+                                  </p:stCondLst>
+                                  <p:childTnLst>
+                                    <p:set>
+                                      <p:cBhvr>
+                                        <p:cTn id="10" dur="1" fill="hold">
+                                          <p:stCondLst>
+                                            <p:cond delay="0"/>
+                                          </p:stCondLst>
+                                        </p:cTn>
+                                        <p:tgtEl>
+                                          <p:spTgt spid="7"/>
+                                        </p:tgtEl>
+                                        <p:attrNameLst>
+                                          <p:attrName>style.visibility</p:attrName>
+                                        </p:attrNameLst>
+                                      </p:cBhvr>
+                                      <p:to>
+                                        <p:strVal val="visible"/>
+                                      </p:to>
+                                    </p:set>
+                                    <p:animEffect transition="in" filter="randombar(horizontal)">
+                                      <p:cBhvr>
+                                        <p:cTn id="11" dur="500"/>
+                                        <p:tgtEl>
+                                          <p:spTgt spid="7"/>
+                                        </p:tgtEl>
+                                      </p:cBhvr>
+                                    </p:animEffect>
+                                  </p:childTnLst>
+                                </p:cTn>
+                              </p:par>
+                            </p:childTnLst>
+                          </p:cTn>
+                        </p:par>
+                      </p:childTnLst>
+                    </p:cTn>
+                  </p:par>
+                </p:childTnLst>
+              </p:cTn>
+              <p:prevCondLst>
+                <p:cond evt="onPrev" delay="0">
+                  <p:tgtEl>
+                    <p:sldTgt/>
+                  </p:tgtEl>
+                </p:cond>
+              </p:prevCondLst>
+              <p:nextCondLst>
+                <p:cond evt="onNext" delay="0">
+                  <p:tgtEl>
+                    <p:sldTgt/>
+                  </p:tgtEl>
+                </p:cond>
+              </p:nextCondLst>
+            </p:seq>
+          </p:childTnLst>
+        </p:cTn>
+      </p:par>
+    </p:tnLst>
+    <p:bldLst>
+      <p:bldP spid="3" grpId="0">
+        <p:tmplLst>
+          <p:tmpl>
+            <p:tnLst>
+              <p:par>
+                <p:cTn xmlns:p14="http://schemas.microsoft.com/office/powerpoint/2010/main" presetID="1" presetClass="exit" presetSubtype="0" fill="hold" nodeType="clickEffect">
+                  <p:stCondLst>
+                    <p:cond delay="0"/>
+                  </p:stCondLst>
+                  <p:childTnLst>
+                    <p:set>
+                      <p:cBhvr>
+                        <p:cTn dur="1" fill="hold">
+                          <p:stCondLst>
+                            <p:cond delay="0"/>
+                          </p:stCondLst>
+                        </p:cTn>
+                        <p:tgtEl>
+                          <p:spTgt spid="3"/>
+                        </p:tgtEl>
+                        <p:attrNameLst>
+                          <p:attrName>style.visibility</p:attrName>
+                        </p:attrNameLst>
+                      </p:cBhvr>
+                      <p:to>
+                        <p:strVal val="hidden"/>
+                      </p:to>
+                    </p:set>
+                  </p:childTnLst>
+                </p:cTn>
+              </p:par>
+            </p:tnLst>
+          </p:tmpl>
+        </p:tmplLst>
+      </p:bldP>
+      <p:bldP spid="7" grpId="0">
+        <p:tmplLst>
+          <p:tmpl>
+            <p:tnLst>
+              <p:par>
+                <p:cTn xmlns:p14="http://schemas.microsoft.com/office/powerpoint/2010/main" presetID="14" presetClass="entr" presetSubtype="10" fill="hold" nodeType="withEffect">
+                  <p:stCondLst>
+                    <p:cond delay="0"/>
+                  </p:stCondLst>
+                  <p:childTnLst>
+                    <p:set>
+                      <p:cBhvr>
+                        <p:cTn dur="1" fill="hold">
+                          <p:stCondLst>
+                            <p:cond delay="0"/>
+                          </p:stCondLst>
+                        </p:cTn>
+                        <p:tgtEl>
+                          <p:spTgt spid="7"/>
+                        </p:tgtEl>
+                        <p:attrNameLst>
+                          <p:attrName>style.visibility</p:attrName>
+                        </p:attrNameLst>
+                      </p:cBhvr>
+                      <p:to>
+                        <p:strVal val="visible"/>
+                      </p:to>
+                    </p:set>
+                    <p:animEffect transition="in" filter="randombar(horizontal)">
+                      <p:cBhvr>
+                        <p:cTn dur="500"/>
+                        <p:tgtEl>
+                          <p:spTgt spid="7"/>
+                        </p:tgtEl>
+                      </p:cBhvr>
+                    </p:animEffect>
+                  </p:childTnLst>
+                </p:cTn>
+              </p:par>
+            </p:tnLst>
+          </p:tmpl>
+        </p:tmplLst>
+      </p:bldP>
+      <p:bldP spid="7" grpId="1">
+        <p:tmplLst>
+          <p:tmpl>
+            <p:tnLst>
+              <p:par>
+                <p:cTn xmlns:p14="http://schemas.microsoft.com/office/powerpoint/2010/main" presetID="42" presetClass="path" presetSubtype="0" accel="50000" decel="50000" fill="hold" nodeType="withEffect">
+                  <p:stCondLst>
+                    <p:cond delay="0"/>
+                  </p:stCondLst>
+                  <p:childTnLst>
+                    <p:animMotion origin="layout" path="M -4.16667E-6 -1.11111E-6 L -0.02187 -0.04537 " pathEditMode="relative" rAng="0" ptsTypes="AA">
+                      <p:cBhvr>
+                        <p:cTn dur="500" fill="hold"/>
+                        <p:tgtEl>
+                          <p:spTgt spid="7"/>
+                        </p:tgtEl>
+                        <p:attrNameLst>
+                          <p:attrName>ppt_x</p:attrName>
+                          <p:attrName>ppt_y</p:attrName>
+                        </p:attrNameLst>
+                      </p:cBhvr>
+                      <p:rCtr x="-1094" y="-2269"/>
+                    </p:animMotion>
+                  </p:childTnLst>
+                </p:cTn>
+              </p:par>
+            </p:tnLst>
+          </p:tmpl>
+        </p:tmplLst>
+      </p:bldP>
+    </p:bldLst>
+  </p:timing>
+</p:sldLayout>
+</file>
+
+<file path=ppt/slideLayouts/slideLayout16.xml><?xml version="1.0" encoding="utf-8"?>
+<p:sldLayout xmlns:a="http://schemas.openxmlformats.org/drawingml/2006/main" xmlns:r="http://schemas.openxmlformats.org/officeDocument/2006/relationships" xmlns:p="http://schemas.openxmlformats.org/presentationml/2006/main" userDrawn="1">
+  <p:cSld name="Exam-Tip">
+    <p:bg>
+      <p:bgPr>
+        <a:solidFill>
+          <a:srgbClr val="92D050"/>
+        </a:solidFill>
+        <a:effectLst/>
+      </p:bgPr>
+    </p:bg>
+    <p:spTree>
+      <p:nvGrpSpPr>
+        <p:cNvPr id="1" name=""/>
+        <p:cNvGrpSpPr/>
+        <p:nvPr/>
+      </p:nvGrpSpPr>
+      <p:grpSpPr>
+        <a:xfrm>
+          <a:off x="0" y="0"/>
+          <a:ext cx="0" cy="0"/>
+          <a:chOff x="0" y="0"/>
+          <a:chExt cx="0" cy="0"/>
+        </a:xfrm>
+      </p:grpSpPr>
+      <p:sp>
+        <p:nvSpPr>
+          <p:cNvPr id="2" name="Title 1"/>
+          <p:cNvSpPr>
+            <a:spLocks noGrp="1"/>
+          </p:cNvSpPr>
+          <p:nvPr>
+            <p:ph type="title"/>
+          </p:nvPr>
+        </p:nvSpPr>
+        <p:spPr>
+          <a:xfrm>
+            <a:off x="3545840" y="347873"/>
+            <a:ext cx="8117840" cy="800207"/>
+          </a:xfrm>
+        </p:spPr>
+        <p:txBody>
+          <a:bodyPr>
+            <a:normAutofit/>
+          </a:bodyPr>
+          <a:lstStyle>
+            <a:lvl1pPr algn="l" defTabSz="914400" rtl="0" eaLnBrk="1" latinLnBrk="0" hangingPunct="1">
+              <a:lnSpc>
+                <a:spcPct val="90000"/>
+              </a:lnSpc>
+              <a:spcBef>
+                <a:spcPct val="0"/>
+              </a:spcBef>
+              <a:buNone/>
+              <a:defRPr lang="en-US" sz="5400" b="1" i="1" u="none" kern="1200" baseline="0" dirty="0">
+                <a:solidFill>
+                  <a:schemeClr val="tx1"/>
+                </a:solidFill>
+                <a:latin typeface="+mj-lt"/>
+                <a:ea typeface="+mj-ea"/>
+                <a:cs typeface="+mj-cs"/>
+              </a:defRPr>
+            </a:lvl1pPr>
+          </a:lstStyle>
+          <a:p>
+            <a:endParaRPr lang="en-US" dirty="0"/>
+          </a:p>
+        </p:txBody>
+      </p:sp>
+      <p:sp>
+        <p:nvSpPr>
+          <p:cNvPr id="4" name="Text Placeholder 3"/>
+          <p:cNvSpPr>
+            <a:spLocks noGrp="1"/>
+          </p:cNvSpPr>
+          <p:nvPr>
+            <p:ph type="body" sz="quarter" idx="11"/>
+          </p:nvPr>
+        </p:nvSpPr>
+        <p:spPr>
+          <a:xfrm>
+            <a:off x="268080" y="1361440"/>
+            <a:ext cx="11655840" cy="4704080"/>
+          </a:xfrm>
+        </p:spPr>
+        <p:txBody>
+          <a:bodyPr>
+            <a:noAutofit/>
+          </a:bodyPr>
+          <a:lstStyle>
+            <a:lvl1pPr marL="0" indent="0">
+              <a:buNone/>
+              <a:defRPr sz="4000"/>
+            </a:lvl1pPr>
+            <a:lvl2pPr marL="28012" indent="0">
+              <a:buNone/>
+              <a:defRPr sz="1961"/>
+            </a:lvl2pPr>
+            <a:lvl3pPr marL="219428" indent="0">
+              <a:buNone/>
+              <a:defRPr sz="1961"/>
+            </a:lvl3pPr>
+            <a:lvl4pPr marL="466868" indent="0">
+              <a:buNone/>
+              <a:defRPr sz="1765"/>
+            </a:lvl4pPr>
+            <a:lvl5pPr marL="725201" indent="0">
+              <a:buNone/>
+              <a:defRPr sz="1765"/>
+            </a:lvl5pPr>
+          </a:lstStyle>
+          <a:p>
+            <a:pPr lvl="0"/>
+            <a:endParaRPr lang="en-US" dirty="0"/>
+          </a:p>
+        </p:txBody>
+      </p:sp>
+      <p:sp>
+        <p:nvSpPr>
+          <p:cNvPr id="3" name="Rectangle 2"/>
+          <p:cNvSpPr/>
+          <p:nvPr userDrawn="1"/>
+        </p:nvSpPr>
+        <p:spPr>
+          <a:xfrm>
+            <a:off x="268080" y="286311"/>
+            <a:ext cx="3127779" cy="923330"/>
+          </a:xfrm>
+          <a:prstGeom prst="rect">
+            <a:avLst/>
+          </a:prstGeom>
+        </p:spPr>
+        <p:txBody>
+          <a:bodyPr wrap="none">
+            <a:spAutoFit/>
+          </a:bodyPr>
+          <a:lstStyle/>
+          <a:p>
+            <a:pPr marL="0" marR="0" lvl="0" indent="0" algn="l" defTabSz="914400" rtl="0" eaLnBrk="1" fontAlgn="auto" latinLnBrk="0" hangingPunct="1">
+              <a:lnSpc>
+                <a:spcPct val="100000"/>
+              </a:lnSpc>
+              <a:spcBef>
+                <a:spcPts val="0"/>
+              </a:spcBef>
+              <a:spcAft>
+                <a:spcPts val="0"/>
+              </a:spcAft>
+              <a:buClrTx/>
+              <a:buSzTx/>
+              <a:buFontTx/>
+              <a:buNone/>
+              <a:tabLst/>
+              <a:defRPr/>
+            </a:pPr>
+            <a:r>
+              <a:rPr kumimoji="0" lang="en-US" sz="5400" b="0" i="0" u="none" strike="noStrike" kern="1200" cap="none" spc="0" normalizeH="0" baseline="0" noProof="0" dirty="0">
+                <a:ln>
+                  <a:noFill/>
+                </a:ln>
+                <a:solidFill>
+                  <a:prstClr val="black"/>
+                </a:solidFill>
+                <a:effectLst/>
+                <a:uLnTx/>
+                <a:uFillTx/>
+                <a:latin typeface="Calibri" panose="020F0502020204030204"/>
+                <a:ea typeface="+mn-ea"/>
+                <a:cs typeface="+mn-cs"/>
+              </a:rPr>
+              <a:t>EXAM TIP!</a:t>
+            </a:r>
+          </a:p>
+        </p:txBody>
+      </p:sp>
+    </p:spTree>
+    <p:extLst>
+      <p:ext uri="{BB962C8B-B14F-4D97-AF65-F5344CB8AC3E}">
+        <p14:creationId xmlns:p14="http://schemas.microsoft.com/office/powerpoint/2010/main" val="3078930992"/>
+      </p:ext>
+    </p:extLst>
+  </p:cSld>
+  <p:clrMapOvr>
+    <a:masterClrMapping/>
+  </p:clrMapOvr>
+  <p:transition xmlns:p14="http://schemas.microsoft.com/office/powerpoint/2010/main">
+    <p:fade/>
+  </p:transition>
 </p:sldLayout>
 </file>
 
@@ -5358,7 +6322,7 @@
           <p:cNvPr id="7" name="Rectangle 6">
             <a:extLst>
               <a:ext uri="{FF2B5EF4-FFF2-40B4-BE49-F238E27FC236}">
-                <a16:creationId xmlns:a16="http://schemas.microsoft.com/office/drawing/2014/main" xmlns="" id="{06833DA2-9089-4E59-9B9D-7F3A29DCE61C}"/>
+                <a16:creationId xmlns="" xmlns:a16="http://schemas.microsoft.com/office/drawing/2014/main" id="{06833DA2-9089-4E59-9B9D-7F3A29DCE61C}"/>
               </a:ext>
             </a:extLst>
           </p:cNvPr>
@@ -5453,7 +6417,7 @@
           <p:cNvPr id="10" name="Content Placeholder 2">
             <a:extLst>
               <a:ext uri="{FF2B5EF4-FFF2-40B4-BE49-F238E27FC236}">
-                <a16:creationId xmlns:a16="http://schemas.microsoft.com/office/drawing/2014/main" xmlns="" id="{A7A07890-C86B-4334-9F28-D4C01C01B9F8}"/>
+                <a16:creationId xmlns="" xmlns:a16="http://schemas.microsoft.com/office/drawing/2014/main" id="{A7A07890-C86B-4334-9F28-D4C01C01B9F8}"/>
               </a:ext>
             </a:extLst>
           </p:cNvPr>
@@ -5591,7 +6555,7 @@
           <p:cNvPr id="2" name="Title 1">
             <a:extLst>
               <a:ext uri="{FF2B5EF4-FFF2-40B4-BE49-F238E27FC236}">
-                <a16:creationId xmlns:a16="http://schemas.microsoft.com/office/drawing/2014/main" xmlns="" id="{9CFB0DD6-4E13-49C4-9A70-D98C161C8DA2}"/>
+                <a16:creationId xmlns="" xmlns:a16="http://schemas.microsoft.com/office/drawing/2014/main" id="{9CFB0DD6-4E13-49C4-9A70-D98C161C8DA2}"/>
               </a:ext>
             </a:extLst>
           </p:cNvPr>
@@ -5628,7 +6592,7 @@
           <p:cNvPr id="3" name="Subtitle 2">
             <a:extLst>
               <a:ext uri="{FF2B5EF4-FFF2-40B4-BE49-F238E27FC236}">
-                <a16:creationId xmlns:a16="http://schemas.microsoft.com/office/drawing/2014/main" xmlns="" id="{B37A826E-B16E-4C6F-99CE-2E9A071BF7C2}"/>
+                <a16:creationId xmlns="" xmlns:a16="http://schemas.microsoft.com/office/drawing/2014/main" id="{B37A826E-B16E-4C6F-99CE-2E9A071BF7C2}"/>
               </a:ext>
             </a:extLst>
           </p:cNvPr>
@@ -5698,7 +6662,7 @@
           <p:cNvPr id="4" name="Date Placeholder 3">
             <a:extLst>
               <a:ext uri="{FF2B5EF4-FFF2-40B4-BE49-F238E27FC236}">
-                <a16:creationId xmlns:a16="http://schemas.microsoft.com/office/drawing/2014/main" xmlns="" id="{78457BB2-E55F-454D-97E4-364820B7A4D8}"/>
+                <a16:creationId xmlns="" xmlns:a16="http://schemas.microsoft.com/office/drawing/2014/main" id="{78457BB2-E55F-454D-97E4-364820B7A4D8}"/>
               </a:ext>
             </a:extLst>
           </p:cNvPr>
@@ -5727,7 +6691,7 @@
           <p:cNvPr id="5" name="Footer Placeholder 4">
             <a:extLst>
               <a:ext uri="{FF2B5EF4-FFF2-40B4-BE49-F238E27FC236}">
-                <a16:creationId xmlns:a16="http://schemas.microsoft.com/office/drawing/2014/main" xmlns="" id="{4782507C-3967-4419-8F26-13E68DEF7121}"/>
+                <a16:creationId xmlns="" xmlns:a16="http://schemas.microsoft.com/office/drawing/2014/main" id="{4782507C-3967-4419-8F26-13E68DEF7121}"/>
               </a:ext>
             </a:extLst>
           </p:cNvPr>
@@ -5752,7 +6716,7 @@
           <p:cNvPr id="6" name="Slide Number Placeholder 5">
             <a:extLst>
               <a:ext uri="{FF2B5EF4-FFF2-40B4-BE49-F238E27FC236}">
-                <a16:creationId xmlns:a16="http://schemas.microsoft.com/office/drawing/2014/main" xmlns="" id="{26FF91C0-BAFF-4B17-B006-F028B7C589B2}"/>
+                <a16:creationId xmlns="" xmlns:a16="http://schemas.microsoft.com/office/drawing/2014/main" id="{26FF91C0-BAFF-4B17-B006-F028B7C589B2}"/>
               </a:ext>
             </a:extLst>
           </p:cNvPr>
@@ -5811,7 +6775,7 @@
           <p:cNvPr id="2" name="Title 1">
             <a:extLst>
               <a:ext uri="{FF2B5EF4-FFF2-40B4-BE49-F238E27FC236}">
-                <a16:creationId xmlns:a16="http://schemas.microsoft.com/office/drawing/2014/main" xmlns="" id="{2B791061-0968-4914-8CC8-55FACC27E2F7}"/>
+                <a16:creationId xmlns="" xmlns:a16="http://schemas.microsoft.com/office/drawing/2014/main" id="{2B791061-0968-4914-8CC8-55FACC27E2F7}"/>
               </a:ext>
             </a:extLst>
           </p:cNvPr>
@@ -5858,7 +6822,7 @@
           <p:cNvPr id="3" name="Content Placeholder 2">
             <a:extLst>
               <a:ext uri="{FF2B5EF4-FFF2-40B4-BE49-F238E27FC236}">
-                <a16:creationId xmlns:a16="http://schemas.microsoft.com/office/drawing/2014/main" xmlns="" id="{5AD0C258-98F1-47AD-AFB4-8D9E8A9384F2}"/>
+                <a16:creationId xmlns="" xmlns:a16="http://schemas.microsoft.com/office/drawing/2014/main" id="{5AD0C258-98F1-47AD-AFB4-8D9E8A9384F2}"/>
               </a:ext>
             </a:extLst>
           </p:cNvPr>
@@ -5915,7 +6879,7 @@
           <p:cNvPr id="4" name="Date Placeholder 3">
             <a:extLst>
               <a:ext uri="{FF2B5EF4-FFF2-40B4-BE49-F238E27FC236}">
-                <a16:creationId xmlns:a16="http://schemas.microsoft.com/office/drawing/2014/main" xmlns="" id="{8D52EAF4-6C87-4D07-8FA5-B5C4A16CF7C2}"/>
+                <a16:creationId xmlns="" xmlns:a16="http://schemas.microsoft.com/office/drawing/2014/main" id="{8D52EAF4-6C87-4D07-8FA5-B5C4A16CF7C2}"/>
               </a:ext>
             </a:extLst>
           </p:cNvPr>
@@ -5944,7 +6908,7 @@
           <p:cNvPr id="5" name="Footer Placeholder 4">
             <a:extLst>
               <a:ext uri="{FF2B5EF4-FFF2-40B4-BE49-F238E27FC236}">
-                <a16:creationId xmlns:a16="http://schemas.microsoft.com/office/drawing/2014/main" xmlns="" id="{72C0EDAA-1D8F-459F-A2FF-6F60568847B0}"/>
+                <a16:creationId xmlns="" xmlns:a16="http://schemas.microsoft.com/office/drawing/2014/main" id="{72C0EDAA-1D8F-459F-A2FF-6F60568847B0}"/>
               </a:ext>
             </a:extLst>
           </p:cNvPr>
@@ -5969,7 +6933,7 @@
           <p:cNvPr id="6" name="Slide Number Placeholder 5">
             <a:extLst>
               <a:ext uri="{FF2B5EF4-FFF2-40B4-BE49-F238E27FC236}">
-                <a16:creationId xmlns:a16="http://schemas.microsoft.com/office/drawing/2014/main" xmlns="" id="{5108E5C7-6C19-4E58-8B28-D0AD4641A83A}"/>
+                <a16:creationId xmlns="" xmlns:a16="http://schemas.microsoft.com/office/drawing/2014/main" id="{5108E5C7-6C19-4E58-8B28-D0AD4641A83A}"/>
               </a:ext>
             </a:extLst>
           </p:cNvPr>
@@ -6028,7 +6992,7 @@
           <p:cNvPr id="2" name="Title 1">
             <a:extLst>
               <a:ext uri="{FF2B5EF4-FFF2-40B4-BE49-F238E27FC236}">
-                <a16:creationId xmlns:a16="http://schemas.microsoft.com/office/drawing/2014/main" xmlns="" id="{0101F719-B971-48B3-BB3C-FDACE096A9D6}"/>
+                <a16:creationId xmlns="" xmlns:a16="http://schemas.microsoft.com/office/drawing/2014/main" id="{0101F719-B971-48B3-BB3C-FDACE096A9D6}"/>
               </a:ext>
             </a:extLst>
           </p:cNvPr>
@@ -6065,7 +7029,7 @@
           <p:cNvPr id="3" name="Text Placeholder 2">
             <a:extLst>
               <a:ext uri="{FF2B5EF4-FFF2-40B4-BE49-F238E27FC236}">
-                <a16:creationId xmlns:a16="http://schemas.microsoft.com/office/drawing/2014/main" xmlns="" id="{D2F895F3-6654-4B0B-B4DF-D7261C7A815E}"/>
+                <a16:creationId xmlns="" xmlns:a16="http://schemas.microsoft.com/office/drawing/2014/main" id="{D2F895F3-6654-4B0B-B4DF-D7261C7A815E}"/>
               </a:ext>
             </a:extLst>
           </p:cNvPr>
@@ -6190,7 +7154,7 @@
           <p:cNvPr id="4" name="Date Placeholder 3">
             <a:extLst>
               <a:ext uri="{FF2B5EF4-FFF2-40B4-BE49-F238E27FC236}">
-                <a16:creationId xmlns:a16="http://schemas.microsoft.com/office/drawing/2014/main" xmlns="" id="{CE90CC53-1863-445F-B700-412477A7429F}"/>
+                <a16:creationId xmlns="" xmlns:a16="http://schemas.microsoft.com/office/drawing/2014/main" id="{CE90CC53-1863-445F-B700-412477A7429F}"/>
               </a:ext>
             </a:extLst>
           </p:cNvPr>
@@ -6219,7 +7183,7 @@
           <p:cNvPr id="5" name="Footer Placeholder 4">
             <a:extLst>
               <a:ext uri="{FF2B5EF4-FFF2-40B4-BE49-F238E27FC236}">
-                <a16:creationId xmlns:a16="http://schemas.microsoft.com/office/drawing/2014/main" xmlns="" id="{F20BD010-914B-4B1D-B2E9-918154C7973F}"/>
+                <a16:creationId xmlns="" xmlns:a16="http://schemas.microsoft.com/office/drawing/2014/main" id="{F20BD010-914B-4B1D-B2E9-918154C7973F}"/>
               </a:ext>
             </a:extLst>
           </p:cNvPr>
@@ -6244,7 +7208,7 @@
           <p:cNvPr id="6" name="Slide Number Placeholder 5">
             <a:extLst>
               <a:ext uri="{FF2B5EF4-FFF2-40B4-BE49-F238E27FC236}">
-                <a16:creationId xmlns:a16="http://schemas.microsoft.com/office/drawing/2014/main" xmlns="" id="{A35AB0C9-767B-4422-A888-4F5F2DD21E4D}"/>
+                <a16:creationId xmlns="" xmlns:a16="http://schemas.microsoft.com/office/drawing/2014/main" id="{A35AB0C9-767B-4422-A888-4F5F2DD21E4D}"/>
               </a:ext>
             </a:extLst>
           </p:cNvPr>
@@ -6303,7 +7267,7 @@
           <p:cNvPr id="2" name="Title 1">
             <a:extLst>
               <a:ext uri="{FF2B5EF4-FFF2-40B4-BE49-F238E27FC236}">
-                <a16:creationId xmlns:a16="http://schemas.microsoft.com/office/drawing/2014/main" xmlns="" id="{6D59A6F9-746D-45B1-B086-2F4E604ACB37}"/>
+                <a16:creationId xmlns="" xmlns:a16="http://schemas.microsoft.com/office/drawing/2014/main" id="{6D59A6F9-746D-45B1-B086-2F4E604ACB37}"/>
               </a:ext>
             </a:extLst>
           </p:cNvPr>
@@ -6331,7 +7295,7 @@
           <p:cNvPr id="3" name="Content Placeholder 2">
             <a:extLst>
               <a:ext uri="{FF2B5EF4-FFF2-40B4-BE49-F238E27FC236}">
-                <a16:creationId xmlns:a16="http://schemas.microsoft.com/office/drawing/2014/main" xmlns="" id="{5C71BC7C-4B78-4CBB-8C9A-568A0F0FF3DB}"/>
+                <a16:creationId xmlns="" xmlns:a16="http://schemas.microsoft.com/office/drawing/2014/main" id="{5C71BC7C-4B78-4CBB-8C9A-568A0F0FF3DB}"/>
               </a:ext>
             </a:extLst>
           </p:cNvPr>
@@ -6393,7 +7357,7 @@
           <p:cNvPr id="4" name="Content Placeholder 3">
             <a:extLst>
               <a:ext uri="{FF2B5EF4-FFF2-40B4-BE49-F238E27FC236}">
-                <a16:creationId xmlns:a16="http://schemas.microsoft.com/office/drawing/2014/main" xmlns="" id="{086A9EBB-2D7A-46FB-97BF-0BEB0B9237C1}"/>
+                <a16:creationId xmlns="" xmlns:a16="http://schemas.microsoft.com/office/drawing/2014/main" id="{086A9EBB-2D7A-46FB-97BF-0BEB0B9237C1}"/>
               </a:ext>
             </a:extLst>
           </p:cNvPr>
@@ -6455,7 +7419,7 @@
           <p:cNvPr id="5" name="Date Placeholder 4">
             <a:extLst>
               <a:ext uri="{FF2B5EF4-FFF2-40B4-BE49-F238E27FC236}">
-                <a16:creationId xmlns:a16="http://schemas.microsoft.com/office/drawing/2014/main" xmlns="" id="{C3635AC8-78D0-48ED-AD53-C02947976843}"/>
+                <a16:creationId xmlns="" xmlns:a16="http://schemas.microsoft.com/office/drawing/2014/main" id="{C3635AC8-78D0-48ED-AD53-C02947976843}"/>
               </a:ext>
             </a:extLst>
           </p:cNvPr>
@@ -6484,7 +7448,7 @@
           <p:cNvPr id="6" name="Footer Placeholder 5">
             <a:extLst>
               <a:ext uri="{FF2B5EF4-FFF2-40B4-BE49-F238E27FC236}">
-                <a16:creationId xmlns:a16="http://schemas.microsoft.com/office/drawing/2014/main" xmlns="" id="{AE84FA83-6EBE-429E-A5C1-E95F389C4B4F}"/>
+                <a16:creationId xmlns="" xmlns:a16="http://schemas.microsoft.com/office/drawing/2014/main" id="{AE84FA83-6EBE-429E-A5C1-E95F389C4B4F}"/>
               </a:ext>
             </a:extLst>
           </p:cNvPr>
@@ -6509,7 +7473,7 @@
           <p:cNvPr id="7" name="Slide Number Placeholder 6">
             <a:extLst>
               <a:ext uri="{FF2B5EF4-FFF2-40B4-BE49-F238E27FC236}">
-                <a16:creationId xmlns:a16="http://schemas.microsoft.com/office/drawing/2014/main" xmlns="" id="{D480274C-F123-44A8-9288-181E45411977}"/>
+                <a16:creationId xmlns="" xmlns:a16="http://schemas.microsoft.com/office/drawing/2014/main" id="{D480274C-F123-44A8-9288-181E45411977}"/>
               </a:ext>
             </a:extLst>
           </p:cNvPr>
@@ -6568,7 +7532,7 @@
           <p:cNvPr id="2" name="Title 1">
             <a:extLst>
               <a:ext uri="{FF2B5EF4-FFF2-40B4-BE49-F238E27FC236}">
-                <a16:creationId xmlns:a16="http://schemas.microsoft.com/office/drawing/2014/main" xmlns="" id="{0197828D-B33B-4E15-B858-F3BC5C74FB93}"/>
+                <a16:creationId xmlns="" xmlns:a16="http://schemas.microsoft.com/office/drawing/2014/main" id="{0197828D-B33B-4E15-B858-F3BC5C74FB93}"/>
               </a:ext>
             </a:extLst>
           </p:cNvPr>
@@ -6601,7 +7565,7 @@
           <p:cNvPr id="3" name="Text Placeholder 2">
             <a:extLst>
               <a:ext uri="{FF2B5EF4-FFF2-40B4-BE49-F238E27FC236}">
-                <a16:creationId xmlns:a16="http://schemas.microsoft.com/office/drawing/2014/main" xmlns="" id="{8E1E93DD-C325-459D-94A2-5B2ACD9ED40C}"/>
+                <a16:creationId xmlns="" xmlns:a16="http://schemas.microsoft.com/office/drawing/2014/main" id="{8E1E93DD-C325-459D-94A2-5B2ACD9ED40C}"/>
               </a:ext>
             </a:extLst>
           </p:cNvPr>
@@ -6672,7 +7636,7 @@
           <p:cNvPr id="4" name="Content Placeholder 3">
             <a:extLst>
               <a:ext uri="{FF2B5EF4-FFF2-40B4-BE49-F238E27FC236}">
-                <a16:creationId xmlns:a16="http://schemas.microsoft.com/office/drawing/2014/main" xmlns="" id="{3815F098-5E41-4BFF-842A-0AA0BED98175}"/>
+                <a16:creationId xmlns="" xmlns:a16="http://schemas.microsoft.com/office/drawing/2014/main" id="{3815F098-5E41-4BFF-842A-0AA0BED98175}"/>
               </a:ext>
             </a:extLst>
           </p:cNvPr>
@@ -6734,7 +7698,7 @@
           <p:cNvPr id="5" name="Text Placeholder 4">
             <a:extLst>
               <a:ext uri="{FF2B5EF4-FFF2-40B4-BE49-F238E27FC236}">
-                <a16:creationId xmlns:a16="http://schemas.microsoft.com/office/drawing/2014/main" xmlns="" id="{BC0A17BF-6A05-4C5B-9950-579B0B89B457}"/>
+                <a16:creationId xmlns="" xmlns:a16="http://schemas.microsoft.com/office/drawing/2014/main" id="{BC0A17BF-6A05-4C5B-9950-579B0B89B457}"/>
               </a:ext>
             </a:extLst>
           </p:cNvPr>
@@ -6805,7 +7769,7 @@
           <p:cNvPr id="6" name="Content Placeholder 5">
             <a:extLst>
               <a:ext uri="{FF2B5EF4-FFF2-40B4-BE49-F238E27FC236}">
-                <a16:creationId xmlns:a16="http://schemas.microsoft.com/office/drawing/2014/main" xmlns="" id="{98FB8C13-CBFD-4D17-8532-153FAC61665C}"/>
+                <a16:creationId xmlns="" xmlns:a16="http://schemas.microsoft.com/office/drawing/2014/main" id="{98FB8C13-CBFD-4D17-8532-153FAC61665C}"/>
               </a:ext>
             </a:extLst>
           </p:cNvPr>
@@ -6867,7 +7831,7 @@
           <p:cNvPr id="7" name="Date Placeholder 6">
             <a:extLst>
               <a:ext uri="{FF2B5EF4-FFF2-40B4-BE49-F238E27FC236}">
-                <a16:creationId xmlns:a16="http://schemas.microsoft.com/office/drawing/2014/main" xmlns="" id="{89395BCA-54C0-4D78-9DD1-610F4933E170}"/>
+                <a16:creationId xmlns="" xmlns:a16="http://schemas.microsoft.com/office/drawing/2014/main" id="{89395BCA-54C0-4D78-9DD1-610F4933E170}"/>
               </a:ext>
             </a:extLst>
           </p:cNvPr>
@@ -6896,7 +7860,7 @@
           <p:cNvPr id="8" name="Footer Placeholder 7">
             <a:extLst>
               <a:ext uri="{FF2B5EF4-FFF2-40B4-BE49-F238E27FC236}">
-                <a16:creationId xmlns:a16="http://schemas.microsoft.com/office/drawing/2014/main" xmlns="" id="{4361483C-0511-4283-B879-5863839281C8}"/>
+                <a16:creationId xmlns="" xmlns:a16="http://schemas.microsoft.com/office/drawing/2014/main" id="{4361483C-0511-4283-B879-5863839281C8}"/>
               </a:ext>
             </a:extLst>
           </p:cNvPr>
@@ -6921,7 +7885,7 @@
           <p:cNvPr id="9" name="Slide Number Placeholder 8">
             <a:extLst>
               <a:ext uri="{FF2B5EF4-FFF2-40B4-BE49-F238E27FC236}">
-                <a16:creationId xmlns:a16="http://schemas.microsoft.com/office/drawing/2014/main" xmlns="" id="{02AFC59F-5891-4017-A991-2AA425B7806C}"/>
+                <a16:creationId xmlns="" xmlns:a16="http://schemas.microsoft.com/office/drawing/2014/main" id="{02AFC59F-5891-4017-A991-2AA425B7806C}"/>
               </a:ext>
             </a:extLst>
           </p:cNvPr>
@@ -6980,7 +7944,7 @@
           <p:cNvPr id="2" name="Title 1">
             <a:extLst>
               <a:ext uri="{FF2B5EF4-FFF2-40B4-BE49-F238E27FC236}">
-                <a16:creationId xmlns:a16="http://schemas.microsoft.com/office/drawing/2014/main" xmlns="" id="{989AB40E-AF67-4BA7-84F1-3670F0372965}"/>
+                <a16:creationId xmlns="" xmlns:a16="http://schemas.microsoft.com/office/drawing/2014/main" id="{989AB40E-AF67-4BA7-84F1-3670F0372965}"/>
               </a:ext>
             </a:extLst>
           </p:cNvPr>
@@ -7008,7 +7972,7 @@
           <p:cNvPr id="3" name="Date Placeholder 2">
             <a:extLst>
               <a:ext uri="{FF2B5EF4-FFF2-40B4-BE49-F238E27FC236}">
-                <a16:creationId xmlns:a16="http://schemas.microsoft.com/office/drawing/2014/main" xmlns="" id="{246A58ED-104A-424C-BDF6-0EA720F892DE}"/>
+                <a16:creationId xmlns="" xmlns:a16="http://schemas.microsoft.com/office/drawing/2014/main" id="{246A58ED-104A-424C-BDF6-0EA720F892DE}"/>
               </a:ext>
             </a:extLst>
           </p:cNvPr>
@@ -7037,7 +8001,7 @@
           <p:cNvPr id="4" name="Footer Placeholder 3">
             <a:extLst>
               <a:ext uri="{FF2B5EF4-FFF2-40B4-BE49-F238E27FC236}">
-                <a16:creationId xmlns:a16="http://schemas.microsoft.com/office/drawing/2014/main" xmlns="" id="{E110AF60-75DF-4A0B-B16C-DD22E04AFB06}"/>
+                <a16:creationId xmlns="" xmlns:a16="http://schemas.microsoft.com/office/drawing/2014/main" id="{E110AF60-75DF-4A0B-B16C-DD22E04AFB06}"/>
               </a:ext>
             </a:extLst>
           </p:cNvPr>
@@ -7062,7 +8026,7 @@
           <p:cNvPr id="5" name="Slide Number Placeholder 4">
             <a:extLst>
               <a:ext uri="{FF2B5EF4-FFF2-40B4-BE49-F238E27FC236}">
-                <a16:creationId xmlns:a16="http://schemas.microsoft.com/office/drawing/2014/main" xmlns="" id="{9F8D98D7-EA8E-4306-A063-3A4EEBDEB2C4}"/>
+                <a16:creationId xmlns="" xmlns:a16="http://schemas.microsoft.com/office/drawing/2014/main" id="{9F8D98D7-EA8E-4306-A063-3A4EEBDEB2C4}"/>
               </a:ext>
             </a:extLst>
           </p:cNvPr>
@@ -7818,7 +8782,7 @@
           <p:cNvPr id="2" name="Title Placeholder 1">
             <a:extLst>
               <a:ext uri="{FF2B5EF4-FFF2-40B4-BE49-F238E27FC236}">
-                <a16:creationId xmlns:a16="http://schemas.microsoft.com/office/drawing/2014/main" xmlns="" id="{B261DB75-399B-4142-9D86-1BA3C1303FF2}"/>
+                <a16:creationId xmlns="" xmlns:a16="http://schemas.microsoft.com/office/drawing/2014/main" id="{B261DB75-399B-4142-9D86-1BA3C1303FF2}"/>
               </a:ext>
             </a:extLst>
           </p:cNvPr>
@@ -7856,7 +8820,7 @@
           <p:cNvPr id="3" name="Text Placeholder 2">
             <a:extLst>
               <a:ext uri="{FF2B5EF4-FFF2-40B4-BE49-F238E27FC236}">
-                <a16:creationId xmlns:a16="http://schemas.microsoft.com/office/drawing/2014/main" xmlns="" id="{FE9B541C-D616-4967-ACD8-5A52170991DD}"/>
+                <a16:creationId xmlns="" xmlns:a16="http://schemas.microsoft.com/office/drawing/2014/main" id="{FE9B541C-D616-4967-ACD8-5A52170991DD}"/>
               </a:ext>
             </a:extLst>
           </p:cNvPr>
@@ -7923,7 +8887,7 @@
           <p:cNvPr id="4" name="Date Placeholder 3">
             <a:extLst>
               <a:ext uri="{FF2B5EF4-FFF2-40B4-BE49-F238E27FC236}">
-                <a16:creationId xmlns:a16="http://schemas.microsoft.com/office/drawing/2014/main" xmlns="" id="{137F18BA-496D-410A-BBC4-0E5B5A5CAECA}"/>
+                <a16:creationId xmlns="" xmlns:a16="http://schemas.microsoft.com/office/drawing/2014/main" id="{137F18BA-496D-410A-BBC4-0E5B5A5CAECA}"/>
               </a:ext>
             </a:extLst>
           </p:cNvPr>
@@ -7970,7 +8934,7 @@
           <p:cNvPr id="5" name="Footer Placeholder 4">
             <a:extLst>
               <a:ext uri="{FF2B5EF4-FFF2-40B4-BE49-F238E27FC236}">
-                <a16:creationId xmlns:a16="http://schemas.microsoft.com/office/drawing/2014/main" xmlns="" id="{9F5238E0-715C-4506-943E-C9E347BAA2B7}"/>
+                <a16:creationId xmlns="" xmlns:a16="http://schemas.microsoft.com/office/drawing/2014/main" id="{9F5238E0-715C-4506-943E-C9E347BAA2B7}"/>
               </a:ext>
             </a:extLst>
           </p:cNvPr>
@@ -8013,7 +8977,7 @@
           <p:cNvPr id="6" name="Slide Number Placeholder 5">
             <a:extLst>
               <a:ext uri="{FF2B5EF4-FFF2-40B4-BE49-F238E27FC236}">
-                <a16:creationId xmlns:a16="http://schemas.microsoft.com/office/drawing/2014/main" xmlns="" id="{3C0E50ED-D1E2-4BBE-83CE-79AFDF3D88A2}"/>
+                <a16:creationId xmlns="" xmlns:a16="http://schemas.microsoft.com/office/drawing/2014/main" id="{3C0E50ED-D1E2-4BBE-83CE-79AFDF3D88A2}"/>
               </a:ext>
             </a:extLst>
           </p:cNvPr>
@@ -8075,6 +9039,8 @@
     <p:sldLayoutId id="2147483718" r:id="rId9"/>
     <p:sldLayoutId id="2147483719" r:id="rId10"/>
     <p:sldLayoutId id="2147483720" r:id="rId11"/>
+    <p:sldLayoutId id="2147483751" r:id="rId12"/>
+    <p:sldLayoutId id="2147483752" r:id="rId13"/>
   </p:sldLayoutIdLst>
   <p:txStyles>
     <p:titleStyle>
@@ -8381,7 +9347,7 @@
           <p:cNvPr id="2" name="Title 1">
             <a:extLst>
               <a:ext uri="{FF2B5EF4-FFF2-40B4-BE49-F238E27FC236}">
-                <a16:creationId xmlns:a16="http://schemas.microsoft.com/office/drawing/2014/main" xmlns="" id="{5D419624-E12C-4E4E-A6D6-C094AC0C6809}"/>
+                <a16:creationId xmlns="" xmlns:a16="http://schemas.microsoft.com/office/drawing/2014/main" id="{5D419624-E12C-4E4E-A6D6-C094AC0C6809}"/>
               </a:ext>
             </a:extLst>
           </p:cNvPr>
@@ -8409,7 +9375,7 @@
           <p:cNvPr id="3" name="Text Placeholder 2">
             <a:extLst>
               <a:ext uri="{FF2B5EF4-FFF2-40B4-BE49-F238E27FC236}">
-                <a16:creationId xmlns:a16="http://schemas.microsoft.com/office/drawing/2014/main" xmlns="" id="{3A4F6066-220D-4924-8324-EC2732A6A73A}"/>
+                <a16:creationId xmlns="" xmlns:a16="http://schemas.microsoft.com/office/drawing/2014/main" id="{3A4F6066-220D-4924-8324-EC2732A6A73A}"/>
               </a:ext>
             </a:extLst>
           </p:cNvPr>
@@ -8464,7 +9430,7 @@
           <p:cNvPr id="2" name="Title 1">
             <a:extLst>
               <a:ext uri="{FF2B5EF4-FFF2-40B4-BE49-F238E27FC236}">
-                <a16:creationId xmlns:a16="http://schemas.microsoft.com/office/drawing/2014/main" xmlns="" id="{0FBA2492-37F7-4FA9-BF82-E5D21ECC6E89}"/>
+                <a16:creationId xmlns="" xmlns:a16="http://schemas.microsoft.com/office/drawing/2014/main" id="{0FBA2492-37F7-4FA9-BF82-E5D21ECC6E89}"/>
               </a:ext>
             </a:extLst>
           </p:cNvPr>
@@ -8492,7 +9458,7 @@
           <p:cNvPr id="3" name="Content Placeholder 2">
             <a:extLst>
               <a:ext uri="{FF2B5EF4-FFF2-40B4-BE49-F238E27FC236}">
-                <a16:creationId xmlns:a16="http://schemas.microsoft.com/office/drawing/2014/main" xmlns="" id="{4991A86A-CBE1-401B-AE0D-A6807A25492F}"/>
+                <a16:creationId xmlns="" xmlns:a16="http://schemas.microsoft.com/office/drawing/2014/main" id="{4991A86A-CBE1-401B-AE0D-A6807A25492F}"/>
               </a:ext>
             </a:extLst>
           </p:cNvPr>
@@ -8612,7 +9578,7 @@
           <p:cNvPr id="2" name="Title 1">
             <a:extLst>
               <a:ext uri="{FF2B5EF4-FFF2-40B4-BE49-F238E27FC236}">
-                <a16:creationId xmlns:a16="http://schemas.microsoft.com/office/drawing/2014/main" xmlns="" id="{D076DA87-D9B5-411E-BB7B-13AA1D6D8C86}"/>
+                <a16:creationId xmlns="" xmlns:a16="http://schemas.microsoft.com/office/drawing/2014/main" id="{D076DA87-D9B5-411E-BB7B-13AA1D6D8C86}"/>
               </a:ext>
             </a:extLst>
           </p:cNvPr>
@@ -8640,7 +9606,7 @@
           <p:cNvPr id="4" name="Content Placeholder 3">
             <a:extLst>
               <a:ext uri="{FF2B5EF4-FFF2-40B4-BE49-F238E27FC236}">
-                <a16:creationId xmlns:a16="http://schemas.microsoft.com/office/drawing/2014/main" xmlns="" id="{A5DA0F8F-AD0F-42EF-ACFA-AE84E05A92B1}"/>
+                <a16:creationId xmlns="" xmlns:a16="http://schemas.microsoft.com/office/drawing/2014/main" id="{A5DA0F8F-AD0F-42EF-ACFA-AE84E05A92B1}"/>
               </a:ext>
             </a:extLst>
           </p:cNvPr>
@@ -8670,14 +9636,14 @@
                 <a:gridCol w="5257800">
                   <a:extLst>
                     <a:ext uri="{9D8B030D-6E8A-4147-A177-3AD203B41FA5}">
-                      <a16:colId xmlns:a16="http://schemas.microsoft.com/office/drawing/2014/main" xmlns="" val="3730928322"/>
+                      <a16:colId xmlns="" xmlns:a16="http://schemas.microsoft.com/office/drawing/2014/main" val="3730928322"/>
                     </a:ext>
                   </a:extLst>
                 </a:gridCol>
                 <a:gridCol w="5257800">
                   <a:extLst>
                     <a:ext uri="{9D8B030D-6E8A-4147-A177-3AD203B41FA5}">
-                      <a16:colId xmlns:a16="http://schemas.microsoft.com/office/drawing/2014/main" xmlns="" val="2346454285"/>
+                      <a16:colId xmlns="" xmlns:a16="http://schemas.microsoft.com/office/drawing/2014/main" val="2346454285"/>
                     </a:ext>
                   </a:extLst>
                 </a:gridCol>
@@ -8711,7 +9677,7 @@
                 </a:tc>
                 <a:extLst>
                   <a:ext uri="{0D108BD9-81ED-4DB2-BD59-A6C34878D82A}">
-                    <a16:rowId xmlns:a16="http://schemas.microsoft.com/office/drawing/2014/main" xmlns="" val="3303154205"/>
+                    <a16:rowId xmlns="" xmlns:a16="http://schemas.microsoft.com/office/drawing/2014/main" val="3303154205"/>
                   </a:ext>
                 </a:extLst>
               </a:tr>
@@ -8970,7 +9936,7 @@
                 </a:tc>
                 <a:extLst>
                   <a:ext uri="{0D108BD9-81ED-4DB2-BD59-A6C34878D82A}">
-                    <a16:rowId xmlns:a16="http://schemas.microsoft.com/office/drawing/2014/main" xmlns="" val="608728941"/>
+                    <a16:rowId xmlns="" xmlns:a16="http://schemas.microsoft.com/office/drawing/2014/main" val="608728941"/>
                   </a:ext>
                 </a:extLst>
               </a:tr>
@@ -9013,7 +9979,7 @@
           <p:cNvPr id="2" name="Title 1">
             <a:extLst>
               <a:ext uri="{FF2B5EF4-FFF2-40B4-BE49-F238E27FC236}">
-                <a16:creationId xmlns:a16="http://schemas.microsoft.com/office/drawing/2014/main" xmlns="" id="{AF20BC31-EFB3-408F-B1B4-0F4EF10535E5}"/>
+                <a16:creationId xmlns="" xmlns:a16="http://schemas.microsoft.com/office/drawing/2014/main" id="{AF20BC31-EFB3-408F-B1B4-0F4EF10535E5}"/>
               </a:ext>
             </a:extLst>
           </p:cNvPr>
@@ -9041,7 +10007,7 @@
           <p:cNvPr id="3" name="Content Placeholder 2">
             <a:extLst>
               <a:ext uri="{FF2B5EF4-FFF2-40B4-BE49-F238E27FC236}">
-                <a16:creationId xmlns:a16="http://schemas.microsoft.com/office/drawing/2014/main" xmlns="" id="{F2889C2F-DD15-45E1-96FD-A2D5D3E69370}"/>
+                <a16:creationId xmlns="" xmlns:a16="http://schemas.microsoft.com/office/drawing/2014/main" id="{F2889C2F-DD15-45E1-96FD-A2D5D3E69370}"/>
               </a:ext>
             </a:extLst>
           </p:cNvPr>
@@ -9083,7 +10049,7 @@
           <p:cNvPr id="4" name="TextBox 3">
             <a:extLst>
               <a:ext uri="{FF2B5EF4-FFF2-40B4-BE49-F238E27FC236}">
-                <a16:creationId xmlns:a16="http://schemas.microsoft.com/office/drawing/2014/main" xmlns="" id="{98430BAC-C074-4B42-A008-D0C6BBC927AF}"/>
+                <a16:creationId xmlns="" xmlns:a16="http://schemas.microsoft.com/office/drawing/2014/main" id="{98430BAC-C074-4B42-A008-D0C6BBC927AF}"/>
               </a:ext>
             </a:extLst>
           </p:cNvPr>
@@ -9757,7 +10723,7 @@
           <p:cNvPr id="2" name="Title 1">
             <a:extLst>
               <a:ext uri="{FF2B5EF4-FFF2-40B4-BE49-F238E27FC236}">
-                <a16:creationId xmlns:a16="http://schemas.microsoft.com/office/drawing/2014/main" xmlns="" id="{EA89E109-BC82-468D-8B35-1D666433C7C8}"/>
+                <a16:creationId xmlns="" xmlns:a16="http://schemas.microsoft.com/office/drawing/2014/main" id="{EA89E109-BC82-468D-8B35-1D666433C7C8}"/>
               </a:ext>
             </a:extLst>
           </p:cNvPr>
@@ -9839,7 +10805,7 @@
           <p:cNvPr id="2" name="Title 1">
             <a:extLst>
               <a:ext uri="{FF2B5EF4-FFF2-40B4-BE49-F238E27FC236}">
-                <a16:creationId xmlns:a16="http://schemas.microsoft.com/office/drawing/2014/main" xmlns="" id="{6E0124F3-778A-4B51-9531-2FBFB3550680}"/>
+                <a16:creationId xmlns="" xmlns:a16="http://schemas.microsoft.com/office/drawing/2014/main" id="{6E0124F3-778A-4B51-9531-2FBFB3550680}"/>
               </a:ext>
             </a:extLst>
           </p:cNvPr>
@@ -9872,7 +10838,7 @@
           <p:cNvPr id="3" name="Text Placeholder 2">
             <a:extLst>
               <a:ext uri="{FF2B5EF4-FFF2-40B4-BE49-F238E27FC236}">
-                <a16:creationId xmlns:a16="http://schemas.microsoft.com/office/drawing/2014/main" xmlns="" id="{6E532B85-B928-4F31-8F50-F9C17C7085E3}"/>
+                <a16:creationId xmlns="" xmlns:a16="http://schemas.microsoft.com/office/drawing/2014/main" id="{6E532B85-B928-4F31-8F50-F9C17C7085E3}"/>
               </a:ext>
             </a:extLst>
           </p:cNvPr>
@@ -9927,7 +10893,7 @@
           <p:cNvPr id="2" name="Title 1">
             <a:extLst>
               <a:ext uri="{FF2B5EF4-FFF2-40B4-BE49-F238E27FC236}">
-                <a16:creationId xmlns:a16="http://schemas.microsoft.com/office/drawing/2014/main" xmlns="" id="{D9902204-D024-4B3E-BAD5-EA2426A8D1E6}"/>
+                <a16:creationId xmlns="" xmlns:a16="http://schemas.microsoft.com/office/drawing/2014/main" id="{D9902204-D024-4B3E-BAD5-EA2426A8D1E6}"/>
               </a:ext>
             </a:extLst>
           </p:cNvPr>
@@ -9956,7 +10922,7 @@
           <p:cNvPr id="3" name="Content Placeholder 2">
             <a:extLst>
               <a:ext uri="{FF2B5EF4-FFF2-40B4-BE49-F238E27FC236}">
-                <a16:creationId xmlns:a16="http://schemas.microsoft.com/office/drawing/2014/main" xmlns="" id="{10268B94-2AF6-4ADF-BC5F-B8A1EEF2B0D3}"/>
+                <a16:creationId xmlns="" xmlns:a16="http://schemas.microsoft.com/office/drawing/2014/main" id="{10268B94-2AF6-4ADF-BC5F-B8A1EEF2B0D3}"/>
               </a:ext>
             </a:extLst>
           </p:cNvPr>
@@ -10041,7 +11007,7 @@
           <p:cNvPr id="2" name="Title 1">
             <a:extLst>
               <a:ext uri="{FF2B5EF4-FFF2-40B4-BE49-F238E27FC236}">
-                <a16:creationId xmlns:a16="http://schemas.microsoft.com/office/drawing/2014/main" xmlns="" id="{D9902204-D024-4B3E-BAD5-EA2426A8D1E6}"/>
+                <a16:creationId xmlns="" xmlns:a16="http://schemas.microsoft.com/office/drawing/2014/main" id="{D9902204-D024-4B3E-BAD5-EA2426A8D1E6}"/>
               </a:ext>
             </a:extLst>
           </p:cNvPr>
@@ -10129,7 +11095,192 @@
           <p:cNvPr id="2" name="Title 1">
             <a:extLst>
               <a:ext uri="{FF2B5EF4-FFF2-40B4-BE49-F238E27FC236}">
-                <a16:creationId xmlns:a16="http://schemas.microsoft.com/office/drawing/2014/main" xmlns="" id="{D9902204-D024-4B3E-BAD5-EA2426A8D1E6}"/>
+                <a16:creationId xmlns="" xmlns:a16="http://schemas.microsoft.com/office/drawing/2014/main" id="{D9902204-D024-4B3E-BAD5-EA2426A8D1E6}"/>
+              </a:ext>
+            </a:extLst>
+          </p:cNvPr>
+          <p:cNvSpPr>
+            <a:spLocks noGrp="1"/>
+          </p:cNvSpPr>
+          <p:nvPr>
+            <p:ph type="title"/>
+          </p:nvPr>
+        </p:nvSpPr>
+        <p:spPr/>
+        <p:txBody>
+          <a:bodyPr/>
+          <a:lstStyle/>
+          <a:p>
+            <a:r>
+              <a:rPr lang="en-US" dirty="0" smtClean="0"/>
+              <a:t>AD FS</a:t>
+            </a:r>
+            <a:endParaRPr lang="en-US" dirty="0"/>
+          </a:p>
+        </p:txBody>
+      </p:sp>
+      <p:sp>
+        <p:nvSpPr>
+          <p:cNvPr id="3" name="Content Placeholder 2">
+            <a:extLst>
+              <a:ext uri="{FF2B5EF4-FFF2-40B4-BE49-F238E27FC236}">
+                <a16:creationId xmlns="" xmlns:a16="http://schemas.microsoft.com/office/drawing/2014/main" id="{10268B94-2AF6-4ADF-BC5F-B8A1EEF2B0D3}"/>
+              </a:ext>
+            </a:extLst>
+          </p:cNvPr>
+          <p:cNvSpPr>
+            <a:spLocks noGrp="1"/>
+          </p:cNvSpPr>
+          <p:nvPr>
+            <p:ph idx="1"/>
+          </p:nvPr>
+        </p:nvSpPr>
+        <p:spPr/>
+        <p:txBody>
+          <a:bodyPr>
+            <a:normAutofit/>
+          </a:bodyPr>
+          <a:lstStyle/>
+          <a:p>
+            <a:pPr marL="171450" indent="-171450">
+              <a:buFont typeface="Arial"/>
+              <a:buChar char="•"/>
+            </a:pPr>
+            <a:r>
+              <a:rPr lang="en-US" dirty="0"/>
+              <a:t>Simplicity</a:t>
+            </a:r>
+            <a:r>
+              <a:rPr lang="en-US" dirty="0"/>
+              <a:t> and consistency</a:t>
+            </a:r>
+          </a:p>
+          <a:p>
+            <a:pPr marL="628650" lvl="1" indent="-171450">
+              <a:buFont typeface="Arial"/>
+              <a:buChar char="•"/>
+            </a:pPr>
+            <a:r>
+              <a:rPr lang="en-US" dirty="0" smtClean="0"/>
+              <a:t>Use the same set of APIs and patterns to enable sign on</a:t>
+            </a:r>
+          </a:p>
+          <a:p>
+            <a:pPr marL="628650" lvl="1" indent="-171450">
+              <a:buFont typeface="Arial"/>
+              <a:buChar char="•"/>
+            </a:pPr>
+            <a:r>
+              <a:rPr lang="en-US" dirty="0" smtClean="0"/>
+              <a:t>Use the same set of libraries you can already use to authenticate users against Azure AD</a:t>
+            </a:r>
+          </a:p>
+          <a:p>
+            <a:pPr marL="171450" indent="-171450">
+              <a:buFont typeface="Arial"/>
+              <a:buChar char="•"/>
+            </a:pPr>
+            <a:r>
+              <a:rPr lang="en-US" dirty="0" smtClean="0"/>
+              <a:t>Flexibility</a:t>
+            </a:r>
+            <a:endParaRPr lang="en-US" dirty="0"/>
+          </a:p>
+          <a:p>
+            <a:pPr marL="628650" lvl="1" indent="-171450">
+              <a:buFont typeface="Arial"/>
+              <a:buChar char="•"/>
+            </a:pPr>
+            <a:r>
+              <a:rPr lang="en-US" dirty="0"/>
+              <a:t>In addition to standard user authorization, enable more complex </a:t>
+            </a:r>
+            <a:r>
+              <a:rPr lang="en-US" dirty="0" smtClean="0"/>
+              <a:t>scenarios</a:t>
+            </a:r>
+            <a:endParaRPr lang="en-US" dirty="0"/>
+          </a:p>
+          <a:p>
+            <a:pPr marL="171450" indent="-171450">
+              <a:buFont typeface="Arial"/>
+              <a:buChar char="•"/>
+            </a:pPr>
+            <a:r>
+              <a:rPr lang="en-US" dirty="0" smtClean="0"/>
+              <a:t>Industry </a:t>
+            </a:r>
+            <a:r>
+              <a:rPr lang="en-US" dirty="0"/>
+              <a:t>support</a:t>
+            </a:r>
+          </a:p>
+          <a:p>
+            <a:pPr marL="628650" lvl="1" indent="-171450">
+              <a:buFont typeface="Arial"/>
+              <a:buChar char="•"/>
+            </a:pPr>
+            <a:r>
+              <a:rPr lang="en-US" dirty="0" err="1"/>
+              <a:t>OAuth</a:t>
+            </a:r>
+            <a:r>
+              <a:rPr lang="en-US" dirty="0"/>
+              <a:t> 2.0 and </a:t>
+            </a:r>
+            <a:r>
+              <a:rPr lang="en-US" dirty="0" err="1"/>
+              <a:t>OpenID</a:t>
+            </a:r>
+            <a:r>
+              <a:rPr lang="en-US" dirty="0"/>
+              <a:t> Connect enjoy wide utilization across the industry, so knowledge of these patterns will help you enable authentication and authorization outside of an Active Directory environment as well</a:t>
+            </a:r>
+          </a:p>
+          <a:p>
+            <a:pPr marL="0" indent="0">
+              <a:buNone/>
+            </a:pPr>
+            <a:endParaRPr lang="en-US" dirty="0"/>
+          </a:p>
+        </p:txBody>
+      </p:sp>
+    </p:spTree>
+    <p:extLst>
+      <p:ext uri="{BB962C8B-B14F-4D97-AF65-F5344CB8AC3E}">
+        <p14:creationId xmlns:p14="http://schemas.microsoft.com/office/powerpoint/2010/main" val="3737072975"/>
+      </p:ext>
+    </p:extLst>
+  </p:cSld>
+  <p:clrMapOvr>
+    <a:masterClrMapping/>
+  </p:clrMapOvr>
+</p:sld>
+</file>
+
+<file path=ppt/slides/slide19.xml><?xml version="1.0" encoding="utf-8"?>
+<p:sld xmlns:a="http://schemas.openxmlformats.org/drawingml/2006/main" xmlns:r="http://schemas.openxmlformats.org/officeDocument/2006/relationships" xmlns:p="http://schemas.openxmlformats.org/presentationml/2006/main">
+  <p:cSld>
+    <p:spTree>
+      <p:nvGrpSpPr>
+        <p:cNvPr id="1" name=""/>
+        <p:cNvGrpSpPr/>
+        <p:nvPr/>
+      </p:nvGrpSpPr>
+      <p:grpSpPr>
+        <a:xfrm>
+          <a:off x="0" y="0"/>
+          <a:ext cx="0" cy="0"/>
+          <a:chOff x="0" y="0"/>
+          <a:chExt cx="0" cy="0"/>
+        </a:xfrm>
+      </p:grpSpPr>
+      <p:sp>
+        <p:nvSpPr>
+          <p:cNvPr id="2" name="Title 1">
+            <a:extLst>
+              <a:ext uri="{FF2B5EF4-FFF2-40B4-BE49-F238E27FC236}">
+                <a16:creationId xmlns="" xmlns:a16="http://schemas.microsoft.com/office/drawing/2014/main" id="{D9902204-D024-4B3E-BAD5-EA2426A8D1E6}"/>
               </a:ext>
             </a:extLst>
           </p:cNvPr>
@@ -10192,94 +11343,6 @@
 </p:sld>
 </file>
 
-<file path=ppt/slides/slide19.xml><?xml version="1.0" encoding="utf-8"?>
-<p:sld xmlns:a="http://schemas.openxmlformats.org/drawingml/2006/main" xmlns:r="http://schemas.openxmlformats.org/officeDocument/2006/relationships" xmlns:p="http://schemas.openxmlformats.org/presentationml/2006/main">
-  <p:cSld>
-    <p:spTree>
-      <p:nvGrpSpPr>
-        <p:cNvPr id="1" name=""/>
-        <p:cNvGrpSpPr/>
-        <p:nvPr/>
-      </p:nvGrpSpPr>
-      <p:grpSpPr>
-        <a:xfrm>
-          <a:off x="0" y="0"/>
-          <a:ext cx="0" cy="0"/>
-          <a:chOff x="0" y="0"/>
-          <a:chExt cx="0" cy="0"/>
-        </a:xfrm>
-      </p:grpSpPr>
-      <p:sp>
-        <p:nvSpPr>
-          <p:cNvPr id="2" name="Title 1">
-            <a:extLst>
-              <a:ext uri="{FF2B5EF4-FFF2-40B4-BE49-F238E27FC236}">
-                <a16:creationId xmlns:a16="http://schemas.microsoft.com/office/drawing/2014/main" xmlns="" id="{D9902204-D024-4B3E-BAD5-EA2426A8D1E6}"/>
-              </a:ext>
-            </a:extLst>
-          </p:cNvPr>
-          <p:cNvSpPr>
-            <a:spLocks noGrp="1"/>
-          </p:cNvSpPr>
-          <p:nvPr>
-            <p:ph type="title"/>
-          </p:nvPr>
-        </p:nvSpPr>
-        <p:spPr/>
-        <p:txBody>
-          <a:bodyPr/>
-          <a:lstStyle/>
-          <a:p>
-            <a:r>
-              <a:rPr lang="en-US" dirty="0" smtClean="0"/>
-              <a:t>AD Connect SSO</a:t>
-            </a:r>
-            <a:endParaRPr lang="en-US" dirty="0"/>
-          </a:p>
-        </p:txBody>
-      </p:sp>
-      <p:pic>
-        <p:nvPicPr>
-          <p:cNvPr id="3" name="Picture 2" descr="adconnectsso.png"/>
-          <p:cNvPicPr>
-            <a:picLocks noChangeAspect="1"/>
-          </p:cNvPicPr>
-          <p:nvPr/>
-        </p:nvPicPr>
-        <p:blipFill rotWithShape="1">
-          <a:blip r:embed="rId3">
-            <a:extLst>
-              <a:ext uri="{28A0092B-C50C-407E-A947-70E740481C1C}">
-                <a14:useLocalDpi xmlns:a14="http://schemas.microsoft.com/office/drawing/2010/main" val="0"/>
-              </a:ext>
-            </a:extLst>
-          </a:blip>
-          <a:srcRect l="559" t="1499" r="559" b="1006"/>
-          <a:stretch/>
-        </p:blipFill>
-        <p:spPr>
-          <a:xfrm>
-            <a:off x="1791145" y="1269850"/>
-            <a:ext cx="8630064" cy="4818914"/>
-          </a:xfrm>
-          <a:prstGeom prst="rect">
-            <a:avLst/>
-          </a:prstGeom>
-        </p:spPr>
-      </p:pic>
-    </p:spTree>
-    <p:extLst>
-      <p:ext uri="{BB962C8B-B14F-4D97-AF65-F5344CB8AC3E}">
-        <p14:creationId xmlns:p14="http://schemas.microsoft.com/office/powerpoint/2010/main" val="3301253274"/>
-      </p:ext>
-    </p:extLst>
-  </p:cSld>
-  <p:clrMapOvr>
-    <a:masterClrMapping/>
-  </p:clrMapOvr>
-</p:sld>
-</file>
-
 <file path=ppt/slides/slide2.xml><?xml version="1.0" encoding="utf-8"?>
 <p:sld xmlns:a="http://schemas.openxmlformats.org/drawingml/2006/main" xmlns:r="http://schemas.openxmlformats.org/officeDocument/2006/relationships" xmlns:p="http://schemas.openxmlformats.org/presentationml/2006/main">
   <p:cSld>
@@ -10302,7 +11365,7 @@
           <p:cNvPr id="2" name="Title 1">
             <a:extLst>
               <a:ext uri="{FF2B5EF4-FFF2-40B4-BE49-F238E27FC236}">
-                <a16:creationId xmlns:a16="http://schemas.microsoft.com/office/drawing/2014/main" xmlns="" id="{BDF11867-E0F7-4236-8CCC-612EAF1EB0AF}"/>
+                <a16:creationId xmlns="" xmlns:a16="http://schemas.microsoft.com/office/drawing/2014/main" id="{BDF11867-E0F7-4236-8CCC-612EAF1EB0AF}"/>
               </a:ext>
             </a:extLst>
           </p:cNvPr>
@@ -10330,7 +11393,7 @@
           <p:cNvPr id="4" name="Content Placeholder 3">
             <a:extLst>
               <a:ext uri="{FF2B5EF4-FFF2-40B4-BE49-F238E27FC236}">
-                <a16:creationId xmlns:a16="http://schemas.microsoft.com/office/drawing/2014/main" xmlns="" id="{A3E10AE0-7BF3-45B5-A83C-5370108CA159}"/>
+                <a16:creationId xmlns="" xmlns:a16="http://schemas.microsoft.com/office/drawing/2014/main" id="{A3E10AE0-7BF3-45B5-A83C-5370108CA159}"/>
               </a:ext>
             </a:extLst>
           </p:cNvPr>
@@ -10360,14 +11423,14 @@
                 <a:gridCol w="5257800">
                   <a:extLst>
                     <a:ext uri="{9D8B030D-6E8A-4147-A177-3AD203B41FA5}">
-                      <a16:colId xmlns:a16="http://schemas.microsoft.com/office/drawing/2014/main" xmlns="" val="926890162"/>
+                      <a16:colId xmlns="" xmlns:a16="http://schemas.microsoft.com/office/drawing/2014/main" val="926890162"/>
                     </a:ext>
                   </a:extLst>
                 </a:gridCol>
                 <a:gridCol w="5257800">
                   <a:extLst>
                     <a:ext uri="{9D8B030D-6E8A-4147-A177-3AD203B41FA5}">
-                      <a16:colId xmlns:a16="http://schemas.microsoft.com/office/drawing/2014/main" xmlns="" val="634220789"/>
+                      <a16:colId xmlns="" xmlns:a16="http://schemas.microsoft.com/office/drawing/2014/main" val="634220789"/>
                     </a:ext>
                   </a:extLst>
                 </a:gridCol>
@@ -10418,7 +11481,7 @@
                 </a:tc>
                 <a:extLst>
                   <a:ext uri="{0D108BD9-81ED-4DB2-BD59-A6C34878D82A}">
-                    <a16:rowId xmlns:a16="http://schemas.microsoft.com/office/drawing/2014/main" xmlns="" val="796246793"/>
+                    <a16:rowId xmlns="" xmlns:a16="http://schemas.microsoft.com/office/drawing/2014/main" val="796246793"/>
                   </a:ext>
                 </a:extLst>
               </a:tr>
@@ -10451,7 +11514,7 @@
                 </a:tc>
                 <a:extLst>
                   <a:ext uri="{0D108BD9-81ED-4DB2-BD59-A6C34878D82A}">
-                    <a16:rowId xmlns:a16="http://schemas.microsoft.com/office/drawing/2014/main" xmlns="" val="3495614983"/>
+                    <a16:rowId xmlns="" xmlns:a16="http://schemas.microsoft.com/office/drawing/2014/main" val="3495614983"/>
                   </a:ext>
                 </a:extLst>
               </a:tr>
@@ -10484,7 +11547,7 @@
                 </a:tc>
                 <a:extLst>
                   <a:ext uri="{0D108BD9-81ED-4DB2-BD59-A6C34878D82A}">
-                    <a16:rowId xmlns:a16="http://schemas.microsoft.com/office/drawing/2014/main" xmlns="" val="395694437"/>
+                    <a16:rowId xmlns="" xmlns:a16="http://schemas.microsoft.com/office/drawing/2014/main" val="395694437"/>
                   </a:ext>
                 </a:extLst>
               </a:tr>
@@ -10529,7 +11592,7 @@
                 </a:tc>
                 <a:extLst>
                   <a:ext uri="{0D108BD9-81ED-4DB2-BD59-A6C34878D82A}">
-                    <a16:rowId xmlns:a16="http://schemas.microsoft.com/office/drawing/2014/main" xmlns="" val="2661955343"/>
+                    <a16:rowId xmlns="" xmlns:a16="http://schemas.microsoft.com/office/drawing/2014/main" val="2661955343"/>
                   </a:ext>
                 </a:extLst>
               </a:tr>
@@ -10562,7 +11625,7 @@
                 </a:tc>
                 <a:extLst>
                   <a:ext uri="{0D108BD9-81ED-4DB2-BD59-A6C34878D82A}">
-                    <a16:rowId xmlns:a16="http://schemas.microsoft.com/office/drawing/2014/main" xmlns="" val="3755759018"/>
+                    <a16:rowId xmlns="" xmlns:a16="http://schemas.microsoft.com/office/drawing/2014/main" val="3755759018"/>
                   </a:ext>
                 </a:extLst>
               </a:tr>
@@ -10595,7 +11658,7 @@
                 </a:tc>
                 <a:extLst>
                   <a:ext uri="{0D108BD9-81ED-4DB2-BD59-A6C34878D82A}">
-                    <a16:rowId xmlns:a16="http://schemas.microsoft.com/office/drawing/2014/main" xmlns="" val="452082492"/>
+                    <a16:rowId xmlns="" xmlns:a16="http://schemas.microsoft.com/office/drawing/2014/main" val="452082492"/>
                   </a:ext>
                 </a:extLst>
               </a:tr>
@@ -10628,7 +11691,7 @@
                 </a:tc>
                 <a:extLst>
                   <a:ext uri="{0D108BD9-81ED-4DB2-BD59-A6C34878D82A}">
-                    <a16:rowId xmlns:a16="http://schemas.microsoft.com/office/drawing/2014/main" xmlns="" val="3456767149"/>
+                    <a16:rowId xmlns="" xmlns:a16="http://schemas.microsoft.com/office/drawing/2014/main" val="3456767149"/>
                   </a:ext>
                 </a:extLst>
               </a:tr>
@@ -10671,7 +11734,7 @@
           <p:cNvPr id="2" name="Title 1">
             <a:extLst>
               <a:ext uri="{FF2B5EF4-FFF2-40B4-BE49-F238E27FC236}">
-                <a16:creationId xmlns:a16="http://schemas.microsoft.com/office/drawing/2014/main" xmlns="" id="{6E0124F3-778A-4B51-9531-2FBFB3550680}"/>
+                <a16:creationId xmlns="" xmlns:a16="http://schemas.microsoft.com/office/drawing/2014/main" id="{D9902204-D024-4B3E-BAD5-EA2426A8D1E6}"/>
               </a:ext>
             </a:extLst>
           </p:cNvPr>
@@ -10688,41 +11751,46 @@
           <a:lstStyle/>
           <a:p>
             <a:r>
-              <a:rPr lang="en-US" dirty="0"/>
-              <a:t>Secure resources by using identity providers</a:t>
-            </a:r>
-          </a:p>
-        </p:txBody>
-      </p:sp>
-      <p:sp>
-        <p:nvSpPr>
-          <p:cNvPr id="3" name="Text Placeholder 2">
+              <a:rPr lang="en-US" dirty="0" smtClean="0"/>
+              <a:t>AD Connect SSO</a:t>
+            </a:r>
+            <a:endParaRPr lang="en-US" dirty="0"/>
+          </a:p>
+        </p:txBody>
+      </p:sp>
+      <p:pic>
+        <p:nvPicPr>
+          <p:cNvPr id="3" name="Picture 2" descr="adconnectsso.png"/>
+          <p:cNvPicPr>
+            <a:picLocks noChangeAspect="1"/>
+          </p:cNvPicPr>
+          <p:nvPr/>
+        </p:nvPicPr>
+        <p:blipFill rotWithShape="1">
+          <a:blip r:embed="rId3">
             <a:extLst>
-              <a:ext uri="{FF2B5EF4-FFF2-40B4-BE49-F238E27FC236}">
-                <a16:creationId xmlns:a16="http://schemas.microsoft.com/office/drawing/2014/main" xmlns="" id="{6E532B85-B928-4F31-8F50-F9C17C7085E3}"/>
+              <a:ext uri="{28A0092B-C50C-407E-A947-70E740481C1C}">
+                <a14:useLocalDpi xmlns:a14="http://schemas.microsoft.com/office/drawing/2010/main" val="0"/>
               </a:ext>
             </a:extLst>
-          </p:cNvPr>
-          <p:cNvSpPr>
-            <a:spLocks noGrp="1"/>
-          </p:cNvSpPr>
-          <p:nvPr>
-            <p:ph type="body" idx="1"/>
-          </p:nvPr>
-        </p:nvSpPr>
-        <p:spPr/>
-        <p:txBody>
-          <a:bodyPr/>
-          <a:lstStyle/>
-          <a:p>
-            <a:endParaRPr lang="en-US"/>
-          </a:p>
-        </p:txBody>
-      </p:sp>
+          </a:blip>
+          <a:srcRect l="559" t="1499" r="559" b="1006"/>
+          <a:stretch/>
+        </p:blipFill>
+        <p:spPr>
+          <a:xfrm>
+            <a:off x="1791145" y="1269850"/>
+            <a:ext cx="8630064" cy="4818914"/>
+          </a:xfrm>
+          <a:prstGeom prst="rect">
+            <a:avLst/>
+          </a:prstGeom>
+        </p:spPr>
+      </p:pic>
     </p:spTree>
     <p:extLst>
       <p:ext uri="{BB962C8B-B14F-4D97-AF65-F5344CB8AC3E}">
-        <p14:creationId xmlns:p14="http://schemas.microsoft.com/office/powerpoint/2010/main" val="1293623633"/>
+        <p14:creationId xmlns:p14="http://schemas.microsoft.com/office/powerpoint/2010/main" val="3301253274"/>
       </p:ext>
     </p:extLst>
   </p:cSld>
@@ -10754,7 +11822,580 @@
           <p:cNvPr id="2" name="Title 1">
             <a:extLst>
               <a:ext uri="{FF2B5EF4-FFF2-40B4-BE49-F238E27FC236}">
-                <a16:creationId xmlns:a16="http://schemas.microsoft.com/office/drawing/2014/main" xmlns="" id="{D90BB56E-0191-4029-B0DC-A063933DE797}"/>
+                <a16:creationId xmlns="" xmlns:a16="http://schemas.microsoft.com/office/drawing/2014/main" id="{D9902204-D024-4B3E-BAD5-EA2426A8D1E6}"/>
+              </a:ext>
+            </a:extLst>
+          </p:cNvPr>
+          <p:cNvSpPr>
+            <a:spLocks noGrp="1"/>
+          </p:cNvSpPr>
+          <p:nvPr>
+            <p:ph type="title"/>
+          </p:nvPr>
+        </p:nvSpPr>
+        <p:spPr/>
+        <p:txBody>
+          <a:bodyPr/>
+          <a:lstStyle/>
+          <a:p>
+            <a:r>
+              <a:rPr lang="en-US" dirty="0" smtClean="0"/>
+              <a:t>AD Connect SSO - Requirements</a:t>
+            </a:r>
+            <a:endParaRPr lang="en-US" dirty="0"/>
+          </a:p>
+        </p:txBody>
+      </p:sp>
+      <p:sp>
+        <p:nvSpPr>
+          <p:cNvPr id="3" name="Content Placeholder 2">
+            <a:extLst>
+              <a:ext uri="{FF2B5EF4-FFF2-40B4-BE49-F238E27FC236}">
+                <a16:creationId xmlns="" xmlns:a16="http://schemas.microsoft.com/office/drawing/2014/main" id="{10268B94-2AF6-4ADF-BC5F-B8A1EEF2B0D3}"/>
+              </a:ext>
+            </a:extLst>
+          </p:cNvPr>
+          <p:cNvSpPr>
+            <a:spLocks noGrp="1"/>
+          </p:cNvSpPr>
+          <p:nvPr>
+            <p:ph idx="1"/>
+          </p:nvPr>
+        </p:nvSpPr>
+        <p:spPr/>
+        <p:txBody>
+          <a:bodyPr>
+            <a:normAutofit fontScale="92500" lnSpcReduction="10000"/>
+          </a:bodyPr>
+          <a:lstStyle/>
+          <a:p>
+            <a:pPr marL="0" indent="0">
+              <a:buNone/>
+            </a:pPr>
+            <a:r>
+              <a:rPr lang="en-US" dirty="0"/>
+              <a:t>Your user is signing in on a corporate desktop</a:t>
+            </a:r>
+            <a:r>
+              <a:rPr lang="en-US" dirty="0" smtClean="0"/>
+              <a:t>.</a:t>
+            </a:r>
+          </a:p>
+          <a:p>
+            <a:pPr marL="0" indent="0">
+              <a:buNone/>
+            </a:pPr>
+            <a:endParaRPr lang="en-US" dirty="0"/>
+          </a:p>
+          <a:p>
+            <a:pPr marL="0" indent="0">
+              <a:buNone/>
+            </a:pPr>
+            <a:r>
+              <a:rPr lang="en-US" dirty="0"/>
+              <a:t>The desktop has been previously joined to your Active Directory (AD) domain</a:t>
+            </a:r>
+            <a:r>
+              <a:rPr lang="en-US" dirty="0" smtClean="0"/>
+              <a:t>.</a:t>
+            </a:r>
+          </a:p>
+          <a:p>
+            <a:pPr marL="0" indent="0">
+              <a:buNone/>
+            </a:pPr>
+            <a:endParaRPr lang="en-US" dirty="0"/>
+          </a:p>
+          <a:p>
+            <a:pPr marL="0" indent="0">
+              <a:buNone/>
+            </a:pPr>
+            <a:r>
+              <a:rPr lang="en-US" dirty="0"/>
+              <a:t>The desktop has a direct connection to your Domain Controller (DC), either on the corporate wired or wireless network or via a remote access connection, such as a VPN connection</a:t>
+            </a:r>
+            <a:r>
+              <a:rPr lang="en-US" dirty="0" smtClean="0"/>
+              <a:t>.</a:t>
+            </a:r>
+          </a:p>
+          <a:p>
+            <a:pPr marL="0" indent="0">
+              <a:buNone/>
+            </a:pPr>
+            <a:endParaRPr lang="en-US" dirty="0"/>
+          </a:p>
+          <a:p>
+            <a:pPr marL="0" indent="0">
+              <a:buNone/>
+            </a:pPr>
+            <a:r>
+              <a:rPr lang="en-US" dirty="0"/>
+              <a:t>Our service endpoints have been included to the browser's Intranet zone.</a:t>
+            </a:r>
+          </a:p>
+          <a:p>
+            <a:pPr marL="0" indent="0">
+              <a:buNone/>
+            </a:pPr>
+            <a:endParaRPr lang="en-US" dirty="0"/>
+          </a:p>
+        </p:txBody>
+      </p:sp>
+    </p:spTree>
+    <p:extLst>
+      <p:ext uri="{BB962C8B-B14F-4D97-AF65-F5344CB8AC3E}">
+        <p14:creationId xmlns:p14="http://schemas.microsoft.com/office/powerpoint/2010/main" val="1985096489"/>
+      </p:ext>
+    </p:extLst>
+  </p:cSld>
+  <p:clrMapOvr>
+    <a:masterClrMapping/>
+  </p:clrMapOvr>
+</p:sld>
+</file>
+
+<file path=ppt/slides/slide22.xml><?xml version="1.0" encoding="utf-8"?>
+<p:sld xmlns:a="http://schemas.openxmlformats.org/drawingml/2006/main" xmlns:r="http://schemas.openxmlformats.org/officeDocument/2006/relationships" xmlns:p="http://schemas.openxmlformats.org/presentationml/2006/main">
+  <p:cSld>
+    <p:spTree>
+      <p:nvGrpSpPr>
+        <p:cNvPr id="1" name=""/>
+        <p:cNvGrpSpPr/>
+        <p:nvPr/>
+      </p:nvGrpSpPr>
+      <p:grpSpPr>
+        <a:xfrm>
+          <a:off x="0" y="0"/>
+          <a:ext cx="0" cy="0"/>
+          <a:chOff x="0" y="0"/>
+          <a:chExt cx="0" cy="0"/>
+        </a:xfrm>
+      </p:grpSpPr>
+      <p:sp>
+        <p:nvSpPr>
+          <p:cNvPr id="4" name="Title 3"/>
+          <p:cNvSpPr>
+            <a:spLocks noGrp="1"/>
+          </p:cNvSpPr>
+          <p:nvPr>
+            <p:ph type="title"/>
+          </p:nvPr>
+        </p:nvSpPr>
+        <p:spPr/>
+        <p:txBody>
+          <a:bodyPr>
+            <a:normAutofit fontScale="90000"/>
+          </a:bodyPr>
+          <a:lstStyle/>
+          <a:p>
+            <a:r>
+              <a:rPr lang="en-US" dirty="0"/>
+              <a:t>You have a web application that needs to support Single Sign On for your </a:t>
+            </a:r>
+            <a:r>
+              <a:rPr lang="en-US" dirty="0" err="1"/>
+              <a:t>on-premise</a:t>
+            </a:r>
+            <a:r>
+              <a:rPr lang="en-US" dirty="0"/>
+              <a:t> users and be able to add external users using their social logins.  Which product will be the best to use? </a:t>
+            </a:r>
+          </a:p>
+        </p:txBody>
+      </p:sp>
+      <p:sp>
+        <p:nvSpPr>
+          <p:cNvPr id="5" name="Content Placeholder 4"/>
+          <p:cNvSpPr>
+            <a:spLocks noGrp="1"/>
+          </p:cNvSpPr>
+          <p:nvPr>
+            <p:ph idx="1"/>
+          </p:nvPr>
+        </p:nvSpPr>
+        <p:spPr/>
+        <p:txBody>
+          <a:bodyPr/>
+          <a:lstStyle/>
+          <a:p>
+            <a:r>
+              <a:rPr lang="en-US" dirty="0"/>
+              <a:t>Azure AD B2C</a:t>
+            </a:r>
+          </a:p>
+          <a:p>
+            <a:r>
+              <a:rPr lang="en-US" dirty="0"/>
+              <a:t>Key Vault</a:t>
+            </a:r>
+          </a:p>
+          <a:p>
+            <a:r>
+              <a:rPr lang="en-US" dirty="0"/>
+              <a:t>Security Center</a:t>
+            </a:r>
+          </a:p>
+          <a:p>
+            <a:r>
+              <a:rPr lang="en-US" dirty="0"/>
+              <a:t>Azure B2B Collaboration</a:t>
+            </a:r>
+          </a:p>
+        </p:txBody>
+      </p:sp>
+      <p:sp>
+        <p:nvSpPr>
+          <p:cNvPr id="6" name="Content Placeholder 5"/>
+          <p:cNvSpPr>
+            <a:spLocks noGrp="1"/>
+          </p:cNvSpPr>
+          <p:nvPr>
+            <p:ph idx="10"/>
+          </p:nvPr>
+        </p:nvSpPr>
+        <p:spPr/>
+        <p:txBody>
+          <a:bodyPr/>
+          <a:lstStyle/>
+          <a:p>
+            <a:r>
+              <a:rPr lang="en-US" dirty="0"/>
+              <a:t>Azure AD B2C</a:t>
+            </a:r>
+          </a:p>
+        </p:txBody>
+      </p:sp>
+    </p:spTree>
+    <p:extLst>
+      <p:ext uri="{BB962C8B-B14F-4D97-AF65-F5344CB8AC3E}">
+        <p14:creationId xmlns:p14="http://schemas.microsoft.com/office/powerpoint/2010/main" val="2067599123"/>
+      </p:ext>
+    </p:extLst>
+  </p:cSld>
+  <p:clrMapOvr>
+    <a:masterClrMapping/>
+  </p:clrMapOvr>
+</p:sld>
+</file>
+
+<file path=ppt/slides/slide23.xml><?xml version="1.0" encoding="utf-8"?>
+<p:sld xmlns:a="http://schemas.openxmlformats.org/drawingml/2006/main" xmlns:r="http://schemas.openxmlformats.org/officeDocument/2006/relationships" xmlns:p="http://schemas.openxmlformats.org/presentationml/2006/main">
+  <p:cSld>
+    <p:spTree>
+      <p:nvGrpSpPr>
+        <p:cNvPr id="1" name=""/>
+        <p:cNvGrpSpPr/>
+        <p:nvPr/>
+      </p:nvGrpSpPr>
+      <p:grpSpPr>
+        <a:xfrm>
+          <a:off x="0" y="0"/>
+          <a:ext cx="0" cy="0"/>
+          <a:chOff x="0" y="0"/>
+          <a:chExt cx="0" cy="0"/>
+        </a:xfrm>
+      </p:grpSpPr>
+      <p:sp>
+        <p:nvSpPr>
+          <p:cNvPr id="4" name="Title 3"/>
+          <p:cNvSpPr>
+            <a:spLocks noGrp="1"/>
+          </p:cNvSpPr>
+          <p:nvPr>
+            <p:ph type="title"/>
+          </p:nvPr>
+        </p:nvSpPr>
+        <p:spPr/>
+        <p:txBody>
+          <a:bodyPr>
+            <a:normAutofit fontScale="90000"/>
+          </a:bodyPr>
+          <a:lstStyle/>
+          <a:p>
+            <a:r>
+              <a:rPr lang="en-US" dirty="0"/>
+              <a:t>You are building a new application and have the following requirements: branded login page and ability to use a </a:t>
+            </a:r>
+            <a:r>
+              <a:rPr lang="en-US" dirty="0" err="1"/>
+              <a:t>facebook</a:t>
+            </a:r>
+            <a:r>
+              <a:rPr lang="en-US" dirty="0"/>
+              <a:t> login.  What product  would you use?</a:t>
+            </a:r>
+          </a:p>
+        </p:txBody>
+      </p:sp>
+      <p:sp>
+        <p:nvSpPr>
+          <p:cNvPr id="5" name="Content Placeholder 4"/>
+          <p:cNvSpPr>
+            <a:spLocks noGrp="1"/>
+          </p:cNvSpPr>
+          <p:nvPr>
+            <p:ph idx="1"/>
+          </p:nvPr>
+        </p:nvSpPr>
+        <p:spPr/>
+        <p:txBody>
+          <a:bodyPr/>
+          <a:lstStyle/>
+          <a:p>
+            <a:r>
+              <a:rPr lang="en-US" dirty="0"/>
+              <a:t>Azure AD Premium edition</a:t>
+            </a:r>
+          </a:p>
+          <a:p>
+            <a:r>
+              <a:rPr lang="en-US" dirty="0"/>
+              <a:t>Azure AD B2C</a:t>
+            </a:r>
+          </a:p>
+          <a:p>
+            <a:r>
+              <a:rPr lang="en-US" dirty="0"/>
+              <a:t>Azure Active Directory Domain Services</a:t>
+            </a:r>
+          </a:p>
+          <a:p>
+            <a:r>
+              <a:rPr lang="en-US" dirty="0"/>
+              <a:t>Active Directory FS</a:t>
+            </a:r>
+          </a:p>
+        </p:txBody>
+      </p:sp>
+      <p:sp>
+        <p:nvSpPr>
+          <p:cNvPr id="6" name="Content Placeholder 5"/>
+          <p:cNvSpPr>
+            <a:spLocks noGrp="1"/>
+          </p:cNvSpPr>
+          <p:nvPr>
+            <p:ph idx="10"/>
+          </p:nvPr>
+        </p:nvSpPr>
+        <p:spPr/>
+        <p:txBody>
+          <a:bodyPr/>
+          <a:lstStyle/>
+          <a:p>
+            <a:r>
+              <a:rPr lang="en-US" dirty="0"/>
+              <a:t>Azure AD B2C</a:t>
+            </a:r>
+          </a:p>
+        </p:txBody>
+      </p:sp>
+    </p:spTree>
+    <p:extLst>
+      <p:ext uri="{BB962C8B-B14F-4D97-AF65-F5344CB8AC3E}">
+        <p14:creationId xmlns:p14="http://schemas.microsoft.com/office/powerpoint/2010/main" val="2015698159"/>
+      </p:ext>
+    </p:extLst>
+  </p:cSld>
+  <p:clrMapOvr>
+    <a:masterClrMapping/>
+  </p:clrMapOvr>
+</p:sld>
+</file>
+
+<file path=ppt/slides/slide24.xml><?xml version="1.0" encoding="utf-8"?>
+<p:sld xmlns:a="http://schemas.openxmlformats.org/drawingml/2006/main" xmlns:r="http://schemas.openxmlformats.org/officeDocument/2006/relationships" xmlns:p="http://schemas.openxmlformats.org/presentationml/2006/main">
+  <p:cSld>
+    <p:spTree>
+      <p:nvGrpSpPr>
+        <p:cNvPr id="1" name=""/>
+        <p:cNvGrpSpPr/>
+        <p:nvPr/>
+      </p:nvGrpSpPr>
+      <p:grpSpPr>
+        <a:xfrm>
+          <a:off x="0" y="0"/>
+          <a:ext cx="0" cy="0"/>
+          <a:chOff x="0" y="0"/>
+          <a:chExt cx="0" cy="0"/>
+        </a:xfrm>
+      </p:grpSpPr>
+      <p:sp>
+        <p:nvSpPr>
+          <p:cNvPr id="2" name="Title 1">
+            <a:extLst>
+              <a:ext uri="{FF2B5EF4-FFF2-40B4-BE49-F238E27FC236}">
+                <a16:creationId xmlns="" xmlns:a16="http://schemas.microsoft.com/office/drawing/2014/main" id="{8187B857-FF9F-43F7-B0BC-C5F3F3D6B01F}"/>
+              </a:ext>
+            </a:extLst>
+          </p:cNvPr>
+          <p:cNvSpPr>
+            <a:spLocks noGrp="1"/>
+          </p:cNvSpPr>
+          <p:nvPr>
+            <p:ph type="title"/>
+          </p:nvPr>
+        </p:nvSpPr>
+        <p:spPr/>
+        <p:txBody>
+          <a:bodyPr>
+            <a:normAutofit fontScale="90000"/>
+          </a:bodyPr>
+          <a:lstStyle/>
+          <a:p>
+            <a:endParaRPr lang="en-US"/>
+          </a:p>
+        </p:txBody>
+      </p:sp>
+      <p:sp>
+        <p:nvSpPr>
+          <p:cNvPr id="6" name="Text Placeholder 5"/>
+          <p:cNvSpPr>
+            <a:spLocks noGrp="1"/>
+          </p:cNvSpPr>
+          <p:nvPr>
+            <p:ph type="body" sz="quarter" idx="11"/>
+          </p:nvPr>
+        </p:nvSpPr>
+        <p:spPr/>
+        <p:txBody>
+          <a:bodyPr/>
+          <a:lstStyle/>
+          <a:p>
+            <a:r>
+              <a:rPr lang="en-US" dirty="0"/>
+              <a:t>Azure B2C allows you to add social accounts, enterprise accounts and local accounts.  It is very flexible and newer than Azure AD.  The exam may not call out Azure B2C or Azure B2B Collaboration, but you will need to know how to provide the solutions they solve.  In preparing for the exam, you should try to explore both types of Azure AD directories and learn </a:t>
+            </a:r>
+            <a:r>
+              <a:rPr lang="en-US"/>
+              <a:t>the pros and cons.</a:t>
+            </a:r>
+            <a:endParaRPr lang="en-US" dirty="0"/>
+          </a:p>
+        </p:txBody>
+      </p:sp>
+    </p:spTree>
+    <p:extLst>
+      <p:ext uri="{BB962C8B-B14F-4D97-AF65-F5344CB8AC3E}">
+        <p14:creationId xmlns:p14="http://schemas.microsoft.com/office/powerpoint/2010/main" val="452232699"/>
+      </p:ext>
+    </p:extLst>
+  </p:cSld>
+  <p:clrMapOvr>
+    <a:masterClrMapping/>
+  </p:clrMapOvr>
+  <p:transition xmlns:p14="http://schemas.microsoft.com/office/powerpoint/2010/main">
+    <p:fade/>
+  </p:transition>
+</p:sld>
+</file>
+
+<file path=ppt/slides/slide25.xml><?xml version="1.0" encoding="utf-8"?>
+<p:sld xmlns:a="http://schemas.openxmlformats.org/drawingml/2006/main" xmlns:r="http://schemas.openxmlformats.org/officeDocument/2006/relationships" xmlns:p="http://schemas.openxmlformats.org/presentationml/2006/main">
+  <p:cSld>
+    <p:spTree>
+      <p:nvGrpSpPr>
+        <p:cNvPr id="1" name=""/>
+        <p:cNvGrpSpPr/>
+        <p:nvPr/>
+      </p:nvGrpSpPr>
+      <p:grpSpPr>
+        <a:xfrm>
+          <a:off x="0" y="0"/>
+          <a:ext cx="0" cy="0"/>
+          <a:chOff x="0" y="0"/>
+          <a:chExt cx="0" cy="0"/>
+        </a:xfrm>
+      </p:grpSpPr>
+      <p:sp>
+        <p:nvSpPr>
+          <p:cNvPr id="2" name="Title 1">
+            <a:extLst>
+              <a:ext uri="{FF2B5EF4-FFF2-40B4-BE49-F238E27FC236}">
+                <a16:creationId xmlns="" xmlns:a16="http://schemas.microsoft.com/office/drawing/2014/main" id="{6E0124F3-778A-4B51-9531-2FBFB3550680}"/>
+              </a:ext>
+            </a:extLst>
+          </p:cNvPr>
+          <p:cNvSpPr>
+            <a:spLocks noGrp="1"/>
+          </p:cNvSpPr>
+          <p:nvPr>
+            <p:ph type="title"/>
+          </p:nvPr>
+        </p:nvSpPr>
+        <p:spPr/>
+        <p:txBody>
+          <a:bodyPr/>
+          <a:lstStyle/>
+          <a:p>
+            <a:r>
+              <a:rPr lang="en-US" dirty="0"/>
+              <a:t>Secure resources by using identity providers</a:t>
+            </a:r>
+          </a:p>
+        </p:txBody>
+      </p:sp>
+      <p:sp>
+        <p:nvSpPr>
+          <p:cNvPr id="3" name="Text Placeholder 2">
+            <a:extLst>
+              <a:ext uri="{FF2B5EF4-FFF2-40B4-BE49-F238E27FC236}">
+                <a16:creationId xmlns="" xmlns:a16="http://schemas.microsoft.com/office/drawing/2014/main" id="{6E532B85-B928-4F31-8F50-F9C17C7085E3}"/>
+              </a:ext>
+            </a:extLst>
+          </p:cNvPr>
+          <p:cNvSpPr>
+            <a:spLocks noGrp="1"/>
+          </p:cNvSpPr>
+          <p:nvPr>
+            <p:ph type="body" idx="1"/>
+          </p:nvPr>
+        </p:nvSpPr>
+        <p:spPr/>
+        <p:txBody>
+          <a:bodyPr/>
+          <a:lstStyle/>
+          <a:p>
+            <a:endParaRPr lang="en-US"/>
+          </a:p>
+        </p:txBody>
+      </p:sp>
+    </p:spTree>
+    <p:extLst>
+      <p:ext uri="{BB962C8B-B14F-4D97-AF65-F5344CB8AC3E}">
+        <p14:creationId xmlns:p14="http://schemas.microsoft.com/office/powerpoint/2010/main" val="1293623633"/>
+      </p:ext>
+    </p:extLst>
+  </p:cSld>
+  <p:clrMapOvr>
+    <a:masterClrMapping/>
+  </p:clrMapOvr>
+</p:sld>
+</file>
+
+<file path=ppt/slides/slide26.xml><?xml version="1.0" encoding="utf-8"?>
+<p:sld xmlns:a="http://schemas.openxmlformats.org/drawingml/2006/main" xmlns:r="http://schemas.openxmlformats.org/officeDocument/2006/relationships" xmlns:p="http://schemas.openxmlformats.org/presentationml/2006/main">
+  <p:cSld>
+    <p:spTree>
+      <p:nvGrpSpPr>
+        <p:cNvPr id="1" name=""/>
+        <p:cNvGrpSpPr/>
+        <p:nvPr/>
+      </p:nvGrpSpPr>
+      <p:grpSpPr>
+        <a:xfrm>
+          <a:off x="0" y="0"/>
+          <a:ext cx="0" cy="0"/>
+          <a:chOff x="0" y="0"/>
+          <a:chExt cx="0" cy="0"/>
+        </a:xfrm>
+      </p:grpSpPr>
+      <p:sp>
+        <p:nvSpPr>
+          <p:cNvPr id="2" name="Title 1">
+            <a:extLst>
+              <a:ext uri="{FF2B5EF4-FFF2-40B4-BE49-F238E27FC236}">
+                <a16:creationId xmlns="" xmlns:a16="http://schemas.microsoft.com/office/drawing/2014/main" id="{D90BB56E-0191-4029-B0DC-A063933DE797}"/>
               </a:ext>
             </a:extLst>
           </p:cNvPr>
@@ -10782,7 +12423,7 @@
           <p:cNvPr id="6" name="Picture 5">
             <a:extLst>
               <a:ext uri="{FF2B5EF4-FFF2-40B4-BE49-F238E27FC236}">
-                <a16:creationId xmlns:a16="http://schemas.microsoft.com/office/drawing/2014/main" xmlns="" id="{194B2C69-C26C-43DD-A844-6AEDD7F1D01B}"/>
+                <a16:creationId xmlns="" xmlns:a16="http://schemas.microsoft.com/office/drawing/2014/main" id="{194B2C69-C26C-43DD-A844-6AEDD7F1D01B}"/>
               </a:ext>
             </a:extLst>
           </p:cNvPr>
@@ -10820,7 +12461,7 @@
 </p:sld>
 </file>
 
-<file path=ppt/slides/slide22.xml><?xml version="1.0" encoding="utf-8"?>
+<file path=ppt/slides/slide27.xml><?xml version="1.0" encoding="utf-8"?>
 <p:sld xmlns:a="http://schemas.openxmlformats.org/drawingml/2006/main" xmlns:r="http://schemas.openxmlformats.org/officeDocument/2006/relationships" xmlns:p="http://schemas.openxmlformats.org/presentationml/2006/main">
   <p:cSld>
     <p:spTree>
@@ -10842,7 +12483,7 @@
           <p:cNvPr id="2" name="Title 1">
             <a:extLst>
               <a:ext uri="{FF2B5EF4-FFF2-40B4-BE49-F238E27FC236}">
-                <a16:creationId xmlns:a16="http://schemas.microsoft.com/office/drawing/2014/main" xmlns="" id="{D9902204-D024-4B3E-BAD5-EA2426A8D1E6}"/>
+                <a16:creationId xmlns="" xmlns:a16="http://schemas.microsoft.com/office/drawing/2014/main" id="{D9902204-D024-4B3E-BAD5-EA2426A8D1E6}"/>
               </a:ext>
             </a:extLst>
           </p:cNvPr>
@@ -10870,7 +12511,7 @@
           <p:cNvPr id="3" name="Content Placeholder 2">
             <a:extLst>
               <a:ext uri="{FF2B5EF4-FFF2-40B4-BE49-F238E27FC236}">
-                <a16:creationId xmlns:a16="http://schemas.microsoft.com/office/drawing/2014/main" xmlns="" id="{10268B94-2AF6-4ADF-BC5F-B8A1EEF2B0D3}"/>
+                <a16:creationId xmlns="" xmlns:a16="http://schemas.microsoft.com/office/drawing/2014/main" id="{10268B94-2AF6-4ADF-BC5F-B8A1EEF2B0D3}"/>
               </a:ext>
             </a:extLst>
           </p:cNvPr>
@@ -10974,7 +12615,7 @@
 </p:sld>
 </file>
 
-<file path=ppt/slides/slide23.xml><?xml version="1.0" encoding="utf-8"?>
+<file path=ppt/slides/slide28.xml><?xml version="1.0" encoding="utf-8"?>
 <p:sld xmlns:a="http://schemas.openxmlformats.org/drawingml/2006/main" xmlns:r="http://schemas.openxmlformats.org/officeDocument/2006/relationships" xmlns:p="http://schemas.openxmlformats.org/presentationml/2006/main">
   <p:cSld>
     <p:spTree>
@@ -11093,7 +12734,7 @@
 </p:sld>
 </file>
 
-<file path=ppt/slides/slide24.xml><?xml version="1.0" encoding="utf-8"?>
+<file path=ppt/slides/slide29.xml><?xml version="1.0" encoding="utf-8"?>
 <p:sld xmlns:a="http://schemas.openxmlformats.org/drawingml/2006/main" xmlns:r="http://schemas.openxmlformats.org/officeDocument/2006/relationships" xmlns:p="http://schemas.openxmlformats.org/presentationml/2006/main">
   <p:cSld>
     <p:spTree>
@@ -11115,7 +12756,7 @@
           <p:cNvPr id="2" name="Title 1">
             <a:extLst>
               <a:ext uri="{FF2B5EF4-FFF2-40B4-BE49-F238E27FC236}">
-                <a16:creationId xmlns:a16="http://schemas.microsoft.com/office/drawing/2014/main" xmlns="" id="{557F4C11-AB35-4B69-A42A-E8FF545C9600}"/>
+                <a16:creationId xmlns="" xmlns:a16="http://schemas.microsoft.com/office/drawing/2014/main" id="{557F4C11-AB35-4B69-A42A-E8FF545C9600}"/>
               </a:ext>
             </a:extLst>
           </p:cNvPr>
@@ -11143,7 +12784,7 @@
           <p:cNvPr id="3" name="Content Placeholder 2">
             <a:extLst>
               <a:ext uri="{FF2B5EF4-FFF2-40B4-BE49-F238E27FC236}">
-                <a16:creationId xmlns:a16="http://schemas.microsoft.com/office/drawing/2014/main" xmlns="" id="{A983336B-0C17-4AFD-A45B-AB0B71824517}"/>
+                <a16:creationId xmlns="" xmlns:a16="http://schemas.microsoft.com/office/drawing/2014/main" id="{A983336B-0C17-4AFD-A45B-AB0B71824517}"/>
               </a:ext>
             </a:extLst>
           </p:cNvPr>
@@ -11272,7 +12913,7 @@
           <p:cNvPr id="4" name="Picture 3">
             <a:extLst>
               <a:ext uri="{FF2B5EF4-FFF2-40B4-BE49-F238E27FC236}">
-                <a16:creationId xmlns:a16="http://schemas.microsoft.com/office/drawing/2014/main" xmlns="" id="{89E6BA41-CB30-433E-9FA9-73B349998D50}"/>
+                <a16:creationId xmlns="" xmlns:a16="http://schemas.microsoft.com/office/drawing/2014/main" id="{89E6BA41-CB30-433E-9FA9-73B349998D50}"/>
               </a:ext>
             </a:extLst>
           </p:cNvPr>
@@ -11302,7 +12943,7 @@
           <p:cNvPr id="5" name="Picture 4">
             <a:extLst>
               <a:ext uri="{FF2B5EF4-FFF2-40B4-BE49-F238E27FC236}">
-                <a16:creationId xmlns:a16="http://schemas.microsoft.com/office/drawing/2014/main" xmlns="" id="{47DEF6A1-804E-4A49-BAD4-63D266167383}"/>
+                <a16:creationId xmlns="" xmlns:a16="http://schemas.microsoft.com/office/drawing/2014/main" id="{47DEF6A1-804E-4A49-BAD4-63D266167383}"/>
               </a:ext>
             </a:extLst>
           </p:cNvPr>
@@ -11340,7 +12981,7 @@
 </p:sld>
 </file>
 
-<file path=ppt/slides/slide25.xml><?xml version="1.0" encoding="utf-8"?>
+<file path=ppt/slides/slide3.xml><?xml version="1.0" encoding="utf-8"?>
 <p:sld xmlns:a="http://schemas.openxmlformats.org/drawingml/2006/main" xmlns:r="http://schemas.openxmlformats.org/officeDocument/2006/relationships" xmlns:p="http://schemas.openxmlformats.org/presentationml/2006/main">
   <p:cSld>
     <p:spTree>
@@ -11359,10 +13000,103 @@
       </p:grpSpPr>
       <p:sp>
         <p:nvSpPr>
+          <p:cNvPr id="12" name="Title 11">
+            <a:extLst>
+              <a:ext uri="{FF2B5EF4-FFF2-40B4-BE49-F238E27FC236}">
+                <a16:creationId xmlns="" xmlns:a16="http://schemas.microsoft.com/office/drawing/2014/main" id="{E34D5E5C-6938-43FD-8F6E-D8416F0615E7}"/>
+              </a:ext>
+            </a:extLst>
+          </p:cNvPr>
+          <p:cNvSpPr>
+            <a:spLocks noGrp="1"/>
+          </p:cNvSpPr>
+          <p:nvPr>
+            <p:ph type="title"/>
+          </p:nvPr>
+        </p:nvSpPr>
+        <p:spPr>
+          <a:xfrm>
+            <a:off x="838200" y="365125"/>
+            <a:ext cx="10515600" cy="1325563"/>
+          </a:xfrm>
+        </p:spPr>
+        <p:txBody>
+          <a:bodyPr/>
+          <a:lstStyle/>
+          <a:p>
+            <a:r>
+              <a:rPr lang="en-US" dirty="0"/>
+              <a:t>Azure AD Edition Features</a:t>
+            </a:r>
+          </a:p>
+        </p:txBody>
+      </p:sp>
+      <p:pic>
+        <p:nvPicPr>
+          <p:cNvPr id="116" name="Picture 115">
+            <a:extLst>
+              <a:ext uri="{FF2B5EF4-FFF2-40B4-BE49-F238E27FC236}">
+                <a16:creationId xmlns="" xmlns:a16="http://schemas.microsoft.com/office/drawing/2014/main" id="{06C39F37-BBE5-4DC0-859F-1B2D8E0AA73F}"/>
+              </a:ext>
+            </a:extLst>
+          </p:cNvPr>
+          <p:cNvPicPr>
+            <a:picLocks noChangeAspect="1"/>
+          </p:cNvPicPr>
+          <p:nvPr/>
+        </p:nvPicPr>
+        <p:blipFill>
+          <a:blip r:embed="rId3"/>
+          <a:stretch>
+            <a:fillRect/>
+          </a:stretch>
+        </p:blipFill>
+        <p:spPr>
+          <a:xfrm>
+            <a:off x="462666" y="1407266"/>
+            <a:ext cx="11266667" cy="4895238"/>
+          </a:xfrm>
+          <a:prstGeom prst="rect">
+            <a:avLst/>
+          </a:prstGeom>
+        </p:spPr>
+      </p:pic>
+    </p:spTree>
+    <p:extLst>
+      <p:ext uri="{BB962C8B-B14F-4D97-AF65-F5344CB8AC3E}">
+        <p14:creationId xmlns:p14="http://schemas.microsoft.com/office/powerpoint/2010/main" val="3721637024"/>
+      </p:ext>
+    </p:extLst>
+  </p:cSld>
+  <p:clrMapOvr>
+    <a:masterClrMapping/>
+  </p:clrMapOvr>
+</p:sld>
+</file>
+
+<file path=ppt/slides/slide30.xml><?xml version="1.0" encoding="utf-8"?>
+<p:sld xmlns:a="http://schemas.openxmlformats.org/drawingml/2006/main" xmlns:r="http://schemas.openxmlformats.org/officeDocument/2006/relationships" xmlns:p="http://schemas.openxmlformats.org/presentationml/2006/main">
+  <p:cSld>
+    <p:spTree>
+      <p:nvGrpSpPr>
+        <p:cNvPr id="1" name=""/>
+        <p:cNvGrpSpPr/>
+        <p:nvPr/>
+      </p:nvGrpSpPr>
+      <p:grpSpPr>
+        <a:xfrm>
+          <a:off x="0" y="0"/>
+          <a:ext cx="0" cy="0"/>
+          <a:chOff x="0" y="0"/>
+          <a:chExt cx="0" cy="0"/>
+        </a:xfrm>
+      </p:grpSpPr>
+      <p:sp>
+        <p:nvSpPr>
           <p:cNvPr id="2" name="Title 1">
             <a:extLst>
               <a:ext uri="{FF2B5EF4-FFF2-40B4-BE49-F238E27FC236}">
-                <a16:creationId xmlns:a16="http://schemas.microsoft.com/office/drawing/2014/main" xmlns="" id="{B1EC8CEE-14EF-4552-81A2-76FC223A50CC}"/>
+                <a16:creationId xmlns="" xmlns:a16="http://schemas.microsoft.com/office/drawing/2014/main" id="{B1EC8CEE-14EF-4552-81A2-76FC223A50CC}"/>
               </a:ext>
             </a:extLst>
           </p:cNvPr>
@@ -11390,7 +13124,7 @@
           <p:cNvPr id="3" name="Content Placeholder 2">
             <a:extLst>
               <a:ext uri="{FF2B5EF4-FFF2-40B4-BE49-F238E27FC236}">
-                <a16:creationId xmlns:a16="http://schemas.microsoft.com/office/drawing/2014/main" xmlns="" id="{88FF7262-5897-4473-98CC-2E62339F3C86}"/>
+                <a16:creationId xmlns="" xmlns:a16="http://schemas.microsoft.com/office/drawing/2014/main" id="{88FF7262-5897-4473-98CC-2E62339F3C86}"/>
               </a:ext>
             </a:extLst>
           </p:cNvPr>
@@ -11430,7 +13164,7 @@
           <p:cNvPr id="4" name="Picture 3">
             <a:extLst>
               <a:ext uri="{FF2B5EF4-FFF2-40B4-BE49-F238E27FC236}">
-                <a16:creationId xmlns:a16="http://schemas.microsoft.com/office/drawing/2014/main" xmlns="" id="{577B4EEA-EE24-4E8C-BD14-71DD32418062}"/>
+                <a16:creationId xmlns="" xmlns:a16="http://schemas.microsoft.com/office/drawing/2014/main" id="{577B4EEA-EE24-4E8C-BD14-71DD32418062}"/>
               </a:ext>
             </a:extLst>
           </p:cNvPr>
@@ -11460,7 +13194,7 @@
           <p:cNvPr id="5" name="Picture 4">
             <a:extLst>
               <a:ext uri="{FF2B5EF4-FFF2-40B4-BE49-F238E27FC236}">
-                <a16:creationId xmlns:a16="http://schemas.microsoft.com/office/drawing/2014/main" xmlns="" id="{80376A88-8328-4CBE-817A-43391D90190A}"/>
+                <a16:creationId xmlns="" xmlns:a16="http://schemas.microsoft.com/office/drawing/2014/main" id="{80376A88-8328-4CBE-817A-43391D90190A}"/>
               </a:ext>
             </a:extLst>
           </p:cNvPr>
@@ -11498,7 +13232,7 @@
 </p:sld>
 </file>
 
-<file path=ppt/slides/slide26.xml><?xml version="1.0" encoding="utf-8"?>
+<file path=ppt/slides/slide31.xml><?xml version="1.0" encoding="utf-8"?>
 <p:sld xmlns:a="http://schemas.openxmlformats.org/drawingml/2006/main" xmlns:r="http://schemas.openxmlformats.org/officeDocument/2006/relationships" xmlns:p="http://schemas.openxmlformats.org/presentationml/2006/main">
   <p:cSld>
     <p:spTree>
@@ -11622,7 +13356,7 @@
 </p:sld>
 </file>
 
-<file path=ppt/slides/slide27.xml><?xml version="1.0" encoding="utf-8"?>
+<file path=ppt/slides/slide32.xml><?xml version="1.0" encoding="utf-8"?>
 <p:sld xmlns:a="http://schemas.openxmlformats.org/drawingml/2006/main" xmlns:r="http://schemas.openxmlformats.org/officeDocument/2006/relationships" xmlns:p="http://schemas.openxmlformats.org/presentationml/2006/main">
   <p:cSld>
     <p:spTree>
@@ -11746,7 +13480,7 @@
 </p:sld>
 </file>
 
-<file path=ppt/slides/slide28.xml><?xml version="1.0" encoding="utf-8"?>
+<file path=ppt/slides/slide33.xml><?xml version="1.0" encoding="utf-8"?>
 <p:sld xmlns:a="http://schemas.openxmlformats.org/drawingml/2006/main" xmlns:r="http://schemas.openxmlformats.org/officeDocument/2006/relationships" xmlns:p="http://schemas.openxmlformats.org/presentationml/2006/main">
   <p:cSld>
     <p:spTree>
@@ -11768,7 +13502,7 @@
           <p:cNvPr id="2" name="Title 1">
             <a:extLst>
               <a:ext uri="{FF2B5EF4-FFF2-40B4-BE49-F238E27FC236}">
-                <a16:creationId xmlns:a16="http://schemas.microsoft.com/office/drawing/2014/main" xmlns="" id="{8187B857-FF9F-43F7-B0BC-C5F3F3D6B01F}"/>
+                <a16:creationId xmlns="" xmlns:a16="http://schemas.microsoft.com/office/drawing/2014/main" id="{8187B857-FF9F-43F7-B0BC-C5F3F3D6B01F}"/>
               </a:ext>
             </a:extLst>
           </p:cNvPr>
@@ -11830,99 +13564,6 @@
   <p:transition xmlns:p14="http://schemas.microsoft.com/office/powerpoint/2010/main">
     <p:fade/>
   </p:transition>
-</p:sld>
-</file>
-
-<file path=ppt/slides/slide3.xml><?xml version="1.0" encoding="utf-8"?>
-<p:sld xmlns:a="http://schemas.openxmlformats.org/drawingml/2006/main" xmlns:r="http://schemas.openxmlformats.org/officeDocument/2006/relationships" xmlns:p="http://schemas.openxmlformats.org/presentationml/2006/main">
-  <p:cSld>
-    <p:spTree>
-      <p:nvGrpSpPr>
-        <p:cNvPr id="1" name=""/>
-        <p:cNvGrpSpPr/>
-        <p:nvPr/>
-      </p:nvGrpSpPr>
-      <p:grpSpPr>
-        <a:xfrm>
-          <a:off x="0" y="0"/>
-          <a:ext cx="0" cy="0"/>
-          <a:chOff x="0" y="0"/>
-          <a:chExt cx="0" cy="0"/>
-        </a:xfrm>
-      </p:grpSpPr>
-      <p:sp>
-        <p:nvSpPr>
-          <p:cNvPr id="12" name="Title 11">
-            <a:extLst>
-              <a:ext uri="{FF2B5EF4-FFF2-40B4-BE49-F238E27FC236}">
-                <a16:creationId xmlns:a16="http://schemas.microsoft.com/office/drawing/2014/main" xmlns="" id="{E34D5E5C-6938-43FD-8F6E-D8416F0615E7}"/>
-              </a:ext>
-            </a:extLst>
-          </p:cNvPr>
-          <p:cNvSpPr>
-            <a:spLocks noGrp="1"/>
-          </p:cNvSpPr>
-          <p:nvPr>
-            <p:ph type="title"/>
-          </p:nvPr>
-        </p:nvSpPr>
-        <p:spPr>
-          <a:xfrm>
-            <a:off x="838200" y="365125"/>
-            <a:ext cx="10515600" cy="1325563"/>
-          </a:xfrm>
-        </p:spPr>
-        <p:txBody>
-          <a:bodyPr/>
-          <a:lstStyle/>
-          <a:p>
-            <a:r>
-              <a:rPr lang="en-US" dirty="0"/>
-              <a:t>Azure AD Edition Features</a:t>
-            </a:r>
-          </a:p>
-        </p:txBody>
-      </p:sp>
-      <p:pic>
-        <p:nvPicPr>
-          <p:cNvPr id="116" name="Picture 115">
-            <a:extLst>
-              <a:ext uri="{FF2B5EF4-FFF2-40B4-BE49-F238E27FC236}">
-                <a16:creationId xmlns:a16="http://schemas.microsoft.com/office/drawing/2014/main" xmlns="" id="{06C39F37-BBE5-4DC0-859F-1B2D8E0AA73F}"/>
-              </a:ext>
-            </a:extLst>
-          </p:cNvPr>
-          <p:cNvPicPr>
-            <a:picLocks noChangeAspect="1"/>
-          </p:cNvPicPr>
-          <p:nvPr/>
-        </p:nvPicPr>
-        <p:blipFill>
-          <a:blip r:embed="rId3"/>
-          <a:stretch>
-            <a:fillRect/>
-          </a:stretch>
-        </p:blipFill>
-        <p:spPr>
-          <a:xfrm>
-            <a:off x="462666" y="1407266"/>
-            <a:ext cx="11266667" cy="4895238"/>
-          </a:xfrm>
-          <a:prstGeom prst="rect">
-            <a:avLst/>
-          </a:prstGeom>
-        </p:spPr>
-      </p:pic>
-    </p:spTree>
-    <p:extLst>
-      <p:ext uri="{BB962C8B-B14F-4D97-AF65-F5344CB8AC3E}">
-        <p14:creationId xmlns:p14="http://schemas.microsoft.com/office/powerpoint/2010/main" val="3721637024"/>
-      </p:ext>
-    </p:extLst>
-  </p:cSld>
-  <p:clrMapOvr>
-    <a:masterClrMapping/>
-  </p:clrMapOvr>
 </p:sld>
 </file>
 
@@ -11948,7 +13589,7 @@
           <p:cNvPr id="2" name="Title 1">
             <a:extLst>
               <a:ext uri="{FF2B5EF4-FFF2-40B4-BE49-F238E27FC236}">
-                <a16:creationId xmlns:a16="http://schemas.microsoft.com/office/drawing/2014/main" xmlns="" id="{F63245C7-6C6F-4704-9C05-2EEC02833EBD}"/>
+                <a16:creationId xmlns="" xmlns:a16="http://schemas.microsoft.com/office/drawing/2014/main" id="{F63245C7-6C6F-4704-9C05-2EEC02833EBD}"/>
               </a:ext>
             </a:extLst>
           </p:cNvPr>
@@ -11976,7 +13617,7 @@
           <p:cNvPr id="4" name="Content Placeholder 3">
             <a:extLst>
               <a:ext uri="{FF2B5EF4-FFF2-40B4-BE49-F238E27FC236}">
-                <a16:creationId xmlns:a16="http://schemas.microsoft.com/office/drawing/2014/main" xmlns="" id="{49252237-7EA9-4261-913B-A192FD17CAEC}"/>
+                <a16:creationId xmlns="" xmlns:a16="http://schemas.microsoft.com/office/drawing/2014/main" id="{49252237-7EA9-4261-913B-A192FD17CAEC}"/>
               </a:ext>
             </a:extLst>
           </p:cNvPr>
@@ -12158,7 +13799,7 @@
           <p:cNvPr id="2" name="Title 1">
             <a:extLst>
               <a:ext uri="{FF2B5EF4-FFF2-40B4-BE49-F238E27FC236}">
-                <a16:creationId xmlns:a16="http://schemas.microsoft.com/office/drawing/2014/main" xmlns="" id="{E34ACD7B-B378-49D2-94AF-98F998964D1E}"/>
+                <a16:creationId xmlns="" xmlns:a16="http://schemas.microsoft.com/office/drawing/2014/main" id="{E34ACD7B-B378-49D2-94AF-98F998964D1E}"/>
               </a:ext>
             </a:extLst>
           </p:cNvPr>
@@ -12186,7 +13827,7 @@
           <p:cNvPr id="3" name="Content Placeholder 2">
             <a:extLst>
               <a:ext uri="{FF2B5EF4-FFF2-40B4-BE49-F238E27FC236}">
-                <a16:creationId xmlns:a16="http://schemas.microsoft.com/office/drawing/2014/main" xmlns="" id="{F1AFAA6E-885B-49BC-8374-CD4C611052D9}"/>
+                <a16:creationId xmlns="" xmlns:a16="http://schemas.microsoft.com/office/drawing/2014/main" id="{F1AFAA6E-885B-49BC-8374-CD4C611052D9}"/>
               </a:ext>
             </a:extLst>
           </p:cNvPr>
@@ -12318,7 +13959,7 @@
           <p:cNvPr id="2" name="Title 1">
             <a:extLst>
               <a:ext uri="{FF2B5EF4-FFF2-40B4-BE49-F238E27FC236}">
-                <a16:creationId xmlns:a16="http://schemas.microsoft.com/office/drawing/2014/main" xmlns="" id="{C7156839-E2F9-4BC5-969F-0E2EE6BD4FF3}"/>
+                <a16:creationId xmlns="" xmlns:a16="http://schemas.microsoft.com/office/drawing/2014/main" id="{C7156839-E2F9-4BC5-969F-0E2EE6BD4FF3}"/>
               </a:ext>
             </a:extLst>
           </p:cNvPr>
@@ -12346,7 +13987,7 @@
           <p:cNvPr id="3" name="Content Placeholder 2">
             <a:extLst>
               <a:ext uri="{FF2B5EF4-FFF2-40B4-BE49-F238E27FC236}">
-                <a16:creationId xmlns:a16="http://schemas.microsoft.com/office/drawing/2014/main" xmlns="" id="{AFC0DF39-09DF-4452-A558-3B0DC406078A}"/>
+                <a16:creationId xmlns="" xmlns:a16="http://schemas.microsoft.com/office/drawing/2014/main" id="{AFC0DF39-09DF-4452-A558-3B0DC406078A}"/>
               </a:ext>
             </a:extLst>
           </p:cNvPr>
@@ -12418,7 +14059,7 @@
           <p:cNvPr id="4" name="TextBox 3">
             <a:extLst>
               <a:ext uri="{FF2B5EF4-FFF2-40B4-BE49-F238E27FC236}">
-                <a16:creationId xmlns:a16="http://schemas.microsoft.com/office/drawing/2014/main" xmlns="" id="{55C5917B-C587-44A2-9808-E70700A05A3A}"/>
+                <a16:creationId xmlns="" xmlns:a16="http://schemas.microsoft.com/office/drawing/2014/main" id="{55C5917B-C587-44A2-9808-E70700A05A3A}"/>
               </a:ext>
             </a:extLst>
           </p:cNvPr>
@@ -12621,7 +14262,7 @@
           <p:cNvPr id="2" name="Title 1">
             <a:extLst>
               <a:ext uri="{FF2B5EF4-FFF2-40B4-BE49-F238E27FC236}">
-                <a16:creationId xmlns:a16="http://schemas.microsoft.com/office/drawing/2014/main" xmlns="" id="{AF20BC31-EFB3-408F-B1B4-0F4EF10535E5}"/>
+                <a16:creationId xmlns="" xmlns:a16="http://schemas.microsoft.com/office/drawing/2014/main" id="{AF20BC31-EFB3-408F-B1B4-0F4EF10535E5}"/>
               </a:ext>
             </a:extLst>
           </p:cNvPr>
@@ -12649,7 +14290,7 @@
           <p:cNvPr id="4" name="TextBox 3">
             <a:extLst>
               <a:ext uri="{FF2B5EF4-FFF2-40B4-BE49-F238E27FC236}">
-                <a16:creationId xmlns:a16="http://schemas.microsoft.com/office/drawing/2014/main" xmlns="" id="{3F7D9CE6-20A4-44C3-BAE9-2FC45834F38B}"/>
+                <a16:creationId xmlns="" xmlns:a16="http://schemas.microsoft.com/office/drawing/2014/main" id="{3F7D9CE6-20A4-44C3-BAE9-2FC45834F38B}"/>
               </a:ext>
             </a:extLst>
           </p:cNvPr>
@@ -12776,7 +14417,7 @@
           <p:cNvPr id="7" name="TextBox 6">
             <a:extLst>
               <a:ext uri="{FF2B5EF4-FFF2-40B4-BE49-F238E27FC236}">
-                <a16:creationId xmlns:a16="http://schemas.microsoft.com/office/drawing/2014/main" xmlns="" id="{4A3CA7C4-B0AC-4649-92F8-539D5A8114A5}"/>
+                <a16:creationId xmlns="" xmlns:a16="http://schemas.microsoft.com/office/drawing/2014/main" id="{4A3CA7C4-B0AC-4649-92F8-539D5A8114A5}"/>
               </a:ext>
             </a:extLst>
           </p:cNvPr>
@@ -13139,7 +14780,7 @@
   <a:extraClrSchemeLst/>
   <a:extLst>
     <a:ext uri="{05A4C25C-085E-4340-85A3-A5531E510DB2}">
-      <thm15:themeFamily xmlns:thm15="http://schemas.microsoft.com/office/thememl/2012/main" xmlns="" name="70-534-Template.pptx" id="{439206FD-A113-4BE5-B431-40BDFE9319ED}" vid="{A4FDB642-FD3F-4B16-9ABC-ADFB44A81F3B}"/>
+      <thm15:themeFamily xmlns="" xmlns:thm15="http://schemas.microsoft.com/office/thememl/2012/main" name="70-534-Template.pptx" id="{439206FD-A113-4BE5-B431-40BDFE9319ED}" vid="{A4FDB642-FD3F-4B16-9ABC-ADFB44A81F3B}"/>
     </a:ext>
   </a:extLst>
 </a:theme>
@@ -13434,7 +15075,7 @@
   <a:extraClrSchemeLst/>
   <a:extLst>
     <a:ext uri="{05A4C25C-085E-4340-85A3-A5531E510DB2}">
-      <thm15:themeFamily xmlns:thm15="http://schemas.microsoft.com/office/thememl/2012/main" xmlns="" name="Office Theme" id="{62F939B6-93AF-4DB8-9C6B-D6C7DFDC589F}" vid="{4A3C46E8-61CC-4603-A589-7422A47A8E4A}"/>
+      <thm15:themeFamily xmlns="" xmlns:thm15="http://schemas.microsoft.com/office/thememl/2012/main" name="Office Theme" id="{62F939B6-93AF-4DB8-9C6B-D6C7DFDC589F}" vid="{4A3C46E8-61CC-4603-A589-7422A47A8E4A}"/>
     </a:ext>
   </a:extLst>
 </a:theme>
@@ -13695,7 +15336,7 @@
   <a:extraClrSchemeLst/>
   <a:extLst>
     <a:ext uri="{05A4C25C-085E-4340-85A3-A5531E510DB2}">
-      <thm15:themeFamily xmlns:thm15="http://schemas.microsoft.com/office/thememl/2012/main" xmlns="" name="Office Theme" id="{62F939B6-93AF-4DB8-9C6B-D6C7DFDC589F}" vid="{4A3C46E8-61CC-4603-A589-7422A47A8E4A}"/>
+      <thm15:themeFamily xmlns="" xmlns:thm15="http://schemas.microsoft.com/office/thememl/2012/main" name="Office Theme" id="{62F939B6-93AF-4DB8-9C6B-D6C7DFDC589F}" vid="{4A3C46E8-61CC-4603-A589-7422A47A8E4A}"/>
     </a:ext>
   </a:extLst>
 </a:theme>
@@ -13956,7 +15597,7 @@
   <a:extraClrSchemeLst/>
   <a:extLst>
     <a:ext uri="{05A4C25C-085E-4340-85A3-A5531E510DB2}">
-      <thm15:themeFamily xmlns:thm15="http://schemas.microsoft.com/office/thememl/2012/main" xmlns="" name="Office Theme" id="{62F939B6-93AF-4DB8-9C6B-D6C7DFDC589F}" vid="{4A3C46E8-61CC-4603-A589-7422A47A8E4A}"/>
+      <thm15:themeFamily xmlns="" xmlns:thm15="http://schemas.microsoft.com/office/thememl/2012/main" name="Office Theme" id="{62F939B6-93AF-4DB8-9C6B-D6C7DFDC589F}" vid="{4A3C46E8-61CC-4603-A589-7422A47A8E4A}"/>
     </a:ext>
   </a:extLst>
 </a:theme>

</xml_diff>